<commit_message>
wip: screen transition animations
</commit_message>
<xml_diff>
--- a/app-quotation-automator.pptx
+++ b/app-quotation-automator.pptx
@@ -253,7 +253,7 @@
           <a:p>
             <a:fld id="{318E1502-E61F-4BB6-8EE4-8357EE119714}" type="datetimeFigureOut">
               <a:rPr lang="en-US" smtClean="0"/>
-              <a:t>3/10/2017</a:t>
+              <a:t>10/03/2017</a:t>
             </a:fld>
             <a:endParaRPr lang="en-US"/>
           </a:p>
@@ -423,7 +423,7 @@
           <a:p>
             <a:fld id="{318E1502-E61F-4BB6-8EE4-8357EE119714}" type="datetimeFigureOut">
               <a:rPr lang="en-US" smtClean="0"/>
-              <a:t>3/10/2017</a:t>
+              <a:t>10/03/2017</a:t>
             </a:fld>
             <a:endParaRPr lang="en-US"/>
           </a:p>
@@ -603,7 +603,7 @@
           <a:p>
             <a:fld id="{318E1502-E61F-4BB6-8EE4-8357EE119714}" type="datetimeFigureOut">
               <a:rPr lang="en-US" smtClean="0"/>
-              <a:t>3/10/2017</a:t>
+              <a:t>10/03/2017</a:t>
             </a:fld>
             <a:endParaRPr lang="en-US"/>
           </a:p>
@@ -773,7 +773,7 @@
           <a:p>
             <a:fld id="{318E1502-E61F-4BB6-8EE4-8357EE119714}" type="datetimeFigureOut">
               <a:rPr lang="en-US" smtClean="0"/>
-              <a:t>3/10/2017</a:t>
+              <a:t>10/03/2017</a:t>
             </a:fld>
             <a:endParaRPr lang="en-US"/>
           </a:p>
@@ -1019,7 +1019,7 @@
           <a:p>
             <a:fld id="{318E1502-E61F-4BB6-8EE4-8357EE119714}" type="datetimeFigureOut">
               <a:rPr lang="en-US" smtClean="0"/>
-              <a:t>3/10/2017</a:t>
+              <a:t>10/03/2017</a:t>
             </a:fld>
             <a:endParaRPr lang="en-US"/>
           </a:p>
@@ -1251,7 +1251,7 @@
           <a:p>
             <a:fld id="{318E1502-E61F-4BB6-8EE4-8357EE119714}" type="datetimeFigureOut">
               <a:rPr lang="en-US" smtClean="0"/>
-              <a:t>3/10/2017</a:t>
+              <a:t>10/03/2017</a:t>
             </a:fld>
             <a:endParaRPr lang="en-US"/>
           </a:p>
@@ -1618,7 +1618,7 @@
           <a:p>
             <a:fld id="{318E1502-E61F-4BB6-8EE4-8357EE119714}" type="datetimeFigureOut">
               <a:rPr lang="en-US" smtClean="0"/>
-              <a:t>3/10/2017</a:t>
+              <a:t>10/03/2017</a:t>
             </a:fld>
             <a:endParaRPr lang="en-US"/>
           </a:p>
@@ -1736,7 +1736,7 @@
           <a:p>
             <a:fld id="{318E1502-E61F-4BB6-8EE4-8357EE119714}" type="datetimeFigureOut">
               <a:rPr lang="en-US" smtClean="0"/>
-              <a:t>3/10/2017</a:t>
+              <a:t>10/03/2017</a:t>
             </a:fld>
             <a:endParaRPr lang="en-US"/>
           </a:p>
@@ -1831,7 +1831,7 @@
           <a:p>
             <a:fld id="{318E1502-E61F-4BB6-8EE4-8357EE119714}" type="datetimeFigureOut">
               <a:rPr lang="en-US" smtClean="0"/>
-              <a:t>3/10/2017</a:t>
+              <a:t>10/03/2017</a:t>
             </a:fld>
             <a:endParaRPr lang="en-US"/>
           </a:p>
@@ -2108,7 +2108,7 @@
           <a:p>
             <a:fld id="{318E1502-E61F-4BB6-8EE4-8357EE119714}" type="datetimeFigureOut">
               <a:rPr lang="en-US" smtClean="0"/>
-              <a:t>3/10/2017</a:t>
+              <a:t>10/03/2017</a:t>
             </a:fld>
             <a:endParaRPr lang="en-US"/>
           </a:p>
@@ -2361,7 +2361,7 @@
           <a:p>
             <a:fld id="{318E1502-E61F-4BB6-8EE4-8357EE119714}" type="datetimeFigureOut">
               <a:rPr lang="en-US" smtClean="0"/>
-              <a:t>3/10/2017</a:t>
+              <a:t>10/03/2017</a:t>
             </a:fld>
             <a:endParaRPr lang="en-US"/>
           </a:p>
@@ -2574,7 +2574,7 @@
           <a:p>
             <a:fld id="{318E1502-E61F-4BB6-8EE4-8357EE119714}" type="datetimeFigureOut">
               <a:rPr lang="en-US" smtClean="0"/>
-              <a:t>3/10/2017</a:t>
+              <a:t>10/03/2017</a:t>
             </a:fld>
             <a:endParaRPr lang="en-US"/>
           </a:p>
@@ -3241,6 +3241,50 @@
           </a:p>
         </p:txBody>
       </p:sp>
+      <p:sp>
+        <p:nvSpPr>
+          <p:cNvPr id="8" name="Rounded Rectangle 7"/>
+          <p:cNvSpPr/>
+          <p:nvPr/>
+        </p:nvSpPr>
+        <p:spPr>
+          <a:xfrm>
+            <a:off x="1695147" y="4262284"/>
+            <a:ext cx="1814052" cy="501446"/>
+          </a:xfrm>
+          <a:prstGeom prst="roundRect">
+            <a:avLst/>
+          </a:prstGeom>
+        </p:spPr>
+        <p:style>
+          <a:lnRef idx="2">
+            <a:schemeClr val="accent1">
+              <a:shade val="50000"/>
+            </a:schemeClr>
+          </a:lnRef>
+          <a:fillRef idx="1">
+            <a:schemeClr val="accent1"/>
+          </a:fillRef>
+          <a:effectRef idx="0">
+            <a:schemeClr val="accent1"/>
+          </a:effectRef>
+          <a:fontRef idx="minor">
+            <a:schemeClr val="lt1"/>
+          </a:fontRef>
+        </p:style>
+        <p:txBody>
+          <a:bodyPr rtlCol="0" anchor="ctr"/>
+          <a:lstStyle/>
+          <a:p>
+            <a:pPr algn="ctr"/>
+            <a:r>
+              <a:rPr lang="en-US" b="1" dirty="0" smtClean="0"/>
+              <a:t>BACK</a:t>
+            </a:r>
+            <a:endParaRPr lang="en-US" b="1" dirty="0"/>
+          </a:p>
+        </p:txBody>
+      </p:sp>
     </p:spTree>
     <p:extLst>
       <p:ext uri="{BB962C8B-B14F-4D97-AF65-F5344CB8AC3E}">
@@ -3377,6 +3421,50 @@
           </a:p>
         </p:txBody>
       </p:sp>
+      <p:sp>
+        <p:nvSpPr>
+          <p:cNvPr id="7" name="Rounded Rectangle 6"/>
+          <p:cNvSpPr/>
+          <p:nvPr/>
+        </p:nvSpPr>
+        <p:spPr>
+          <a:xfrm>
+            <a:off x="1695147" y="4262284"/>
+            <a:ext cx="1814052" cy="501446"/>
+          </a:xfrm>
+          <a:prstGeom prst="roundRect">
+            <a:avLst/>
+          </a:prstGeom>
+        </p:spPr>
+        <p:style>
+          <a:lnRef idx="2">
+            <a:schemeClr val="accent1">
+              <a:shade val="50000"/>
+            </a:schemeClr>
+          </a:lnRef>
+          <a:fillRef idx="1">
+            <a:schemeClr val="accent1"/>
+          </a:fillRef>
+          <a:effectRef idx="0">
+            <a:schemeClr val="accent1"/>
+          </a:effectRef>
+          <a:fontRef idx="minor">
+            <a:schemeClr val="lt1"/>
+          </a:fontRef>
+        </p:style>
+        <p:txBody>
+          <a:bodyPr rtlCol="0" anchor="ctr"/>
+          <a:lstStyle/>
+          <a:p>
+            <a:pPr algn="ctr"/>
+            <a:r>
+              <a:rPr lang="en-US" b="1" dirty="0" smtClean="0"/>
+              <a:t>BACK</a:t>
+            </a:r>
+            <a:endParaRPr lang="en-US" b="1" dirty="0"/>
+          </a:p>
+        </p:txBody>
+      </p:sp>
     </p:spTree>
     <p:extLst>
       <p:ext uri="{BB962C8B-B14F-4D97-AF65-F5344CB8AC3E}">
@@ -3601,6 +3689,50 @@
           </a:p>
         </p:txBody>
       </p:sp>
+      <p:sp>
+        <p:nvSpPr>
+          <p:cNvPr id="8" name="Rounded Rectangle 7"/>
+          <p:cNvSpPr/>
+          <p:nvPr/>
+        </p:nvSpPr>
+        <p:spPr>
+          <a:xfrm>
+            <a:off x="1695147" y="4262284"/>
+            <a:ext cx="1814052" cy="501446"/>
+          </a:xfrm>
+          <a:prstGeom prst="roundRect">
+            <a:avLst/>
+          </a:prstGeom>
+        </p:spPr>
+        <p:style>
+          <a:lnRef idx="2">
+            <a:schemeClr val="accent1">
+              <a:shade val="50000"/>
+            </a:schemeClr>
+          </a:lnRef>
+          <a:fillRef idx="1">
+            <a:schemeClr val="accent1"/>
+          </a:fillRef>
+          <a:effectRef idx="0">
+            <a:schemeClr val="accent1"/>
+          </a:effectRef>
+          <a:fontRef idx="minor">
+            <a:schemeClr val="lt1"/>
+          </a:fontRef>
+        </p:style>
+        <p:txBody>
+          <a:bodyPr rtlCol="0" anchor="ctr"/>
+          <a:lstStyle/>
+          <a:p>
+            <a:pPr algn="ctr"/>
+            <a:r>
+              <a:rPr lang="en-US" b="1" dirty="0" smtClean="0"/>
+              <a:t>BACK</a:t>
+            </a:r>
+            <a:endParaRPr lang="en-US" b="1" dirty="0"/>
+          </a:p>
+        </p:txBody>
+      </p:sp>
     </p:spTree>
     <p:extLst>
       <p:ext uri="{BB962C8B-B14F-4D97-AF65-F5344CB8AC3E}">
@@ -3655,11 +3787,7 @@
           <a:p>
             <a:r>
               <a:rPr lang="en-US" dirty="0" smtClean="0"/>
-              <a:t>Select Door </a:t>
-            </a:r>
-            <a:r>
-              <a:rPr lang="en-US" dirty="0" smtClean="0"/>
-              <a:t>Type/</a:t>
+              <a:t>Select Door Type/</a:t>
             </a:r>
             <a:r>
               <a:rPr lang="en-US" dirty="0" err="1" smtClean="0"/>
@@ -3862,6 +3990,50 @@
             <a:r>
               <a:rPr lang="en-US" b="1" dirty="0" smtClean="0"/>
               <a:t>Units are in mm</a:t>
+            </a:r>
+            <a:endParaRPr lang="en-US" b="1" dirty="0"/>
+          </a:p>
+        </p:txBody>
+      </p:sp>
+      <p:sp>
+        <p:nvSpPr>
+          <p:cNvPr id="8" name="Rounded Rectangle 7"/>
+          <p:cNvSpPr/>
+          <p:nvPr/>
+        </p:nvSpPr>
+        <p:spPr>
+          <a:xfrm>
+            <a:off x="1695147" y="4262284"/>
+            <a:ext cx="1814052" cy="501446"/>
+          </a:xfrm>
+          <a:prstGeom prst="roundRect">
+            <a:avLst/>
+          </a:prstGeom>
+        </p:spPr>
+        <p:style>
+          <a:lnRef idx="2">
+            <a:schemeClr val="accent1">
+              <a:shade val="50000"/>
+            </a:schemeClr>
+          </a:lnRef>
+          <a:fillRef idx="1">
+            <a:schemeClr val="accent1"/>
+          </a:fillRef>
+          <a:effectRef idx="0">
+            <a:schemeClr val="accent1"/>
+          </a:effectRef>
+          <a:fontRef idx="minor">
+            <a:schemeClr val="lt1"/>
+          </a:fontRef>
+        </p:style>
+        <p:txBody>
+          <a:bodyPr rtlCol="0" anchor="ctr"/>
+          <a:lstStyle/>
+          <a:p>
+            <a:pPr algn="ctr"/>
+            <a:r>
+              <a:rPr lang="en-US" b="1" dirty="0" smtClean="0"/>
+              <a:t>BACK</a:t>
             </a:r>
             <a:endParaRPr lang="en-US" b="1" dirty="0"/>
           </a:p>
@@ -4091,6 +4263,50 @@
           </a:p>
         </p:txBody>
       </p:sp>
+      <p:sp>
+        <p:nvSpPr>
+          <p:cNvPr id="9" name="Rounded Rectangle 8"/>
+          <p:cNvSpPr/>
+          <p:nvPr/>
+        </p:nvSpPr>
+        <p:spPr>
+          <a:xfrm>
+            <a:off x="1695147" y="4262284"/>
+            <a:ext cx="1814052" cy="501446"/>
+          </a:xfrm>
+          <a:prstGeom prst="roundRect">
+            <a:avLst/>
+          </a:prstGeom>
+        </p:spPr>
+        <p:style>
+          <a:lnRef idx="2">
+            <a:schemeClr val="accent1">
+              <a:shade val="50000"/>
+            </a:schemeClr>
+          </a:lnRef>
+          <a:fillRef idx="1">
+            <a:schemeClr val="accent1"/>
+          </a:fillRef>
+          <a:effectRef idx="0">
+            <a:schemeClr val="accent1"/>
+          </a:effectRef>
+          <a:fontRef idx="minor">
+            <a:schemeClr val="lt1"/>
+          </a:fontRef>
+        </p:style>
+        <p:txBody>
+          <a:bodyPr rtlCol="0" anchor="ctr"/>
+          <a:lstStyle/>
+          <a:p>
+            <a:pPr algn="ctr"/>
+            <a:r>
+              <a:rPr lang="en-US" b="1" dirty="0" smtClean="0"/>
+              <a:t>BACK</a:t>
+            </a:r>
+            <a:endParaRPr lang="en-US" b="1" dirty="0"/>
+          </a:p>
+        </p:txBody>
+      </p:sp>
     </p:spTree>
     <p:extLst>
       <p:ext uri="{BB962C8B-B14F-4D97-AF65-F5344CB8AC3E}">
@@ -4317,6 +4533,50 @@
           </a:p>
         </p:txBody>
       </p:sp>
+      <p:sp>
+        <p:nvSpPr>
+          <p:cNvPr id="10" name="Rounded Rectangle 9"/>
+          <p:cNvSpPr/>
+          <p:nvPr/>
+        </p:nvSpPr>
+        <p:spPr>
+          <a:xfrm>
+            <a:off x="1695147" y="4262284"/>
+            <a:ext cx="1814052" cy="501446"/>
+          </a:xfrm>
+          <a:prstGeom prst="roundRect">
+            <a:avLst/>
+          </a:prstGeom>
+        </p:spPr>
+        <p:style>
+          <a:lnRef idx="2">
+            <a:schemeClr val="accent1">
+              <a:shade val="50000"/>
+            </a:schemeClr>
+          </a:lnRef>
+          <a:fillRef idx="1">
+            <a:schemeClr val="accent1"/>
+          </a:fillRef>
+          <a:effectRef idx="0">
+            <a:schemeClr val="accent1"/>
+          </a:effectRef>
+          <a:fontRef idx="minor">
+            <a:schemeClr val="lt1"/>
+          </a:fontRef>
+        </p:style>
+        <p:txBody>
+          <a:bodyPr rtlCol="0" anchor="ctr"/>
+          <a:lstStyle/>
+          <a:p>
+            <a:pPr algn="ctr"/>
+            <a:r>
+              <a:rPr lang="en-US" b="1" dirty="0" smtClean="0"/>
+              <a:t>BACK</a:t>
+            </a:r>
+            <a:endParaRPr lang="en-US" b="1" dirty="0"/>
+          </a:p>
+        </p:txBody>
+      </p:sp>
     </p:spTree>
     <p:extLst>
       <p:ext uri="{BB962C8B-B14F-4D97-AF65-F5344CB8AC3E}">
@@ -4587,6 +4847,50 @@
           </a:p>
         </p:txBody>
       </p:sp>
+      <p:sp>
+        <p:nvSpPr>
+          <p:cNvPr id="10" name="Rounded Rectangle 9"/>
+          <p:cNvSpPr/>
+          <p:nvPr/>
+        </p:nvSpPr>
+        <p:spPr>
+          <a:xfrm>
+            <a:off x="1695147" y="4262284"/>
+            <a:ext cx="1814052" cy="501446"/>
+          </a:xfrm>
+          <a:prstGeom prst="roundRect">
+            <a:avLst/>
+          </a:prstGeom>
+        </p:spPr>
+        <p:style>
+          <a:lnRef idx="2">
+            <a:schemeClr val="accent1">
+              <a:shade val="50000"/>
+            </a:schemeClr>
+          </a:lnRef>
+          <a:fillRef idx="1">
+            <a:schemeClr val="accent1"/>
+          </a:fillRef>
+          <a:effectRef idx="0">
+            <a:schemeClr val="accent1"/>
+          </a:effectRef>
+          <a:fontRef idx="minor">
+            <a:schemeClr val="lt1"/>
+          </a:fontRef>
+        </p:style>
+        <p:txBody>
+          <a:bodyPr rtlCol="0" anchor="ctr"/>
+          <a:lstStyle/>
+          <a:p>
+            <a:pPr algn="ctr"/>
+            <a:r>
+              <a:rPr lang="en-US" b="1" dirty="0" smtClean="0"/>
+              <a:t>BACK</a:t>
+            </a:r>
+            <a:endParaRPr lang="en-US" b="1" dirty="0"/>
+          </a:p>
+        </p:txBody>
+      </p:sp>
     </p:spTree>
     <p:extLst>
       <p:ext uri="{BB962C8B-B14F-4D97-AF65-F5344CB8AC3E}">
@@ -4855,6 +5159,50 @@
           </a:p>
         </p:txBody>
       </p:sp>
+      <p:sp>
+        <p:nvSpPr>
+          <p:cNvPr id="8" name="Rounded Rectangle 7"/>
+          <p:cNvSpPr/>
+          <p:nvPr/>
+        </p:nvSpPr>
+        <p:spPr>
+          <a:xfrm>
+            <a:off x="1695147" y="4262284"/>
+            <a:ext cx="1814052" cy="501446"/>
+          </a:xfrm>
+          <a:prstGeom prst="roundRect">
+            <a:avLst/>
+          </a:prstGeom>
+        </p:spPr>
+        <p:style>
+          <a:lnRef idx="2">
+            <a:schemeClr val="accent1">
+              <a:shade val="50000"/>
+            </a:schemeClr>
+          </a:lnRef>
+          <a:fillRef idx="1">
+            <a:schemeClr val="accent1"/>
+          </a:fillRef>
+          <a:effectRef idx="0">
+            <a:schemeClr val="accent1"/>
+          </a:effectRef>
+          <a:fontRef idx="minor">
+            <a:schemeClr val="lt1"/>
+          </a:fontRef>
+        </p:style>
+        <p:txBody>
+          <a:bodyPr rtlCol="0" anchor="ctr"/>
+          <a:lstStyle/>
+          <a:p>
+            <a:pPr algn="ctr"/>
+            <a:r>
+              <a:rPr lang="en-US" b="1" dirty="0" smtClean="0"/>
+              <a:t>BACK</a:t>
+            </a:r>
+            <a:endParaRPr lang="en-US" b="1" dirty="0"/>
+          </a:p>
+        </p:txBody>
+      </p:sp>
     </p:spTree>
     <p:extLst>
       <p:ext uri="{BB962C8B-B14F-4D97-AF65-F5344CB8AC3E}">
@@ -5051,6 +5399,50 @@
           </a:p>
         </p:txBody>
       </p:sp>
+      <p:sp>
+        <p:nvSpPr>
+          <p:cNvPr id="8" name="Rounded Rectangle 7"/>
+          <p:cNvSpPr/>
+          <p:nvPr/>
+        </p:nvSpPr>
+        <p:spPr>
+          <a:xfrm>
+            <a:off x="1695147" y="4262284"/>
+            <a:ext cx="1814052" cy="501446"/>
+          </a:xfrm>
+          <a:prstGeom prst="roundRect">
+            <a:avLst/>
+          </a:prstGeom>
+        </p:spPr>
+        <p:style>
+          <a:lnRef idx="2">
+            <a:schemeClr val="accent1">
+              <a:shade val="50000"/>
+            </a:schemeClr>
+          </a:lnRef>
+          <a:fillRef idx="1">
+            <a:schemeClr val="accent1"/>
+          </a:fillRef>
+          <a:effectRef idx="0">
+            <a:schemeClr val="accent1"/>
+          </a:effectRef>
+          <a:fontRef idx="minor">
+            <a:schemeClr val="lt1"/>
+          </a:fontRef>
+        </p:style>
+        <p:txBody>
+          <a:bodyPr rtlCol="0" anchor="ctr"/>
+          <a:lstStyle/>
+          <a:p>
+            <a:pPr algn="ctr"/>
+            <a:r>
+              <a:rPr lang="en-US" b="1" dirty="0" smtClean="0"/>
+              <a:t>BACK</a:t>
+            </a:r>
+            <a:endParaRPr lang="en-US" b="1" dirty="0"/>
+          </a:p>
+        </p:txBody>
+      </p:sp>
     </p:spTree>
     <p:extLst>
       <p:ext uri="{BB962C8B-B14F-4D97-AF65-F5344CB8AC3E}">
@@ -5352,6 +5744,50 @@
             <a:r>
               <a:rPr lang="en-US" b="1" dirty="0" smtClean="0"/>
               <a:t>Not Required</a:t>
+            </a:r>
+            <a:endParaRPr lang="en-US" b="1" dirty="0"/>
+          </a:p>
+        </p:txBody>
+      </p:sp>
+      <p:sp>
+        <p:nvSpPr>
+          <p:cNvPr id="11" name="Rounded Rectangle 10"/>
+          <p:cNvSpPr/>
+          <p:nvPr/>
+        </p:nvSpPr>
+        <p:spPr>
+          <a:xfrm>
+            <a:off x="1695147" y="4262284"/>
+            <a:ext cx="1814052" cy="501446"/>
+          </a:xfrm>
+          <a:prstGeom prst="roundRect">
+            <a:avLst/>
+          </a:prstGeom>
+        </p:spPr>
+        <p:style>
+          <a:lnRef idx="2">
+            <a:schemeClr val="accent1">
+              <a:shade val="50000"/>
+            </a:schemeClr>
+          </a:lnRef>
+          <a:fillRef idx="1">
+            <a:schemeClr val="accent1"/>
+          </a:fillRef>
+          <a:effectRef idx="0">
+            <a:schemeClr val="accent1"/>
+          </a:effectRef>
+          <a:fontRef idx="minor">
+            <a:schemeClr val="lt1"/>
+          </a:fontRef>
+        </p:style>
+        <p:txBody>
+          <a:bodyPr rtlCol="0" anchor="ctr"/>
+          <a:lstStyle/>
+          <a:p>
+            <a:pPr algn="ctr"/>
+            <a:r>
+              <a:rPr lang="en-US" b="1" dirty="0" smtClean="0"/>
+              <a:t>BACK</a:t>
             </a:r>
             <a:endParaRPr lang="en-US" b="1" dirty="0"/>
           </a:p>

</xml_diff>

<commit_message>
updated presentation, have to make a production quality app
</commit_message>
<xml_diff>
--- a/app-quotation-automator.pptx
+++ b/app-quotation-automator.pptx
@@ -5,17 +5,19 @@
     <p:sldMasterId id="2147483648" r:id="rId1"/>
   </p:sldMasterIdLst>
   <p:sldIdLst>
-    <p:sldId id="256" r:id="rId2"/>
-    <p:sldId id="260" r:id="rId3"/>
-    <p:sldId id="264" r:id="rId4"/>
-    <p:sldId id="257" r:id="rId5"/>
-    <p:sldId id="258" r:id="rId6"/>
-    <p:sldId id="259" r:id="rId7"/>
-    <p:sldId id="261" r:id="rId8"/>
-    <p:sldId id="262" r:id="rId9"/>
-    <p:sldId id="266" r:id="rId10"/>
-    <p:sldId id="263" r:id="rId11"/>
-    <p:sldId id="265" r:id="rId12"/>
+    <p:sldId id="267" r:id="rId2"/>
+    <p:sldId id="270" r:id="rId3"/>
+    <p:sldId id="269" r:id="rId4"/>
+    <p:sldId id="256" r:id="rId5"/>
+    <p:sldId id="257" r:id="rId6"/>
+    <p:sldId id="264" r:id="rId7"/>
+    <p:sldId id="258" r:id="rId8"/>
+    <p:sldId id="259" r:id="rId9"/>
+    <p:sldId id="261" r:id="rId10"/>
+    <p:sldId id="262" r:id="rId11"/>
+    <p:sldId id="266" r:id="rId12"/>
+    <p:sldId id="263" r:id="rId13"/>
+    <p:sldId id="265" r:id="rId14"/>
   </p:sldIdLst>
   <p:sldSz cx="12192000" cy="6858000"/>
   <p:notesSz cx="6858000" cy="9144000"/>
@@ -253,7 +255,7 @@
           <a:p>
             <a:fld id="{318E1502-E61F-4BB6-8EE4-8357EE119714}" type="datetimeFigureOut">
               <a:rPr lang="en-US" smtClean="0"/>
-              <a:t>10/03/2017</a:t>
+              <a:t>3/18/2017</a:t>
             </a:fld>
             <a:endParaRPr lang="en-US"/>
           </a:p>
@@ -423,7 +425,7 @@
           <a:p>
             <a:fld id="{318E1502-E61F-4BB6-8EE4-8357EE119714}" type="datetimeFigureOut">
               <a:rPr lang="en-US" smtClean="0"/>
-              <a:t>10/03/2017</a:t>
+              <a:t>3/18/2017</a:t>
             </a:fld>
             <a:endParaRPr lang="en-US"/>
           </a:p>
@@ -603,7 +605,7 @@
           <a:p>
             <a:fld id="{318E1502-E61F-4BB6-8EE4-8357EE119714}" type="datetimeFigureOut">
               <a:rPr lang="en-US" smtClean="0"/>
-              <a:t>10/03/2017</a:t>
+              <a:t>3/18/2017</a:t>
             </a:fld>
             <a:endParaRPr lang="en-US"/>
           </a:p>
@@ -773,7 +775,7 @@
           <a:p>
             <a:fld id="{318E1502-E61F-4BB6-8EE4-8357EE119714}" type="datetimeFigureOut">
               <a:rPr lang="en-US" smtClean="0"/>
-              <a:t>10/03/2017</a:t>
+              <a:t>3/18/2017</a:t>
             </a:fld>
             <a:endParaRPr lang="en-US"/>
           </a:p>
@@ -1019,7 +1021,7 @@
           <a:p>
             <a:fld id="{318E1502-E61F-4BB6-8EE4-8357EE119714}" type="datetimeFigureOut">
               <a:rPr lang="en-US" smtClean="0"/>
-              <a:t>10/03/2017</a:t>
+              <a:t>3/18/2017</a:t>
             </a:fld>
             <a:endParaRPr lang="en-US"/>
           </a:p>
@@ -1251,7 +1253,7 @@
           <a:p>
             <a:fld id="{318E1502-E61F-4BB6-8EE4-8357EE119714}" type="datetimeFigureOut">
               <a:rPr lang="en-US" smtClean="0"/>
-              <a:t>10/03/2017</a:t>
+              <a:t>3/18/2017</a:t>
             </a:fld>
             <a:endParaRPr lang="en-US"/>
           </a:p>
@@ -1618,7 +1620,7 @@
           <a:p>
             <a:fld id="{318E1502-E61F-4BB6-8EE4-8357EE119714}" type="datetimeFigureOut">
               <a:rPr lang="en-US" smtClean="0"/>
-              <a:t>10/03/2017</a:t>
+              <a:t>3/18/2017</a:t>
             </a:fld>
             <a:endParaRPr lang="en-US"/>
           </a:p>
@@ -1736,7 +1738,7 @@
           <a:p>
             <a:fld id="{318E1502-E61F-4BB6-8EE4-8357EE119714}" type="datetimeFigureOut">
               <a:rPr lang="en-US" smtClean="0"/>
-              <a:t>10/03/2017</a:t>
+              <a:t>3/18/2017</a:t>
             </a:fld>
             <a:endParaRPr lang="en-US"/>
           </a:p>
@@ -1831,7 +1833,7 @@
           <a:p>
             <a:fld id="{318E1502-E61F-4BB6-8EE4-8357EE119714}" type="datetimeFigureOut">
               <a:rPr lang="en-US" smtClean="0"/>
-              <a:t>10/03/2017</a:t>
+              <a:t>3/18/2017</a:t>
             </a:fld>
             <a:endParaRPr lang="en-US"/>
           </a:p>
@@ -2108,7 +2110,7 @@
           <a:p>
             <a:fld id="{318E1502-E61F-4BB6-8EE4-8357EE119714}" type="datetimeFigureOut">
               <a:rPr lang="en-US" smtClean="0"/>
-              <a:t>10/03/2017</a:t>
+              <a:t>3/18/2017</a:t>
             </a:fld>
             <a:endParaRPr lang="en-US"/>
           </a:p>
@@ -2361,7 +2363,7 @@
           <a:p>
             <a:fld id="{318E1502-E61F-4BB6-8EE4-8357EE119714}" type="datetimeFigureOut">
               <a:rPr lang="en-US" smtClean="0"/>
-              <a:t>10/03/2017</a:t>
+              <a:t>3/18/2017</a:t>
             </a:fld>
             <a:endParaRPr lang="en-US"/>
           </a:p>
@@ -2574,7 +2576,7 @@
           <a:p>
             <a:fld id="{318E1502-E61F-4BB6-8EE4-8357EE119714}" type="datetimeFigureOut">
               <a:rPr lang="en-US" smtClean="0"/>
-              <a:t>10/03/2017</a:t>
+              <a:t>3/18/2017</a:t>
             </a:fld>
             <a:endParaRPr lang="en-US"/>
           </a:p>
@@ -2981,7 +2983,7 @@
       </p:grpSpPr>
       <p:sp>
         <p:nvSpPr>
-          <p:cNvPr id="5" name="Title 4"/>
+          <p:cNvPr id="2" name="Title 1"/>
           <p:cNvSpPr>
             <a:spLocks noGrp="1"/>
           </p:cNvSpPr>
@@ -2996,7 +2998,7 @@
           <a:p>
             <a:r>
               <a:rPr lang="en-US" dirty="0" smtClean="0"/>
-              <a:t>Home</a:t>
+              <a:t>Home Login</a:t>
             </a:r>
             <a:endParaRPr lang="en-US" dirty="0"/>
           </a:p>
@@ -3004,7 +3006,7 @@
       </p:sp>
       <p:sp>
         <p:nvSpPr>
-          <p:cNvPr id="6" name="Content Placeholder 5"/>
+          <p:cNvPr id="3" name="Content Placeholder 2"/>
           <p:cNvSpPr>
             <a:spLocks noGrp="1"/>
           </p:cNvSpPr>
@@ -3017,35 +3019,40 @@
           <a:bodyPr/>
           <a:lstStyle/>
           <a:p>
-            <a:pPr marL="0" indent="0" algn="ctr">
+            <a:pPr marL="3657600" lvl="8" indent="0">
               <a:buNone/>
             </a:pPr>
             <a:r>
-              <a:rPr lang="en-US" dirty="0" smtClean="0"/>
-              <a:t>Client Address:</a:t>
-            </a:r>
-          </a:p>
-          <a:p>
-            <a:pPr marL="0" indent="0" algn="ctr">
+              <a:rPr lang="en-US" sz="3600" dirty="0" smtClean="0"/>
+              <a:t>Enter User Name</a:t>
+            </a:r>
+          </a:p>
+          <a:p>
+            <a:pPr marL="3657600" lvl="8" indent="0">
               <a:buNone/>
             </a:pPr>
             <a:r>
-              <a:rPr lang="en-US" dirty="0" smtClean="0"/>
-              <a:t>[TEXT AREA]</a:t>
-            </a:r>
+              <a:rPr lang="en-US" sz="3600" dirty="0" smtClean="0"/>
+              <a:t>Enter Password</a:t>
+            </a:r>
+          </a:p>
+          <a:p>
             <a:endParaRPr lang="en-US" dirty="0"/>
           </a:p>
-        </p:txBody>
-      </p:sp>
-      <p:sp>
-        <p:nvSpPr>
-          <p:cNvPr id="7" name="Rounded Rectangle 6"/>
+          <a:p>
+            <a:endParaRPr lang="en-US" dirty="0" smtClean="0"/>
+          </a:p>
+        </p:txBody>
+      </p:sp>
+      <p:sp>
+        <p:nvSpPr>
+          <p:cNvPr id="4" name="Rounded Rectangle 3"/>
           <p:cNvSpPr/>
           <p:nvPr/>
         </p:nvSpPr>
         <p:spPr>
           <a:xfrm>
-            <a:off x="5188974" y="4262284"/>
+            <a:off x="5188974" y="4001294"/>
             <a:ext cx="1814052" cy="501446"/>
           </a:xfrm>
           <a:prstGeom prst="roundRect">
@@ -3075,7 +3082,51 @@
             <a:pPr algn="ctr"/>
             <a:r>
               <a:rPr lang="en-US" b="1" dirty="0" smtClean="0"/>
-              <a:t>NEXT</a:t>
+              <a:t>Login</a:t>
+            </a:r>
+            <a:endParaRPr lang="en-US" b="1" dirty="0"/>
+          </a:p>
+        </p:txBody>
+      </p:sp>
+      <p:sp>
+        <p:nvSpPr>
+          <p:cNvPr id="5" name="Rounded Rectangle 4"/>
+          <p:cNvSpPr/>
+          <p:nvPr/>
+        </p:nvSpPr>
+        <p:spPr>
+          <a:xfrm>
+            <a:off x="5188974" y="4637677"/>
+            <a:ext cx="1814052" cy="501446"/>
+          </a:xfrm>
+          <a:prstGeom prst="roundRect">
+            <a:avLst/>
+          </a:prstGeom>
+        </p:spPr>
+        <p:style>
+          <a:lnRef idx="2">
+            <a:schemeClr val="accent1">
+              <a:shade val="50000"/>
+            </a:schemeClr>
+          </a:lnRef>
+          <a:fillRef idx="1">
+            <a:schemeClr val="accent1"/>
+          </a:fillRef>
+          <a:effectRef idx="0">
+            <a:schemeClr val="accent1"/>
+          </a:effectRef>
+          <a:fontRef idx="minor">
+            <a:schemeClr val="lt1"/>
+          </a:fontRef>
+        </p:style>
+        <p:txBody>
+          <a:bodyPr rtlCol="0" anchor="ctr"/>
+          <a:lstStyle/>
+          <a:p>
+            <a:pPr algn="ctr"/>
+            <a:r>
+              <a:rPr lang="en-US" b="1" dirty="0" smtClean="0"/>
+              <a:t>Signup</a:t>
             </a:r>
             <a:endParaRPr lang="en-US" b="1" dirty="0"/>
           </a:p>
@@ -3084,7 +3135,7 @@
     </p:spTree>
     <p:extLst>
       <p:ext uri="{BB962C8B-B14F-4D97-AF65-F5344CB8AC3E}">
-        <p14:creationId xmlns:p14="http://schemas.microsoft.com/office/powerpoint/2010/main" val="4211373576"/>
+        <p14:creationId xmlns:p14="http://schemas.microsoft.com/office/powerpoint/2010/main" val="1226340030"/>
       </p:ext>
     </p:extLst>
   </p:cSld>
@@ -3135,7 +3186,7 @@
           <a:p>
             <a:r>
               <a:rPr lang="en-US" dirty="0" smtClean="0"/>
-              <a:t>Total Quantity of this Door Type:</a:t>
+              <a:t>Lock Type</a:t>
             </a:r>
             <a:endParaRPr lang="en-US" dirty="0"/>
           </a:p>
@@ -3156,44 +3207,18 @@
           <a:bodyPr/>
           <a:lstStyle/>
           <a:p>
-            <a:pPr marL="0" indent="0" algn="ctr">
+            <a:pPr marL="0" indent="0">
               <a:buNone/>
             </a:pPr>
-            <a:endParaRPr lang="en-US" dirty="0" smtClean="0"/>
-          </a:p>
-          <a:p>
-            <a:pPr marL="0" indent="0" algn="ctr">
-              <a:buNone/>
-            </a:pPr>
             <a:r>
               <a:rPr lang="en-US" dirty="0" smtClean="0"/>
-              <a:t>Enter </a:t>
-            </a:r>
-            <a:r>
-              <a:rPr lang="en-US" dirty="0" err="1" smtClean="0"/>
-              <a:t>Qty</a:t>
+              <a:t>Select </a:t>
             </a:r>
             <a:r>
               <a:rPr lang="en-US" dirty="0" smtClean="0"/>
-              <a:t>: </a:t>
-            </a:r>
-            <a:r>
-              <a:rPr lang="en-US" dirty="0" smtClean="0">
-                <a:solidFill>
-                  <a:schemeClr val="bg1">
-                    <a:lumMod val="65000"/>
-                  </a:schemeClr>
-                </a:solidFill>
-              </a:rPr>
-              <a:t>1</a:t>
-            </a:r>
-            <a:endParaRPr lang="en-US" dirty="0">
-              <a:solidFill>
-                <a:schemeClr val="bg1">
-                  <a:lumMod val="65000"/>
-                </a:schemeClr>
-              </a:solidFill>
-            </a:endParaRPr>
+              <a:t>Type:</a:t>
+            </a:r>
+            <a:endParaRPr lang="en-US" dirty="0"/>
           </a:p>
         </p:txBody>
       </p:sp>
@@ -3243,6 +3268,66 @@
       </p:sp>
       <p:sp>
         <p:nvSpPr>
+          <p:cNvPr id="3" name="TextBox 2"/>
+          <p:cNvSpPr txBox="1"/>
+          <p:nvPr/>
+        </p:nvSpPr>
+        <p:spPr>
+          <a:xfrm>
+            <a:off x="2268795" y="3097161"/>
+            <a:ext cx="4580549" cy="1200329"/>
+          </a:xfrm>
+          <a:prstGeom prst="rect">
+            <a:avLst/>
+          </a:prstGeom>
+          <a:noFill/>
+        </p:spPr>
+        <p:txBody>
+          <a:bodyPr wrap="none" rtlCol="0">
+            <a:spAutoFit/>
+          </a:bodyPr>
+          <a:lstStyle/>
+          <a:p>
+            <a:pPr marL="285750" indent="-285750">
+              <a:buFont typeface="Arial" panose="020B0604020202020204" pitchFamily="34" charset="0"/>
+              <a:buChar char="•"/>
+            </a:pPr>
+            <a:r>
+              <a:rPr lang="en-US" dirty="0" smtClean="0"/>
+              <a:t>Standard Locking (light duty, price inclusive)</a:t>
+            </a:r>
+          </a:p>
+          <a:p>
+            <a:pPr marL="285750" indent="-285750">
+              <a:buFont typeface="Arial" panose="020B0604020202020204" pitchFamily="34" charset="0"/>
+              <a:buChar char="•"/>
+            </a:pPr>
+            <a:r>
+              <a:rPr lang="en-US" dirty="0" smtClean="0"/>
+              <a:t>Heavy Duty Locking (Recommended)</a:t>
+            </a:r>
+          </a:p>
+          <a:p>
+            <a:pPr marL="285750" indent="-285750">
+              <a:buFont typeface="Arial" panose="020B0604020202020204" pitchFamily="34" charset="0"/>
+              <a:buChar char="•"/>
+            </a:pPr>
+            <a:r>
+              <a:rPr lang="en-US" dirty="0" smtClean="0"/>
+              <a:t>Panic Bar Lock</a:t>
+            </a:r>
+          </a:p>
+          <a:p>
+            <a:pPr marL="285750" indent="-285750">
+              <a:buFont typeface="Arial" panose="020B0604020202020204" pitchFamily="34" charset="0"/>
+              <a:buChar char="•"/>
+            </a:pPr>
+            <a:endParaRPr lang="en-US" dirty="0" smtClean="0"/>
+          </a:p>
+        </p:txBody>
+      </p:sp>
+      <p:sp>
+        <p:nvSpPr>
           <p:cNvPr id="8" name="Rounded Rectangle 7"/>
           <p:cNvSpPr/>
           <p:nvPr/>
@@ -3280,6 +3365,664 @@
             <a:r>
               <a:rPr lang="en-US" b="1" dirty="0" smtClean="0"/>
               <a:t>BACK</a:t>
+            </a:r>
+            <a:endParaRPr lang="en-US" b="1" dirty="0"/>
+          </a:p>
+        </p:txBody>
+      </p:sp>
+      <p:sp>
+        <p:nvSpPr>
+          <p:cNvPr id="11" name="Rounded Rectangle 10"/>
+          <p:cNvSpPr/>
+          <p:nvPr/>
+        </p:nvSpPr>
+        <p:spPr>
+          <a:xfrm>
+            <a:off x="8185355" y="2772696"/>
+            <a:ext cx="3451121" cy="1347481"/>
+          </a:xfrm>
+          <a:prstGeom prst="roundRect">
+            <a:avLst/>
+          </a:prstGeom>
+        </p:spPr>
+        <p:style>
+          <a:lnRef idx="2">
+            <a:schemeClr val="accent1">
+              <a:shade val="50000"/>
+            </a:schemeClr>
+          </a:lnRef>
+          <a:fillRef idx="1">
+            <a:schemeClr val="accent1"/>
+          </a:fillRef>
+          <a:effectRef idx="0">
+            <a:schemeClr val="accent1"/>
+          </a:effectRef>
+          <a:fontRef idx="minor">
+            <a:schemeClr val="lt1"/>
+          </a:fontRef>
+        </p:style>
+        <p:txBody>
+          <a:bodyPr rtlCol="0" anchor="ctr"/>
+          <a:lstStyle/>
+          <a:p>
+            <a:r>
+              <a:rPr lang="en-US" b="1" dirty="0"/>
+              <a:t>Total Costs</a:t>
+            </a:r>
+            <a:r>
+              <a:rPr lang="en-US" b="1" dirty="0" smtClean="0"/>
+              <a:t>:</a:t>
+            </a:r>
+          </a:p>
+          <a:p>
+            <a:r>
+              <a:rPr lang="en-US" sz="1600" dirty="0"/>
+              <a:t>Basic Door 1000 x 2100 – </a:t>
+            </a:r>
+            <a:r>
+              <a:rPr lang="en-US" sz="1600" dirty="0" err="1"/>
+              <a:t>Rs</a:t>
+            </a:r>
+            <a:r>
+              <a:rPr lang="en-US" sz="1600" dirty="0"/>
+              <a:t>. </a:t>
+            </a:r>
+            <a:r>
+              <a:rPr lang="en-US" sz="1600" dirty="0" smtClean="0"/>
+              <a:t>45,000/-</a:t>
+            </a:r>
+          </a:p>
+          <a:p>
+            <a:r>
+              <a:rPr lang="en-US" sz="1600" dirty="0"/>
+              <a:t>View Glass 21”x40” – </a:t>
+            </a:r>
+            <a:r>
+              <a:rPr lang="en-US" sz="1600" dirty="0" smtClean="0"/>
+              <a:t>	</a:t>
+            </a:r>
+            <a:r>
+              <a:rPr lang="en-US" sz="1600" dirty="0" err="1" smtClean="0"/>
+              <a:t>Rs</a:t>
+            </a:r>
+            <a:r>
+              <a:rPr lang="en-US" sz="1600" dirty="0"/>
+              <a:t>. 2,500</a:t>
+            </a:r>
+            <a:r>
+              <a:rPr lang="en-US" sz="1600" dirty="0" smtClean="0"/>
+              <a:t>/-</a:t>
+            </a:r>
+          </a:p>
+          <a:p>
+            <a:r>
+              <a:rPr lang="en-US" sz="1600" dirty="0"/>
+              <a:t>Rubber Seal	</a:t>
+            </a:r>
+            <a:r>
+              <a:rPr lang="en-US" sz="1600" dirty="0" err="1"/>
+              <a:t>Rs</a:t>
+            </a:r>
+            <a:r>
+              <a:rPr lang="en-US" sz="1600" dirty="0"/>
+              <a:t>. 2,500</a:t>
+            </a:r>
+            <a:r>
+              <a:rPr lang="en-US" sz="1600" dirty="0" smtClean="0"/>
+              <a:t>/-</a:t>
+            </a:r>
+            <a:endParaRPr lang="en-US" sz="1600" dirty="0"/>
+          </a:p>
+        </p:txBody>
+      </p:sp>
+      <p:sp>
+        <p:nvSpPr>
+          <p:cNvPr id="12" name="Rounded Rectangle 11"/>
+          <p:cNvSpPr/>
+          <p:nvPr/>
+        </p:nvSpPr>
+        <p:spPr>
+          <a:xfrm>
+            <a:off x="8185354" y="4120178"/>
+            <a:ext cx="3451121" cy="643552"/>
+          </a:xfrm>
+          <a:prstGeom prst="roundRect">
+            <a:avLst/>
+          </a:prstGeom>
+        </p:spPr>
+        <p:style>
+          <a:lnRef idx="2">
+            <a:schemeClr val="accent6">
+              <a:shade val="50000"/>
+            </a:schemeClr>
+          </a:lnRef>
+          <a:fillRef idx="1">
+            <a:schemeClr val="accent6"/>
+          </a:fillRef>
+          <a:effectRef idx="0">
+            <a:schemeClr val="accent6"/>
+          </a:effectRef>
+          <a:fontRef idx="minor">
+            <a:schemeClr val="lt1"/>
+          </a:fontRef>
+        </p:style>
+        <p:txBody>
+          <a:bodyPr rtlCol="0" anchor="ctr"/>
+          <a:lstStyle/>
+          <a:p>
+            <a:r>
+              <a:rPr lang="en-US" sz="1600" dirty="0" smtClean="0"/>
+              <a:t>Standard Locking	</a:t>
+            </a:r>
+            <a:r>
+              <a:rPr lang="en-US" sz="1600" dirty="0" err="1" smtClean="0"/>
+              <a:t>Rs</a:t>
+            </a:r>
+            <a:r>
+              <a:rPr lang="en-US" sz="1600" dirty="0"/>
+              <a:t>. </a:t>
+            </a:r>
+            <a:r>
+              <a:rPr lang="en-US" sz="1600" dirty="0" smtClean="0"/>
+              <a:t>2,500/-</a:t>
+            </a:r>
+            <a:endParaRPr lang="en-US" sz="1600" dirty="0"/>
+          </a:p>
+        </p:txBody>
+      </p:sp>
+    </p:spTree>
+    <p:extLst>
+      <p:ext uri="{BB962C8B-B14F-4D97-AF65-F5344CB8AC3E}">
+        <p14:creationId xmlns:p14="http://schemas.microsoft.com/office/powerpoint/2010/main" val="2172344198"/>
+      </p:ext>
+    </p:extLst>
+  </p:cSld>
+  <p:clrMapOvr>
+    <a:masterClrMapping/>
+  </p:clrMapOvr>
+  <p:timing>
+    <p:tnLst>
+      <p:par>
+        <p:cTn id="1" dur="indefinite" restart="never" nodeType="tmRoot"/>
+      </p:par>
+    </p:tnLst>
+  </p:timing>
+</p:sld>
+</file>
+
+<file path=ppt/slides/slide11.xml><?xml version="1.0" encoding="utf-8"?>
+<p:sld xmlns:a="http://schemas.openxmlformats.org/drawingml/2006/main" xmlns:r="http://schemas.openxmlformats.org/officeDocument/2006/relationships" xmlns:p="http://schemas.openxmlformats.org/presentationml/2006/main">
+  <p:cSld>
+    <p:spTree>
+      <p:nvGrpSpPr>
+        <p:cNvPr id="1" name=""/>
+        <p:cNvGrpSpPr/>
+        <p:nvPr/>
+      </p:nvGrpSpPr>
+      <p:grpSpPr>
+        <a:xfrm>
+          <a:off x="0" y="0"/>
+          <a:ext cx="0" cy="0"/>
+          <a:chOff x="0" y="0"/>
+          <a:chExt cx="0" cy="0"/>
+        </a:xfrm>
+      </p:grpSpPr>
+      <p:sp>
+        <p:nvSpPr>
+          <p:cNvPr id="5" name="Title 4"/>
+          <p:cNvSpPr>
+            <a:spLocks noGrp="1"/>
+          </p:cNvSpPr>
+          <p:nvPr>
+            <p:ph type="title"/>
+          </p:nvPr>
+        </p:nvSpPr>
+        <p:spPr/>
+        <p:txBody>
+          <a:bodyPr/>
+          <a:lstStyle/>
+          <a:p>
+            <a:r>
+              <a:rPr lang="en-US" dirty="0" smtClean="0"/>
+              <a:t>Heavy Duty Door Closer</a:t>
+            </a:r>
+            <a:endParaRPr lang="en-US" dirty="0"/>
+          </a:p>
+        </p:txBody>
+      </p:sp>
+      <p:sp>
+        <p:nvSpPr>
+          <p:cNvPr id="6" name="Content Placeholder 5"/>
+          <p:cNvSpPr>
+            <a:spLocks noGrp="1"/>
+          </p:cNvSpPr>
+          <p:nvPr>
+            <p:ph idx="1"/>
+          </p:nvPr>
+        </p:nvSpPr>
+        <p:spPr/>
+        <p:txBody>
+          <a:bodyPr/>
+          <a:lstStyle/>
+          <a:p>
+            <a:pPr marL="0" indent="0" algn="ctr">
+              <a:buNone/>
+            </a:pPr>
+            <a:endParaRPr lang="en-US" dirty="0" smtClean="0"/>
+          </a:p>
+          <a:p>
+            <a:pPr marL="0" indent="0" algn="ctr">
+              <a:buNone/>
+            </a:pPr>
+            <a:r>
+              <a:rPr lang="en-US" dirty="0" smtClean="0"/>
+              <a:t>Heavy </a:t>
+            </a:r>
+            <a:r>
+              <a:rPr lang="en-US" dirty="0" smtClean="0"/>
+              <a:t>Duty Door </a:t>
+            </a:r>
+            <a:r>
+              <a:rPr lang="en-US" dirty="0" smtClean="0"/>
+              <a:t>Closer Required?</a:t>
+            </a:r>
+          </a:p>
+          <a:p>
+            <a:pPr marL="0" indent="0" algn="ctr">
+              <a:buNone/>
+            </a:pPr>
+            <a:r>
+              <a:rPr lang="en-US" dirty="0" smtClean="0"/>
+              <a:t>Yes</a:t>
+            </a:r>
+          </a:p>
+          <a:p>
+            <a:pPr marL="0" indent="0" algn="ctr">
+              <a:buNone/>
+            </a:pPr>
+            <a:r>
+              <a:rPr lang="en-US" dirty="0" smtClean="0"/>
+              <a:t>No</a:t>
+            </a:r>
+            <a:endParaRPr lang="en-US" dirty="0"/>
+          </a:p>
+        </p:txBody>
+      </p:sp>
+      <p:sp>
+        <p:nvSpPr>
+          <p:cNvPr id="7" name="Rounded Rectangle 6"/>
+          <p:cNvSpPr/>
+          <p:nvPr/>
+        </p:nvSpPr>
+        <p:spPr>
+          <a:xfrm>
+            <a:off x="5188974" y="4262284"/>
+            <a:ext cx="1814052" cy="501446"/>
+          </a:xfrm>
+          <a:prstGeom prst="roundRect">
+            <a:avLst/>
+          </a:prstGeom>
+        </p:spPr>
+        <p:style>
+          <a:lnRef idx="2">
+            <a:schemeClr val="accent1">
+              <a:shade val="50000"/>
+            </a:schemeClr>
+          </a:lnRef>
+          <a:fillRef idx="1">
+            <a:schemeClr val="accent1"/>
+          </a:fillRef>
+          <a:effectRef idx="0">
+            <a:schemeClr val="accent1"/>
+          </a:effectRef>
+          <a:fontRef idx="minor">
+            <a:schemeClr val="lt1"/>
+          </a:fontRef>
+        </p:style>
+        <p:txBody>
+          <a:bodyPr rtlCol="0" anchor="ctr"/>
+          <a:lstStyle/>
+          <a:p>
+            <a:pPr algn="ctr"/>
+            <a:r>
+              <a:rPr lang="en-US" b="1" dirty="0" smtClean="0"/>
+              <a:t>NEXT</a:t>
+            </a:r>
+            <a:endParaRPr lang="en-US" b="1" dirty="0"/>
+          </a:p>
+        </p:txBody>
+      </p:sp>
+      <p:sp>
+        <p:nvSpPr>
+          <p:cNvPr id="10" name="Rounded Rectangle 9"/>
+          <p:cNvSpPr/>
+          <p:nvPr/>
+        </p:nvSpPr>
+        <p:spPr>
+          <a:xfrm>
+            <a:off x="4611395" y="5058075"/>
+            <a:ext cx="2745658" cy="501446"/>
+          </a:xfrm>
+          <a:prstGeom prst="roundRect">
+            <a:avLst/>
+          </a:prstGeom>
+        </p:spPr>
+        <p:style>
+          <a:lnRef idx="2">
+            <a:schemeClr val="accent3">
+              <a:shade val="50000"/>
+            </a:schemeClr>
+          </a:lnRef>
+          <a:fillRef idx="1">
+            <a:schemeClr val="accent3"/>
+          </a:fillRef>
+          <a:effectRef idx="0">
+            <a:schemeClr val="accent3"/>
+          </a:effectRef>
+          <a:fontRef idx="minor">
+            <a:schemeClr val="lt1"/>
+          </a:fontRef>
+        </p:style>
+        <p:txBody>
+          <a:bodyPr rtlCol="0" anchor="ctr"/>
+          <a:lstStyle/>
+          <a:p>
+            <a:pPr algn="ctr"/>
+            <a:r>
+              <a:rPr lang="en-US" b="1" dirty="0" smtClean="0"/>
+              <a:t>Not Required</a:t>
+            </a:r>
+            <a:endParaRPr lang="en-US" b="1" dirty="0"/>
+          </a:p>
+        </p:txBody>
+      </p:sp>
+      <p:sp>
+        <p:nvSpPr>
+          <p:cNvPr id="11" name="Rounded Rectangle 10"/>
+          <p:cNvSpPr/>
+          <p:nvPr/>
+        </p:nvSpPr>
+        <p:spPr>
+          <a:xfrm>
+            <a:off x="1695147" y="4262284"/>
+            <a:ext cx="1814052" cy="501446"/>
+          </a:xfrm>
+          <a:prstGeom prst="roundRect">
+            <a:avLst/>
+          </a:prstGeom>
+        </p:spPr>
+        <p:style>
+          <a:lnRef idx="2">
+            <a:schemeClr val="accent1">
+              <a:shade val="50000"/>
+            </a:schemeClr>
+          </a:lnRef>
+          <a:fillRef idx="1">
+            <a:schemeClr val="accent1"/>
+          </a:fillRef>
+          <a:effectRef idx="0">
+            <a:schemeClr val="accent1"/>
+          </a:effectRef>
+          <a:fontRef idx="minor">
+            <a:schemeClr val="lt1"/>
+          </a:fontRef>
+        </p:style>
+        <p:txBody>
+          <a:bodyPr rtlCol="0" anchor="ctr"/>
+          <a:lstStyle/>
+          <a:p>
+            <a:pPr algn="ctr"/>
+            <a:r>
+              <a:rPr lang="en-US" b="1" dirty="0" smtClean="0"/>
+              <a:t>BACK</a:t>
+            </a:r>
+            <a:endParaRPr lang="en-US" b="1" dirty="0"/>
+          </a:p>
+        </p:txBody>
+      </p:sp>
+    </p:spTree>
+    <p:extLst>
+      <p:ext uri="{BB962C8B-B14F-4D97-AF65-F5344CB8AC3E}">
+        <p14:creationId xmlns:p14="http://schemas.microsoft.com/office/powerpoint/2010/main" val="3101390788"/>
+      </p:ext>
+    </p:extLst>
+  </p:cSld>
+  <p:clrMapOvr>
+    <a:masterClrMapping/>
+  </p:clrMapOvr>
+  <p:timing>
+    <p:tnLst>
+      <p:par>
+        <p:cTn id="1" dur="indefinite" restart="never" nodeType="tmRoot"/>
+      </p:par>
+    </p:tnLst>
+  </p:timing>
+</p:sld>
+</file>
+
+<file path=ppt/slides/slide12.xml><?xml version="1.0" encoding="utf-8"?>
+<p:sld xmlns:a="http://schemas.openxmlformats.org/drawingml/2006/main" xmlns:r="http://schemas.openxmlformats.org/officeDocument/2006/relationships" xmlns:p="http://schemas.openxmlformats.org/presentationml/2006/main">
+  <p:cSld>
+    <p:spTree>
+      <p:nvGrpSpPr>
+        <p:cNvPr id="1" name=""/>
+        <p:cNvGrpSpPr/>
+        <p:nvPr/>
+      </p:nvGrpSpPr>
+      <p:grpSpPr>
+        <a:xfrm>
+          <a:off x="0" y="0"/>
+          <a:ext cx="0" cy="0"/>
+          <a:chOff x="0" y="0"/>
+          <a:chExt cx="0" cy="0"/>
+        </a:xfrm>
+      </p:grpSpPr>
+      <p:sp>
+        <p:nvSpPr>
+          <p:cNvPr id="5" name="Title 4"/>
+          <p:cNvSpPr>
+            <a:spLocks noGrp="1"/>
+          </p:cNvSpPr>
+          <p:nvPr>
+            <p:ph type="title"/>
+          </p:nvPr>
+        </p:nvSpPr>
+        <p:spPr/>
+        <p:txBody>
+          <a:bodyPr/>
+          <a:lstStyle/>
+          <a:p>
+            <a:r>
+              <a:rPr lang="en-US" dirty="0" smtClean="0"/>
+              <a:t>Quantity:</a:t>
+            </a:r>
+            <a:endParaRPr lang="en-US" dirty="0"/>
+          </a:p>
+        </p:txBody>
+      </p:sp>
+      <p:sp>
+        <p:nvSpPr>
+          <p:cNvPr id="6" name="Content Placeholder 5"/>
+          <p:cNvSpPr>
+            <a:spLocks noGrp="1"/>
+          </p:cNvSpPr>
+          <p:nvPr>
+            <p:ph idx="1"/>
+          </p:nvPr>
+        </p:nvSpPr>
+        <p:spPr/>
+        <p:txBody>
+          <a:bodyPr/>
+          <a:lstStyle/>
+          <a:p>
+            <a:pPr marL="0" indent="0" algn="ctr">
+              <a:buNone/>
+            </a:pPr>
+            <a:endParaRPr lang="en-US" dirty="0" smtClean="0"/>
+          </a:p>
+          <a:p>
+            <a:pPr marL="0" indent="0" algn="ctr">
+              <a:buNone/>
+            </a:pPr>
+            <a:r>
+              <a:rPr lang="en-US" dirty="0" smtClean="0"/>
+              <a:t>Enter </a:t>
+            </a:r>
+            <a:r>
+              <a:rPr lang="en-US" dirty="0" err="1" smtClean="0"/>
+              <a:t>Qty</a:t>
+            </a:r>
+            <a:r>
+              <a:rPr lang="en-US" dirty="0" smtClean="0"/>
+              <a:t>: </a:t>
+            </a:r>
+            <a:r>
+              <a:rPr lang="en-US" dirty="0" smtClean="0">
+                <a:solidFill>
+                  <a:schemeClr val="bg1">
+                    <a:lumMod val="65000"/>
+                  </a:schemeClr>
+                </a:solidFill>
+              </a:rPr>
+              <a:t>1</a:t>
+            </a:r>
+            <a:endParaRPr lang="en-US" dirty="0">
+              <a:solidFill>
+                <a:schemeClr val="bg1">
+                  <a:lumMod val="65000"/>
+                </a:schemeClr>
+              </a:solidFill>
+            </a:endParaRPr>
+          </a:p>
+        </p:txBody>
+      </p:sp>
+      <p:sp>
+        <p:nvSpPr>
+          <p:cNvPr id="7" name="Rounded Rectangle 6"/>
+          <p:cNvSpPr/>
+          <p:nvPr/>
+        </p:nvSpPr>
+        <p:spPr>
+          <a:xfrm>
+            <a:off x="5188974" y="4913415"/>
+            <a:ext cx="1814052" cy="501446"/>
+          </a:xfrm>
+          <a:prstGeom prst="roundRect">
+            <a:avLst/>
+          </a:prstGeom>
+        </p:spPr>
+        <p:style>
+          <a:lnRef idx="2">
+            <a:schemeClr val="accent1">
+              <a:shade val="50000"/>
+            </a:schemeClr>
+          </a:lnRef>
+          <a:fillRef idx="1">
+            <a:schemeClr val="accent1"/>
+          </a:fillRef>
+          <a:effectRef idx="0">
+            <a:schemeClr val="accent1"/>
+          </a:effectRef>
+          <a:fontRef idx="minor">
+            <a:schemeClr val="lt1"/>
+          </a:fontRef>
+        </p:style>
+        <p:txBody>
+          <a:bodyPr rtlCol="0" anchor="ctr"/>
+          <a:lstStyle/>
+          <a:p>
+            <a:pPr algn="ctr"/>
+            <a:r>
+              <a:rPr lang="en-US" b="1" dirty="0" smtClean="0"/>
+              <a:t>FINISH</a:t>
+            </a:r>
+            <a:endParaRPr lang="en-US" b="1" dirty="0"/>
+          </a:p>
+        </p:txBody>
+      </p:sp>
+      <p:sp>
+        <p:nvSpPr>
+          <p:cNvPr id="8" name="Rounded Rectangle 7"/>
+          <p:cNvSpPr/>
+          <p:nvPr/>
+        </p:nvSpPr>
+        <p:spPr>
+          <a:xfrm>
+            <a:off x="1695147" y="4262284"/>
+            <a:ext cx="1814052" cy="501446"/>
+          </a:xfrm>
+          <a:prstGeom prst="roundRect">
+            <a:avLst/>
+          </a:prstGeom>
+        </p:spPr>
+        <p:style>
+          <a:lnRef idx="2">
+            <a:schemeClr val="accent1">
+              <a:shade val="50000"/>
+            </a:schemeClr>
+          </a:lnRef>
+          <a:fillRef idx="1">
+            <a:schemeClr val="accent1"/>
+          </a:fillRef>
+          <a:effectRef idx="0">
+            <a:schemeClr val="accent1"/>
+          </a:effectRef>
+          <a:fontRef idx="minor">
+            <a:schemeClr val="lt1"/>
+          </a:fontRef>
+        </p:style>
+        <p:txBody>
+          <a:bodyPr rtlCol="0" anchor="ctr"/>
+          <a:lstStyle/>
+          <a:p>
+            <a:pPr algn="ctr"/>
+            <a:r>
+              <a:rPr lang="en-US" b="1" dirty="0" smtClean="0"/>
+              <a:t>BACK</a:t>
+            </a:r>
+            <a:endParaRPr lang="en-US" b="1" dirty="0"/>
+          </a:p>
+        </p:txBody>
+      </p:sp>
+      <p:sp>
+        <p:nvSpPr>
+          <p:cNvPr id="11" name="Rounded Rectangle 10"/>
+          <p:cNvSpPr/>
+          <p:nvPr/>
+        </p:nvSpPr>
+        <p:spPr>
+          <a:xfrm>
+            <a:off x="5188974" y="4232788"/>
+            <a:ext cx="1814052" cy="501446"/>
+          </a:xfrm>
+          <a:prstGeom prst="roundRect">
+            <a:avLst/>
+          </a:prstGeom>
+        </p:spPr>
+        <p:style>
+          <a:lnRef idx="2">
+            <a:schemeClr val="accent1">
+              <a:shade val="50000"/>
+            </a:schemeClr>
+          </a:lnRef>
+          <a:fillRef idx="1">
+            <a:schemeClr val="accent1"/>
+          </a:fillRef>
+          <a:effectRef idx="0">
+            <a:schemeClr val="accent1"/>
+          </a:effectRef>
+          <a:fontRef idx="minor">
+            <a:schemeClr val="lt1"/>
+          </a:fontRef>
+        </p:style>
+        <p:txBody>
+          <a:bodyPr rtlCol="0" anchor="ctr"/>
+          <a:lstStyle/>
+          <a:p>
+            <a:pPr algn="ctr"/>
+            <a:r>
+              <a:rPr lang="en-US" b="1" dirty="0" smtClean="0"/>
+              <a:t>Add New Door</a:t>
             </a:r>
             <a:endParaRPr lang="en-US" b="1" dirty="0"/>
           </a:p>
@@ -3305,7 +4048,7 @@
 </p:sld>
 </file>
 
-<file path=ppt/slides/slide11.xml><?xml version="1.0" encoding="utf-8"?>
+<file path=ppt/slides/slide13.xml><?xml version="1.0" encoding="utf-8"?>
 <p:sld xmlns:a="http://schemas.openxmlformats.org/drawingml/2006/main" xmlns:r="http://schemas.openxmlformats.org/officeDocument/2006/relationships" xmlns:p="http://schemas.openxmlformats.org/presentationml/2006/main">
   <p:cSld>
     <p:spTree>
@@ -3504,7 +4247,7 @@
       </p:grpSpPr>
       <p:sp>
         <p:nvSpPr>
-          <p:cNvPr id="5" name="Title 4"/>
+          <p:cNvPr id="2" name="Title 1"/>
           <p:cNvSpPr>
             <a:spLocks noGrp="1"/>
           </p:cNvSpPr>
@@ -3519,7 +4262,7 @@
           <a:p>
             <a:r>
               <a:rPr lang="en-US" dirty="0" smtClean="0"/>
-              <a:t>Select Units</a:t>
+              <a:t>Signup</a:t>
             </a:r>
             <a:endParaRPr lang="en-US" dirty="0"/>
           </a:p>
@@ -3527,7 +4270,7 @@
       </p:sp>
       <p:sp>
         <p:nvSpPr>
-          <p:cNvPr id="6" name="Content Placeholder 5"/>
+          <p:cNvPr id="3" name="Content Placeholder 2"/>
           <p:cNvSpPr>
             <a:spLocks noGrp="1"/>
           </p:cNvSpPr>
@@ -3540,32 +4283,51 @@
           <a:bodyPr/>
           <a:lstStyle/>
           <a:p>
-            <a:pPr marL="0" indent="0" algn="ctr">
+            <a:pPr marL="3657600" lvl="8" indent="0">
               <a:buNone/>
             </a:pPr>
-            <a:endParaRPr lang="en-US" dirty="0" smtClean="0"/>
-          </a:p>
-          <a:p>
-            <a:pPr marL="0" indent="0" algn="ctr">
+            <a:r>
+              <a:rPr lang="en-US" sz="3600" dirty="0"/>
+              <a:t>Enter User Name</a:t>
+            </a:r>
+          </a:p>
+          <a:p>
+            <a:pPr marL="3657600" lvl="8" indent="0">
               <a:buNone/>
             </a:pPr>
             <a:r>
-              <a:rPr lang="en-US" dirty="0" smtClean="0"/>
-              <a:t>Select Units</a:t>
-            </a:r>
+              <a:rPr lang="en-US" sz="3600" dirty="0"/>
+              <a:t>Enter </a:t>
+            </a:r>
+            <a:r>
+              <a:rPr lang="en-US" sz="3600" dirty="0" smtClean="0"/>
+              <a:t>Password</a:t>
+            </a:r>
+          </a:p>
+          <a:p>
+            <a:pPr marL="3657600" lvl="8" indent="0">
+              <a:buNone/>
+            </a:pPr>
+            <a:r>
+              <a:rPr lang="en-US" sz="3600" dirty="0" smtClean="0"/>
+              <a:t>Enter Password Again</a:t>
+            </a:r>
+            <a:endParaRPr lang="en-US" sz="3600" dirty="0"/>
+          </a:p>
+          <a:p>
             <a:endParaRPr lang="en-US" dirty="0"/>
           </a:p>
         </p:txBody>
       </p:sp>
       <p:sp>
         <p:nvSpPr>
-          <p:cNvPr id="7" name="Rounded Rectangle 6"/>
+          <p:cNvPr id="4" name="Rounded Rectangle 3"/>
           <p:cNvSpPr/>
           <p:nvPr/>
         </p:nvSpPr>
         <p:spPr>
           <a:xfrm>
-            <a:off x="5188974" y="4262284"/>
+            <a:off x="5188974" y="4637677"/>
             <a:ext cx="1814052" cy="501446"/>
           </a:xfrm>
           <a:prstGeom prst="roundRect">
@@ -3595,139 +4357,7 @@
             <a:pPr algn="ctr"/>
             <a:r>
               <a:rPr lang="en-US" b="1" dirty="0" smtClean="0"/>
-              <a:t>NEXT</a:t>
-            </a:r>
-            <a:endParaRPr lang="en-US" b="1" dirty="0"/>
-          </a:p>
-        </p:txBody>
-      </p:sp>
-      <p:sp>
-        <p:nvSpPr>
-          <p:cNvPr id="2" name="TextBox 1"/>
-          <p:cNvSpPr txBox="1"/>
-          <p:nvPr/>
-        </p:nvSpPr>
-        <p:spPr>
-          <a:xfrm>
-            <a:off x="5663380" y="3052916"/>
-            <a:ext cx="2330245" cy="923330"/>
-          </a:xfrm>
-          <a:prstGeom prst="rect">
-            <a:avLst/>
-          </a:prstGeom>
-          <a:noFill/>
-        </p:spPr>
-        <p:txBody>
-          <a:bodyPr wrap="square" rtlCol="0">
-            <a:spAutoFit/>
-          </a:bodyPr>
-          <a:lstStyle/>
-          <a:p>
-            <a:pPr marL="285750" indent="-285750">
-              <a:buFont typeface="Arial" panose="020B0604020202020204" pitchFamily="34" charset="0"/>
-              <a:buChar char="•"/>
-            </a:pPr>
-            <a:r>
-              <a:rPr lang="en-US" dirty="0" smtClean="0"/>
-              <a:t>mm</a:t>
-            </a:r>
-          </a:p>
-          <a:p>
-            <a:pPr marL="285750" indent="-285750">
-              <a:buFont typeface="Arial" panose="020B0604020202020204" pitchFamily="34" charset="0"/>
-              <a:buChar char="•"/>
-            </a:pPr>
-            <a:r>
-              <a:rPr lang="en-US" dirty="0" smtClean="0"/>
-              <a:t>Inches</a:t>
-            </a:r>
-          </a:p>
-          <a:p>
-            <a:r>
-              <a:rPr lang="en-US" dirty="0" smtClean="0"/>
-              <a:t>(radio </a:t>
-            </a:r>
-            <a:r>
-              <a:rPr lang="en-US" dirty="0" err="1" smtClean="0"/>
-              <a:t>btns</a:t>
-            </a:r>
-            <a:r>
-              <a:rPr lang="en-US" dirty="0" smtClean="0"/>
-              <a:t>)</a:t>
-            </a:r>
-            <a:endParaRPr lang="en-US" dirty="0"/>
-          </a:p>
-        </p:txBody>
-      </p:sp>
-      <p:sp>
-        <p:nvSpPr>
-          <p:cNvPr id="3" name="TextBox 2"/>
-          <p:cNvSpPr txBox="1"/>
-          <p:nvPr/>
-        </p:nvSpPr>
-        <p:spPr>
-          <a:xfrm>
-            <a:off x="707923" y="6176963"/>
-            <a:ext cx="1708160" cy="369332"/>
-          </a:xfrm>
-          <a:prstGeom prst="rect">
-            <a:avLst/>
-          </a:prstGeom>
-          <a:noFill/>
-        </p:spPr>
-        <p:txBody>
-          <a:bodyPr wrap="none" rtlCol="0">
-            <a:spAutoFit/>
-          </a:bodyPr>
-          <a:lstStyle/>
-          <a:p>
-            <a:r>
-              <a:rPr lang="en-US" b="1" dirty="0" smtClean="0"/>
-              <a:t>Units are in mm</a:t>
-            </a:r>
-            <a:endParaRPr lang="en-US" b="1" dirty="0"/>
-          </a:p>
-        </p:txBody>
-      </p:sp>
-      <p:sp>
-        <p:nvSpPr>
-          <p:cNvPr id="8" name="Rounded Rectangle 7"/>
-          <p:cNvSpPr/>
-          <p:nvPr/>
-        </p:nvSpPr>
-        <p:spPr>
-          <a:xfrm>
-            <a:off x="1695147" y="4262284"/>
-            <a:ext cx="1814052" cy="501446"/>
-          </a:xfrm>
-          <a:prstGeom prst="roundRect">
-            <a:avLst/>
-          </a:prstGeom>
-        </p:spPr>
-        <p:style>
-          <a:lnRef idx="2">
-            <a:schemeClr val="accent1">
-              <a:shade val="50000"/>
-            </a:schemeClr>
-          </a:lnRef>
-          <a:fillRef idx="1">
-            <a:schemeClr val="accent1"/>
-          </a:fillRef>
-          <a:effectRef idx="0">
-            <a:schemeClr val="accent1"/>
-          </a:effectRef>
-          <a:fontRef idx="minor">
-            <a:schemeClr val="lt1"/>
-          </a:fontRef>
-        </p:style>
-        <p:txBody>
-          <a:bodyPr rtlCol="0" anchor="ctr"/>
-          <a:lstStyle/>
-          <a:p>
-            <a:pPr algn="ctr"/>
-            <a:r>
-              <a:rPr lang="en-US" b="1" dirty="0" smtClean="0"/>
-              <a:t>BACK</a:t>
+              <a:t>Signup</a:t>
             </a:r>
             <a:endParaRPr lang="en-US" b="1" dirty="0"/>
           </a:p>
@@ -3736,7 +4366,7 @@
     </p:spTree>
     <p:extLst>
       <p:ext uri="{BB962C8B-B14F-4D97-AF65-F5344CB8AC3E}">
-        <p14:creationId xmlns:p14="http://schemas.microsoft.com/office/powerpoint/2010/main" val="3922175360"/>
+        <p14:creationId xmlns:p14="http://schemas.microsoft.com/office/powerpoint/2010/main" val="1108096989"/>
       </p:ext>
     </p:extLst>
   </p:cSld>
@@ -3787,11 +4417,7 @@
           <a:p>
             <a:r>
               <a:rPr lang="en-US" dirty="0" smtClean="0"/>
-              <a:t>Select Door Type/</a:t>
-            </a:r>
-            <a:r>
-              <a:rPr lang="en-US" dirty="0" err="1" smtClean="0"/>
-              <a:t>FireRating</a:t>
+              <a:t>Home</a:t>
             </a:r>
             <a:endParaRPr lang="en-US" dirty="0"/>
           </a:p>
@@ -3799,40 +4425,14 @@
       </p:sp>
       <p:sp>
         <p:nvSpPr>
-          <p:cNvPr id="6" name="Content Placeholder 5"/>
-          <p:cNvSpPr>
-            <a:spLocks noGrp="1"/>
-          </p:cNvSpPr>
-          <p:nvPr>
-            <p:ph idx="1"/>
-          </p:nvPr>
-        </p:nvSpPr>
-        <p:spPr/>
-        <p:txBody>
-          <a:bodyPr/>
-          <a:lstStyle/>
-          <a:p>
-            <a:pPr marL="0" indent="0" algn="ctr">
-              <a:buNone/>
-            </a:pPr>
-            <a:r>
-              <a:rPr lang="en-US" dirty="0" smtClean="0"/>
-              <a:t>Select Fire Rating</a:t>
-            </a:r>
-            <a:endParaRPr lang="en-US" dirty="0"/>
-          </a:p>
-        </p:txBody>
-      </p:sp>
-      <p:sp>
-        <p:nvSpPr>
-          <p:cNvPr id="7" name="Rounded Rectangle 6"/>
+          <p:cNvPr id="4" name="Rounded Rectangle 3"/>
           <p:cNvSpPr/>
           <p:nvPr/>
         </p:nvSpPr>
         <p:spPr>
           <a:xfrm>
-            <a:off x="5188974" y="4856676"/>
-            <a:ext cx="1814052" cy="501446"/>
+            <a:off x="324465" y="162232"/>
+            <a:ext cx="11562735" cy="427703"/>
           </a:xfrm>
           <a:prstGeom prst="roundRect">
             <a:avLst/>
@@ -3858,153 +4458,260 @@
           <a:bodyPr rtlCol="0" anchor="ctr"/>
           <a:lstStyle/>
           <a:p>
-            <a:pPr algn="ctr"/>
-            <a:r>
-              <a:rPr lang="en-US" b="1" dirty="0" smtClean="0"/>
-              <a:t>NEXT</a:t>
-            </a:r>
-            <a:endParaRPr lang="en-US" b="1" dirty="0"/>
-          </a:p>
-        </p:txBody>
-      </p:sp>
-      <p:sp>
-        <p:nvSpPr>
-          <p:cNvPr id="2" name="TextBox 1"/>
-          <p:cNvSpPr txBox="1"/>
+            <a:r>
+              <a:rPr lang="en-US" dirty="0" smtClean="0"/>
+              <a:t>Hello Muhammad Abbas – Home						Create New Quote - View All</a:t>
+            </a:r>
+            <a:endParaRPr lang="en-US" dirty="0"/>
+          </a:p>
+        </p:txBody>
+      </p:sp>
+      <p:sp>
+        <p:nvSpPr>
+          <p:cNvPr id="8" name="Content Placeholder 5"/>
+          <p:cNvSpPr txBox="1">
+            <a:spLocks/>
+          </p:cNvSpPr>
           <p:nvPr/>
         </p:nvSpPr>
         <p:spPr>
           <a:xfrm>
-            <a:off x="4422057" y="2548985"/>
-            <a:ext cx="4294240" cy="2031325"/>
+            <a:off x="924232" y="1825624"/>
+            <a:ext cx="5181600" cy="1979459"/>
           </a:xfrm>
           <a:prstGeom prst="rect">
             <a:avLst/>
           </a:prstGeom>
-          <a:noFill/>
-        </p:spPr>
-        <p:txBody>
-          <a:bodyPr wrap="square" rtlCol="0">
-            <a:spAutoFit/>
+        </p:spPr>
+        <p:txBody>
+          <a:bodyPr vert="horz" lIns="91440" tIns="45720" rIns="91440" bIns="45720" rtlCol="0">
+            <a:normAutofit fontScale="62500" lnSpcReduction="20000"/>
           </a:bodyPr>
-          <a:lstStyle/>
-          <a:p>
-            <a:pPr marL="285750" indent="-285750">
+          <a:lstStyle>
+            <a:lvl1pPr marL="228600" indent="-228600" algn="l" defTabSz="914400" rtl="0" eaLnBrk="1" latinLnBrk="0" hangingPunct="1">
+              <a:lnSpc>
+                <a:spcPct val="90000"/>
+              </a:lnSpc>
+              <a:spcBef>
+                <a:spcPts val="1000"/>
+              </a:spcBef>
               <a:buFont typeface="Arial" panose="020B0604020202020204" pitchFamily="34" charset="0"/>
               <a:buChar char="•"/>
-            </a:pPr>
-            <a:r>
-              <a:rPr lang="en-US" dirty="0" smtClean="0"/>
-              <a:t>No Rating, std. Metal Door</a:t>
-            </a:r>
-          </a:p>
-          <a:p>
-            <a:pPr marL="285750" indent="-285750">
+              <a:defRPr sz="2800" kern="1200">
+                <a:solidFill>
+                  <a:schemeClr val="tx1"/>
+                </a:solidFill>
+                <a:latin typeface="+mn-lt"/>
+                <a:ea typeface="+mn-ea"/>
+                <a:cs typeface="+mn-cs"/>
+              </a:defRPr>
+            </a:lvl1pPr>
+            <a:lvl2pPr marL="685800" indent="-228600" algn="l" defTabSz="914400" rtl="0" eaLnBrk="1" latinLnBrk="0" hangingPunct="1">
+              <a:lnSpc>
+                <a:spcPct val="90000"/>
+              </a:lnSpc>
+              <a:spcBef>
+                <a:spcPts val="500"/>
+              </a:spcBef>
               <a:buFont typeface="Arial" panose="020B0604020202020204" pitchFamily="34" charset="0"/>
               <a:buChar char="•"/>
-            </a:pPr>
-            <a:r>
-              <a:rPr lang="en-US" dirty="0" smtClean="0"/>
-              <a:t>30 min Fire Rating</a:t>
-            </a:r>
-          </a:p>
-          <a:p>
-            <a:pPr marL="285750" indent="-285750">
+              <a:defRPr sz="2400" kern="1200">
+                <a:solidFill>
+                  <a:schemeClr val="tx1"/>
+                </a:solidFill>
+                <a:latin typeface="+mn-lt"/>
+                <a:ea typeface="+mn-ea"/>
+                <a:cs typeface="+mn-cs"/>
+              </a:defRPr>
+            </a:lvl2pPr>
+            <a:lvl3pPr marL="1143000" indent="-228600" algn="l" defTabSz="914400" rtl="0" eaLnBrk="1" latinLnBrk="0" hangingPunct="1">
+              <a:lnSpc>
+                <a:spcPct val="90000"/>
+              </a:lnSpc>
+              <a:spcBef>
+                <a:spcPts val="500"/>
+              </a:spcBef>
               <a:buFont typeface="Arial" panose="020B0604020202020204" pitchFamily="34" charset="0"/>
               <a:buChar char="•"/>
-            </a:pPr>
-            <a:r>
-              <a:rPr lang="en-US" dirty="0" smtClean="0"/>
-              <a:t>60 min Fire Rated</a:t>
-            </a:r>
-          </a:p>
-          <a:p>
-            <a:pPr marL="285750" indent="-285750">
+              <a:defRPr sz="2000" kern="1200">
+                <a:solidFill>
+                  <a:schemeClr val="tx1"/>
+                </a:solidFill>
+                <a:latin typeface="+mn-lt"/>
+                <a:ea typeface="+mn-ea"/>
+                <a:cs typeface="+mn-cs"/>
+              </a:defRPr>
+            </a:lvl3pPr>
+            <a:lvl4pPr marL="1600200" indent="-228600" algn="l" defTabSz="914400" rtl="0" eaLnBrk="1" latinLnBrk="0" hangingPunct="1">
+              <a:lnSpc>
+                <a:spcPct val="90000"/>
+              </a:lnSpc>
+              <a:spcBef>
+                <a:spcPts val="500"/>
+              </a:spcBef>
               <a:buFont typeface="Arial" panose="020B0604020202020204" pitchFamily="34" charset="0"/>
               <a:buChar char="•"/>
-            </a:pPr>
-            <a:r>
-              <a:rPr lang="en-US" dirty="0" smtClean="0"/>
-              <a:t>90 min Fire Rated</a:t>
-            </a:r>
-          </a:p>
-          <a:p>
-            <a:pPr marL="285750" indent="-285750">
+              <a:defRPr sz="1800" kern="1200">
+                <a:solidFill>
+                  <a:schemeClr val="tx1"/>
+                </a:solidFill>
+                <a:latin typeface="+mn-lt"/>
+                <a:ea typeface="+mn-ea"/>
+                <a:cs typeface="+mn-cs"/>
+              </a:defRPr>
+            </a:lvl4pPr>
+            <a:lvl5pPr marL="2057400" indent="-228600" algn="l" defTabSz="914400" rtl="0" eaLnBrk="1" latinLnBrk="0" hangingPunct="1">
+              <a:lnSpc>
+                <a:spcPct val="90000"/>
+              </a:lnSpc>
+              <a:spcBef>
+                <a:spcPts val="500"/>
+              </a:spcBef>
               <a:buFont typeface="Arial" panose="020B0604020202020204" pitchFamily="34" charset="0"/>
               <a:buChar char="•"/>
-            </a:pPr>
-            <a:r>
-              <a:rPr lang="en-US" dirty="0" smtClean="0"/>
-              <a:t>120 min Fire Rated</a:t>
-            </a:r>
-          </a:p>
-          <a:p>
-            <a:pPr marL="285750" indent="-285750">
+              <a:defRPr sz="1800" kern="1200">
+                <a:solidFill>
+                  <a:schemeClr val="tx1"/>
+                </a:solidFill>
+                <a:latin typeface="+mn-lt"/>
+                <a:ea typeface="+mn-ea"/>
+                <a:cs typeface="+mn-cs"/>
+              </a:defRPr>
+            </a:lvl5pPr>
+            <a:lvl6pPr marL="2514600" indent="-228600" algn="l" defTabSz="914400" rtl="0" eaLnBrk="1" latinLnBrk="0" hangingPunct="1">
+              <a:lnSpc>
+                <a:spcPct val="90000"/>
+              </a:lnSpc>
+              <a:spcBef>
+                <a:spcPts val="500"/>
+              </a:spcBef>
               <a:buFont typeface="Arial" panose="020B0604020202020204" pitchFamily="34" charset="0"/>
               <a:buChar char="•"/>
+              <a:defRPr sz="1800" kern="1200">
+                <a:solidFill>
+                  <a:schemeClr val="tx1"/>
+                </a:solidFill>
+                <a:latin typeface="+mn-lt"/>
+                <a:ea typeface="+mn-ea"/>
+                <a:cs typeface="+mn-cs"/>
+              </a:defRPr>
+            </a:lvl6pPr>
+            <a:lvl7pPr marL="2971800" indent="-228600" algn="l" defTabSz="914400" rtl="0" eaLnBrk="1" latinLnBrk="0" hangingPunct="1">
+              <a:lnSpc>
+                <a:spcPct val="90000"/>
+              </a:lnSpc>
+              <a:spcBef>
+                <a:spcPts val="500"/>
+              </a:spcBef>
+              <a:buFont typeface="Arial" panose="020B0604020202020204" pitchFamily="34" charset="0"/>
+              <a:buChar char="•"/>
+              <a:defRPr sz="1800" kern="1200">
+                <a:solidFill>
+                  <a:schemeClr val="tx1"/>
+                </a:solidFill>
+                <a:latin typeface="+mn-lt"/>
+                <a:ea typeface="+mn-ea"/>
+                <a:cs typeface="+mn-cs"/>
+              </a:defRPr>
+            </a:lvl7pPr>
+            <a:lvl8pPr marL="3429000" indent="-228600" algn="l" defTabSz="914400" rtl="0" eaLnBrk="1" latinLnBrk="0" hangingPunct="1">
+              <a:lnSpc>
+                <a:spcPct val="90000"/>
+              </a:lnSpc>
+              <a:spcBef>
+                <a:spcPts val="500"/>
+              </a:spcBef>
+              <a:buFont typeface="Arial" panose="020B0604020202020204" pitchFamily="34" charset="0"/>
+              <a:buChar char="•"/>
+              <a:defRPr sz="1800" kern="1200">
+                <a:solidFill>
+                  <a:schemeClr val="tx1"/>
+                </a:solidFill>
+                <a:latin typeface="+mn-lt"/>
+                <a:ea typeface="+mn-ea"/>
+                <a:cs typeface="+mn-cs"/>
+              </a:defRPr>
+            </a:lvl8pPr>
+            <a:lvl9pPr marL="3886200" indent="-228600" algn="l" defTabSz="914400" rtl="0" eaLnBrk="1" latinLnBrk="0" hangingPunct="1">
+              <a:lnSpc>
+                <a:spcPct val="90000"/>
+              </a:lnSpc>
+              <a:spcBef>
+                <a:spcPts val="500"/>
+              </a:spcBef>
+              <a:buFont typeface="Arial" panose="020B0604020202020204" pitchFamily="34" charset="0"/>
+              <a:buChar char="•"/>
+              <a:defRPr sz="1800" kern="1200">
+                <a:solidFill>
+                  <a:schemeClr val="tx1"/>
+                </a:solidFill>
+                <a:latin typeface="+mn-lt"/>
+                <a:ea typeface="+mn-ea"/>
+                <a:cs typeface="+mn-cs"/>
+              </a:defRPr>
+            </a:lvl9pPr>
+          </a:lstStyle>
+          <a:p>
+            <a:r>
+              <a:rPr lang="en-US" dirty="0" smtClean="0"/>
+              <a:t>Total Quotes Count: 10</a:t>
+            </a:r>
+          </a:p>
+          <a:p>
+            <a:r>
+              <a:rPr lang="en-US" dirty="0" smtClean="0"/>
+              <a:t>Total Quotes Value: </a:t>
+            </a:r>
+            <a:r>
+              <a:rPr lang="en-US" dirty="0"/>
+              <a:t>USD 55,000</a:t>
+            </a:r>
+            <a:r>
+              <a:rPr lang="en-US" dirty="0" smtClean="0"/>
+              <a:t>/-</a:t>
+            </a:r>
+            <a:endParaRPr lang="en-US" b="1" dirty="0" smtClean="0"/>
+          </a:p>
+          <a:p>
+            <a:r>
+              <a:rPr lang="en-US" dirty="0" smtClean="0"/>
+              <a:t>Actual Time Spent and Time Saved Bar Graph</a:t>
+            </a:r>
+          </a:p>
+          <a:p>
+            <a:r>
+              <a:rPr lang="en-US" dirty="0" smtClean="0"/>
+              <a:t>$$$ Saved: USD 3,500/- *</a:t>
+            </a:r>
+          </a:p>
+          <a:p>
+            <a:pPr marL="0" indent="0">
+              <a:buNone/>
             </a:pPr>
+            <a:endParaRPr lang="en-US" dirty="0" smtClean="0"/>
+          </a:p>
+          <a:p>
+            <a:pPr marL="0" indent="0">
+              <a:buNone/>
+            </a:pPr>
             <a:r>
               <a:rPr lang="en-US" dirty="0" smtClean="0"/>
-              <a:t>Steel Security Door (Heavy Duty</a:t>
-            </a:r>
-          </a:p>
-          <a:p>
-            <a:r>
-              <a:rPr lang="en-US" dirty="0" smtClean="0"/>
-              <a:t>(radio </a:t>
-            </a:r>
-            <a:r>
-              <a:rPr lang="en-US" dirty="0" err="1" smtClean="0"/>
-              <a:t>btns</a:t>
-            </a:r>
-            <a:r>
-              <a:rPr lang="en-US" dirty="0" smtClean="0"/>
-              <a:t>)</a:t>
-            </a:r>
-            <a:endParaRPr lang="en-US" dirty="0"/>
-          </a:p>
-        </p:txBody>
-      </p:sp>
-      <p:sp>
-        <p:nvSpPr>
-          <p:cNvPr id="3" name="TextBox 2"/>
-          <p:cNvSpPr txBox="1"/>
-          <p:nvPr/>
-        </p:nvSpPr>
-        <p:spPr>
-          <a:xfrm>
-            <a:off x="707923" y="6176963"/>
-            <a:ext cx="1708160" cy="369332"/>
-          </a:xfrm>
-          <a:prstGeom prst="rect">
-            <a:avLst/>
-          </a:prstGeom>
-          <a:noFill/>
-        </p:spPr>
-        <p:txBody>
-          <a:bodyPr wrap="none" rtlCol="0">
-            <a:spAutoFit/>
-          </a:bodyPr>
-          <a:lstStyle/>
-          <a:p>
-            <a:r>
-              <a:rPr lang="en-US" b="1" dirty="0" smtClean="0"/>
-              <a:t>Units are in mm</a:t>
-            </a:r>
-            <a:endParaRPr lang="en-US" b="1" dirty="0"/>
-          </a:p>
-        </p:txBody>
-      </p:sp>
-      <p:sp>
-        <p:nvSpPr>
-          <p:cNvPr id="8" name="Rounded Rectangle 7"/>
+              <a:t>* At 25$ per hour</a:t>
+            </a:r>
+            <a:endParaRPr lang="en-US" dirty="0" smtClean="0"/>
+          </a:p>
+        </p:txBody>
+      </p:sp>
+      <p:sp>
+        <p:nvSpPr>
+          <p:cNvPr id="10" name="Rounded Rectangle 9"/>
           <p:cNvSpPr/>
           <p:nvPr/>
         </p:nvSpPr>
         <p:spPr>
           <a:xfrm>
-            <a:off x="1695147" y="4262284"/>
-            <a:ext cx="1814052" cy="501446"/>
+            <a:off x="6586383" y="1825625"/>
+            <a:ext cx="4353233" cy="501446"/>
           </a:xfrm>
           <a:prstGeom prst="roundRect">
             <a:avLst/>
@@ -4032,17 +4739,61 @@
           <a:p>
             <a:pPr algn="ctr"/>
             <a:r>
-              <a:rPr lang="en-US" b="1" dirty="0" smtClean="0"/>
-              <a:t>BACK</a:t>
-            </a:r>
-            <a:endParaRPr lang="en-US" b="1" dirty="0"/>
+              <a:rPr lang="en-US" sz="2400" b="1" dirty="0" smtClean="0"/>
+              <a:t>Create New Quote</a:t>
+            </a:r>
+            <a:endParaRPr lang="en-US" sz="2400" b="1" dirty="0"/>
+          </a:p>
+        </p:txBody>
+      </p:sp>
+      <p:sp>
+        <p:nvSpPr>
+          <p:cNvPr id="11" name="Rounded Rectangle 10"/>
+          <p:cNvSpPr/>
+          <p:nvPr/>
+        </p:nvSpPr>
+        <p:spPr>
+          <a:xfrm>
+            <a:off x="7759800" y="2564630"/>
+            <a:ext cx="2006397" cy="501446"/>
+          </a:xfrm>
+          <a:prstGeom prst="roundRect">
+            <a:avLst/>
+          </a:prstGeom>
+        </p:spPr>
+        <p:style>
+          <a:lnRef idx="2">
+            <a:schemeClr val="accent1">
+              <a:shade val="50000"/>
+            </a:schemeClr>
+          </a:lnRef>
+          <a:fillRef idx="1">
+            <a:schemeClr val="accent1"/>
+          </a:fillRef>
+          <a:effectRef idx="0">
+            <a:schemeClr val="accent1"/>
+          </a:effectRef>
+          <a:fontRef idx="minor">
+            <a:schemeClr val="lt1"/>
+          </a:fontRef>
+        </p:style>
+        <p:txBody>
+          <a:bodyPr rtlCol="0" anchor="ctr"/>
+          <a:lstStyle/>
+          <a:p>
+            <a:pPr algn="ctr"/>
+            <a:r>
+              <a:rPr lang="en-US" sz="1400" b="1" dirty="0" smtClean="0"/>
+              <a:t>View All Quotes</a:t>
+            </a:r>
+            <a:endParaRPr lang="en-US" sz="1400" b="1" dirty="0"/>
           </a:p>
         </p:txBody>
       </p:sp>
     </p:spTree>
     <p:extLst>
       <p:ext uri="{BB962C8B-B14F-4D97-AF65-F5344CB8AC3E}">
-        <p14:creationId xmlns:p14="http://schemas.microsoft.com/office/powerpoint/2010/main" val="3264759301"/>
+        <p14:creationId xmlns:p14="http://schemas.microsoft.com/office/powerpoint/2010/main" val="4087854192"/>
       </p:ext>
     </p:extLst>
   </p:cSld>
@@ -4093,7 +4844,7 @@
           <a:p>
             <a:r>
               <a:rPr lang="en-US" dirty="0" smtClean="0"/>
-              <a:t>Door Leafs</a:t>
+              <a:t>New Quote</a:t>
             </a:r>
             <a:endParaRPr lang="en-US" dirty="0"/>
           </a:p>
@@ -4113,6 +4864,23 @@
         <p:txBody>
           <a:bodyPr/>
           <a:lstStyle/>
+          <a:p>
+            <a:pPr marL="0" indent="0" algn="ctr">
+              <a:buNone/>
+            </a:pPr>
+            <a:r>
+              <a:rPr lang="en-US" dirty="0" smtClean="0"/>
+              <a:t>Company Name: [</a:t>
+            </a:r>
+            <a:r>
+              <a:rPr lang="en-US" dirty="0" smtClean="0"/>
+              <a:t>TEXT AREA</a:t>
+            </a:r>
+            <a:r>
+              <a:rPr lang="en-US" dirty="0" smtClean="0"/>
+              <a:t>]</a:t>
+            </a:r>
+          </a:p>
           <a:p>
             <a:pPr marL="0" indent="0" algn="ctr">
               <a:buNone/>
@@ -4124,9 +4892,39 @@
               <a:buNone/>
             </a:pPr>
             <a:r>
+              <a:rPr lang="en-US" dirty="0"/>
+              <a:t>Project Name and Description: [12 Doors for Site Branch</a:t>
+            </a:r>
+            <a:r>
               <a:rPr lang="en-US" dirty="0" smtClean="0"/>
-              <a:t>Select Door Type:</a:t>
-            </a:r>
+              <a:t>]</a:t>
+            </a:r>
+          </a:p>
+          <a:p>
+            <a:pPr marL="0" indent="0" algn="ctr">
+              <a:buNone/>
+            </a:pPr>
+            <a:endParaRPr lang="en-US" dirty="0"/>
+          </a:p>
+          <a:p>
+            <a:pPr marL="0" indent="0" algn="ctr">
+              <a:buNone/>
+            </a:pPr>
+            <a:r>
+              <a:rPr lang="en-US" dirty="0" smtClean="0"/>
+              <a:t>Units: mm or inch</a:t>
+            </a:r>
+          </a:p>
+          <a:p>
+            <a:pPr marL="0" indent="0" algn="ctr">
+              <a:buNone/>
+            </a:pPr>
+            <a:endParaRPr lang="en-US" dirty="0"/>
+          </a:p>
+          <a:p>
+            <a:pPr marL="0" indent="0" algn="ctr">
+              <a:buNone/>
+            </a:pPr>
             <a:endParaRPr lang="en-US" dirty="0"/>
           </a:p>
         </p:txBody>
@@ -4139,7 +4937,7 @@
         </p:nvSpPr>
         <p:spPr>
           <a:xfrm>
-            <a:off x="5188974" y="4262284"/>
+            <a:off x="5188974" y="4999703"/>
             <a:ext cx="1814052" cy="501446"/>
           </a:xfrm>
           <a:prstGeom prst="roundRect">
@@ -4175,142 +4973,10 @@
           </a:p>
         </p:txBody>
       </p:sp>
-      <p:sp>
-        <p:nvSpPr>
-          <p:cNvPr id="2" name="TextBox 1"/>
-          <p:cNvSpPr txBox="1"/>
-          <p:nvPr/>
-        </p:nvSpPr>
-        <p:spPr>
-          <a:xfrm>
-            <a:off x="5663380" y="3052916"/>
-            <a:ext cx="2330245" cy="923330"/>
-          </a:xfrm>
-          <a:prstGeom prst="rect">
-            <a:avLst/>
-          </a:prstGeom>
-          <a:noFill/>
-        </p:spPr>
-        <p:txBody>
-          <a:bodyPr wrap="square" rtlCol="0">
-            <a:spAutoFit/>
-          </a:bodyPr>
-          <a:lstStyle/>
-          <a:p>
-            <a:pPr marL="285750" indent="-285750">
-              <a:buFont typeface="Arial" panose="020B0604020202020204" pitchFamily="34" charset="0"/>
-              <a:buChar char="•"/>
-            </a:pPr>
-            <a:r>
-              <a:rPr lang="en-US" dirty="0" smtClean="0"/>
-              <a:t>Single Door</a:t>
-            </a:r>
-          </a:p>
-          <a:p>
-            <a:pPr marL="285750" indent="-285750">
-              <a:buFont typeface="Arial" panose="020B0604020202020204" pitchFamily="34" charset="0"/>
-              <a:buChar char="•"/>
-            </a:pPr>
-            <a:r>
-              <a:rPr lang="en-US" dirty="0" smtClean="0"/>
-              <a:t>Double Door</a:t>
-            </a:r>
-          </a:p>
-          <a:p>
-            <a:r>
-              <a:rPr lang="en-US" dirty="0" smtClean="0"/>
-              <a:t>(radio </a:t>
-            </a:r>
-            <a:r>
-              <a:rPr lang="en-US" dirty="0" err="1" smtClean="0"/>
-              <a:t>btns</a:t>
-            </a:r>
-            <a:r>
-              <a:rPr lang="en-US" dirty="0" smtClean="0"/>
-              <a:t>)</a:t>
-            </a:r>
-            <a:endParaRPr lang="en-US" dirty="0"/>
-          </a:p>
-        </p:txBody>
-      </p:sp>
-      <p:sp>
-        <p:nvSpPr>
-          <p:cNvPr id="8" name="TextBox 7"/>
-          <p:cNvSpPr txBox="1"/>
-          <p:nvPr/>
-        </p:nvSpPr>
-        <p:spPr>
-          <a:xfrm>
-            <a:off x="707923" y="6176963"/>
-            <a:ext cx="2472152" cy="369332"/>
-          </a:xfrm>
-          <a:prstGeom prst="rect">
-            <a:avLst/>
-          </a:prstGeom>
-          <a:noFill/>
-        </p:spPr>
-        <p:txBody>
-          <a:bodyPr wrap="none" rtlCol="0">
-            <a:spAutoFit/>
-          </a:bodyPr>
-          <a:lstStyle/>
-          <a:p>
-            <a:r>
-              <a:rPr lang="en-US" b="1" dirty="0" smtClean="0"/>
-              <a:t>Door type: Double Door</a:t>
-            </a:r>
-            <a:endParaRPr lang="en-US" b="1" dirty="0"/>
-          </a:p>
-        </p:txBody>
-      </p:sp>
-      <p:sp>
-        <p:nvSpPr>
-          <p:cNvPr id="9" name="Rounded Rectangle 8"/>
-          <p:cNvSpPr/>
-          <p:nvPr/>
-        </p:nvSpPr>
-        <p:spPr>
-          <a:xfrm>
-            <a:off x="1695147" y="4262284"/>
-            <a:ext cx="1814052" cy="501446"/>
-          </a:xfrm>
-          <a:prstGeom prst="roundRect">
-            <a:avLst/>
-          </a:prstGeom>
-        </p:spPr>
-        <p:style>
-          <a:lnRef idx="2">
-            <a:schemeClr val="accent1">
-              <a:shade val="50000"/>
-            </a:schemeClr>
-          </a:lnRef>
-          <a:fillRef idx="1">
-            <a:schemeClr val="accent1"/>
-          </a:fillRef>
-          <a:effectRef idx="0">
-            <a:schemeClr val="accent1"/>
-          </a:effectRef>
-          <a:fontRef idx="minor">
-            <a:schemeClr val="lt1"/>
-          </a:fontRef>
-        </p:style>
-        <p:txBody>
-          <a:bodyPr rtlCol="0" anchor="ctr"/>
-          <a:lstStyle/>
-          <a:p>
-            <a:pPr algn="ctr"/>
-            <a:r>
-              <a:rPr lang="en-US" b="1" dirty="0" smtClean="0"/>
-              <a:t>BACK</a:t>
-            </a:r>
-            <a:endParaRPr lang="en-US" b="1" dirty="0"/>
-          </a:p>
-        </p:txBody>
-      </p:sp>
     </p:spTree>
     <p:extLst>
       <p:ext uri="{BB962C8B-B14F-4D97-AF65-F5344CB8AC3E}">
-        <p14:creationId xmlns:p14="http://schemas.microsoft.com/office/powerpoint/2010/main" val="715553429"/>
+        <p14:creationId xmlns:p14="http://schemas.microsoft.com/office/powerpoint/2010/main" val="4211373576"/>
       </p:ext>
     </p:extLst>
   </p:cSld>
@@ -4361,7 +5027,7 @@
           <a:p>
             <a:r>
               <a:rPr lang="en-US" dirty="0" smtClean="0"/>
-              <a:t>Door Size</a:t>
+              <a:t>Door Leafs</a:t>
             </a:r>
             <a:endParaRPr lang="en-US" dirty="0"/>
           </a:p>
@@ -4393,7 +5059,7 @@
             </a:pPr>
             <a:r>
               <a:rPr lang="en-US" dirty="0" smtClean="0"/>
-              <a:t>Enter Door Size:</a:t>
+              <a:t>Select Door Type:</a:t>
             </a:r>
             <a:endParaRPr lang="en-US" dirty="0"/>
           </a:p>
@@ -4445,14 +5111,14 @@
       </p:sp>
       <p:sp>
         <p:nvSpPr>
-          <p:cNvPr id="3" name="TextBox 2"/>
+          <p:cNvPr id="2" name="TextBox 1"/>
           <p:cNvSpPr txBox="1"/>
           <p:nvPr/>
         </p:nvSpPr>
         <p:spPr>
           <a:xfrm>
-            <a:off x="5188974" y="3097161"/>
-            <a:ext cx="918328" cy="369332"/>
+            <a:off x="5663380" y="3052916"/>
+            <a:ext cx="2330245" cy="923330"/>
           </a:xfrm>
           <a:prstGeom prst="rect">
             <a:avLst/>
@@ -4460,14 +5126,42 @@
           <a:noFill/>
         </p:spPr>
         <p:txBody>
-          <a:bodyPr wrap="none" rtlCol="0">
+          <a:bodyPr wrap="square" rtlCol="0">
             <a:spAutoFit/>
           </a:bodyPr>
           <a:lstStyle/>
           <a:p>
+            <a:pPr marL="285750" indent="-285750">
+              <a:buFont typeface="Arial" panose="020B0604020202020204" pitchFamily="34" charset="0"/>
+              <a:buChar char="•"/>
+            </a:pPr>
             <a:r>
               <a:rPr lang="en-US" dirty="0" smtClean="0"/>
-              <a:t>Height: </a:t>
+              <a:t>Single Door</a:t>
+            </a:r>
+          </a:p>
+          <a:p>
+            <a:pPr marL="285750" indent="-285750">
+              <a:buFont typeface="Arial" panose="020B0604020202020204" pitchFamily="34" charset="0"/>
+              <a:buChar char="•"/>
+            </a:pPr>
+            <a:r>
+              <a:rPr lang="en-US" dirty="0" smtClean="0"/>
+              <a:t>Double Door</a:t>
+            </a:r>
+          </a:p>
+          <a:p>
+            <a:r>
+              <a:rPr lang="en-US" dirty="0" smtClean="0"/>
+              <a:t>(radio </a:t>
+            </a:r>
+            <a:r>
+              <a:rPr lang="en-US" dirty="0" err="1" smtClean="0"/>
+              <a:t>btns</a:t>
+            </a:r>
+            <a:r>
+              <a:rPr lang="en-US" dirty="0" smtClean="0"/>
+              <a:t>)</a:t>
             </a:r>
             <a:endParaRPr lang="en-US" dirty="0"/>
           </a:p>
@@ -4481,8 +5175,8 @@
         </p:nvSpPr>
         <p:spPr>
           <a:xfrm>
-            <a:off x="5188974" y="3443749"/>
-            <a:ext cx="878767" cy="369332"/>
+            <a:off x="707923" y="6176963"/>
+            <a:ext cx="2472152" cy="369332"/>
           </a:xfrm>
           <a:prstGeom prst="rect">
             <a:avLst/>
@@ -4496,38 +5190,8 @@
           <a:lstStyle/>
           <a:p>
             <a:r>
-              <a:rPr lang="en-US" dirty="0" smtClean="0"/>
-              <a:t>Width: </a:t>
-            </a:r>
-            <a:endParaRPr lang="en-US" dirty="0"/>
-          </a:p>
-        </p:txBody>
-      </p:sp>
-      <p:sp>
-        <p:nvSpPr>
-          <p:cNvPr id="9" name="TextBox 8"/>
-          <p:cNvSpPr txBox="1"/>
-          <p:nvPr/>
-        </p:nvSpPr>
-        <p:spPr>
-          <a:xfrm>
-            <a:off x="707923" y="6176963"/>
-            <a:ext cx="1817036" cy="369332"/>
-          </a:xfrm>
-          <a:prstGeom prst="rect">
-            <a:avLst/>
-          </a:prstGeom>
-          <a:noFill/>
-        </p:spPr>
-        <p:txBody>
-          <a:bodyPr wrap="none" rtlCol="0">
-            <a:spAutoFit/>
-          </a:bodyPr>
-          <a:lstStyle/>
-          <a:p>
-            <a:r>
               <a:rPr lang="en-US" b="1" dirty="0" smtClean="0"/>
-              <a:t>Size: 2100 x 1000</a:t>
+              <a:t>Door type: Double Door</a:t>
             </a:r>
             <a:endParaRPr lang="en-US" b="1" dirty="0"/>
           </a:p>
@@ -4535,7 +5199,7 @@
       </p:sp>
       <p:sp>
         <p:nvSpPr>
-          <p:cNvPr id="10" name="Rounded Rectangle 9"/>
+          <p:cNvPr id="9" name="Rounded Rectangle 8"/>
           <p:cNvSpPr/>
           <p:nvPr/>
         </p:nvSpPr>
@@ -4580,7 +5244,7 @@
     </p:spTree>
     <p:extLst>
       <p:ext uri="{BB962C8B-B14F-4D97-AF65-F5344CB8AC3E}">
-        <p14:creationId xmlns:p14="http://schemas.microsoft.com/office/powerpoint/2010/main" val="3839629399"/>
+        <p14:creationId xmlns:p14="http://schemas.microsoft.com/office/powerpoint/2010/main" val="715553429"/>
       </p:ext>
     </p:extLst>
   </p:cSld>
@@ -4631,7 +5295,11 @@
           <a:p>
             <a:r>
               <a:rPr lang="en-US" dirty="0" smtClean="0"/>
-              <a:t>Viewing Glass Required</a:t>
+              <a:t>Select Door </a:t>
+            </a:r>
+            <a:r>
+              <a:rPr lang="en-US" dirty="0" smtClean="0"/>
+              <a:t>Type/Fire Rating</a:t>
             </a:r>
             <a:endParaRPr lang="en-US" dirty="0"/>
           </a:p>
@@ -4655,15 +5323,9 @@
             <a:pPr marL="0" indent="0" algn="ctr">
               <a:buNone/>
             </a:pPr>
-            <a:endParaRPr lang="en-US" dirty="0" smtClean="0"/>
-          </a:p>
-          <a:p>
-            <a:pPr marL="0" indent="0" algn="ctr">
-              <a:buNone/>
-            </a:pPr>
             <a:r>
               <a:rPr lang="en-US" dirty="0" smtClean="0"/>
-              <a:t>Enter Glass Size:</a:t>
+              <a:t>Select Fire Rating</a:t>
             </a:r>
             <a:endParaRPr lang="en-US" dirty="0"/>
           </a:p>
@@ -4677,7 +5339,7 @@
         </p:nvSpPr>
         <p:spPr>
           <a:xfrm>
-            <a:off x="5188974" y="4262284"/>
+            <a:off x="5188974" y="4856676"/>
             <a:ext cx="1814052" cy="501446"/>
           </a:xfrm>
           <a:prstGeom prst="roundRect">
@@ -4715,14 +5377,14 @@
       </p:sp>
       <p:sp>
         <p:nvSpPr>
-          <p:cNvPr id="3" name="TextBox 2"/>
+          <p:cNvPr id="2" name="TextBox 1"/>
           <p:cNvSpPr txBox="1"/>
           <p:nvPr/>
         </p:nvSpPr>
         <p:spPr>
           <a:xfrm>
-            <a:off x="5188974" y="3097161"/>
-            <a:ext cx="1630062" cy="369332"/>
+            <a:off x="4422057" y="2548985"/>
+            <a:ext cx="4294240" cy="2031325"/>
           </a:xfrm>
           <a:prstGeom prst="rect">
             <a:avLst/>
@@ -4730,14 +5392,87 @@
           <a:noFill/>
         </p:spPr>
         <p:txBody>
-          <a:bodyPr wrap="none" rtlCol="0">
+          <a:bodyPr wrap="square" rtlCol="0">
             <a:spAutoFit/>
           </a:bodyPr>
           <a:lstStyle/>
           <a:p>
+            <a:pPr marL="285750" indent="-285750">
+              <a:buFont typeface="Arial" panose="020B0604020202020204" pitchFamily="34" charset="0"/>
+              <a:buChar char="•"/>
+            </a:pPr>
             <a:r>
               <a:rPr lang="en-US" dirty="0" smtClean="0"/>
-              <a:t>Glass Height: 0 </a:t>
+              <a:t>No Rating, std. Metal </a:t>
+            </a:r>
+            <a:r>
+              <a:rPr lang="en-US" dirty="0" smtClean="0"/>
+              <a:t>Door</a:t>
+            </a:r>
+            <a:endParaRPr lang="en-US" dirty="0" smtClean="0"/>
+          </a:p>
+          <a:p>
+            <a:pPr marL="285750" indent="-285750">
+              <a:buFont typeface="Arial" panose="020B0604020202020204" pitchFamily="34" charset="0"/>
+              <a:buChar char="•"/>
+            </a:pPr>
+            <a:r>
+              <a:rPr lang="en-US" dirty="0" smtClean="0"/>
+              <a:t>30 min Fire Rating</a:t>
+            </a:r>
+          </a:p>
+          <a:p>
+            <a:pPr marL="285750" indent="-285750">
+              <a:buFont typeface="Arial" panose="020B0604020202020204" pitchFamily="34" charset="0"/>
+              <a:buChar char="•"/>
+            </a:pPr>
+            <a:r>
+              <a:rPr lang="en-US" dirty="0" smtClean="0"/>
+              <a:t>60 min Fire Rated</a:t>
+            </a:r>
+          </a:p>
+          <a:p>
+            <a:pPr marL="285750" indent="-285750">
+              <a:buFont typeface="Arial" panose="020B0604020202020204" pitchFamily="34" charset="0"/>
+              <a:buChar char="•"/>
+            </a:pPr>
+            <a:r>
+              <a:rPr lang="en-US" dirty="0" smtClean="0"/>
+              <a:t>90 min Fire Rated</a:t>
+            </a:r>
+          </a:p>
+          <a:p>
+            <a:pPr marL="285750" indent="-285750">
+              <a:buFont typeface="Arial" panose="020B0604020202020204" pitchFamily="34" charset="0"/>
+              <a:buChar char="•"/>
+            </a:pPr>
+            <a:r>
+              <a:rPr lang="en-US" dirty="0" smtClean="0"/>
+              <a:t>120 min Fire Rated</a:t>
+            </a:r>
+          </a:p>
+          <a:p>
+            <a:pPr marL="285750" indent="-285750">
+              <a:buFont typeface="Arial" panose="020B0604020202020204" pitchFamily="34" charset="0"/>
+              <a:buChar char="•"/>
+            </a:pPr>
+            <a:r>
+              <a:rPr lang="en-US" dirty="0" smtClean="0"/>
+              <a:t>Steel Security Door (Heavy Duty</a:t>
+            </a:r>
+          </a:p>
+          <a:p>
+            <a:r>
+              <a:rPr lang="en-US" dirty="0" smtClean="0"/>
+              <a:t>(radio </a:t>
+            </a:r>
+            <a:r>
+              <a:rPr lang="en-US" dirty="0" err="1" smtClean="0"/>
+              <a:t>btns</a:t>
+            </a:r>
+            <a:r>
+              <a:rPr lang="en-US" dirty="0" smtClean="0"/>
+              <a:t>)</a:t>
             </a:r>
             <a:endParaRPr lang="en-US" dirty="0"/>
           </a:p>
@@ -4745,14 +5480,14 @@
       </p:sp>
       <p:sp>
         <p:nvSpPr>
-          <p:cNvPr id="8" name="TextBox 7"/>
+          <p:cNvPr id="3" name="TextBox 2"/>
           <p:cNvSpPr txBox="1"/>
           <p:nvPr/>
         </p:nvSpPr>
         <p:spPr>
           <a:xfrm>
-            <a:off x="5188974" y="3443749"/>
-            <a:ext cx="1590500" cy="369332"/>
+            <a:off x="707923" y="6176963"/>
+            <a:ext cx="1708160" cy="369332"/>
           </a:xfrm>
           <a:prstGeom prst="rect">
             <a:avLst/>
@@ -4766,38 +5501,8 @@
           <a:lstStyle/>
           <a:p>
             <a:r>
-              <a:rPr lang="en-US" dirty="0" smtClean="0"/>
-              <a:t>Glass Width: 0 </a:t>
-            </a:r>
-            <a:endParaRPr lang="en-US" dirty="0"/>
-          </a:p>
-        </p:txBody>
-      </p:sp>
-      <p:sp>
-        <p:nvSpPr>
-          <p:cNvPr id="9" name="TextBox 8"/>
-          <p:cNvSpPr txBox="1"/>
-          <p:nvPr/>
-        </p:nvSpPr>
-        <p:spPr>
-          <a:xfrm>
-            <a:off x="707923" y="6176963"/>
-            <a:ext cx="3531095" cy="369332"/>
-          </a:xfrm>
-          <a:prstGeom prst="rect">
-            <a:avLst/>
-          </a:prstGeom>
-          <a:noFill/>
-        </p:spPr>
-        <p:txBody>
-          <a:bodyPr wrap="none" rtlCol="0">
-            <a:spAutoFit/>
-          </a:bodyPr>
-          <a:lstStyle/>
-          <a:p>
-            <a:r>
               <a:rPr lang="en-US" b="1" dirty="0" smtClean="0"/>
-              <a:t>With Viewing Glass Size: 100 x 150 </a:t>
+              <a:t>Units are in mm</a:t>
             </a:r>
             <a:endParaRPr lang="en-US" b="1" dirty="0"/>
           </a:p>
@@ -4805,51 +5510,7 @@
       </p:sp>
       <p:sp>
         <p:nvSpPr>
-          <p:cNvPr id="12" name="Rounded Rectangle 11"/>
-          <p:cNvSpPr/>
-          <p:nvPr/>
-        </p:nvSpPr>
-        <p:spPr>
-          <a:xfrm>
-            <a:off x="4611395" y="5058075"/>
-            <a:ext cx="2745658" cy="501446"/>
-          </a:xfrm>
-          <a:prstGeom prst="roundRect">
-            <a:avLst/>
-          </a:prstGeom>
-        </p:spPr>
-        <p:style>
-          <a:lnRef idx="2">
-            <a:schemeClr val="accent3">
-              <a:shade val="50000"/>
-            </a:schemeClr>
-          </a:lnRef>
-          <a:fillRef idx="1">
-            <a:schemeClr val="accent3"/>
-          </a:fillRef>
-          <a:effectRef idx="0">
-            <a:schemeClr val="accent3"/>
-          </a:effectRef>
-          <a:fontRef idx="minor">
-            <a:schemeClr val="lt1"/>
-          </a:fontRef>
-        </p:style>
-        <p:txBody>
-          <a:bodyPr rtlCol="0" anchor="ctr"/>
-          <a:lstStyle/>
-          <a:p>
-            <a:pPr algn="ctr"/>
-            <a:r>
-              <a:rPr lang="en-US" b="1" dirty="0" smtClean="0"/>
-              <a:t>Not Required</a:t>
-            </a:r>
-            <a:endParaRPr lang="en-US" b="1" dirty="0"/>
-          </a:p>
-        </p:txBody>
-      </p:sp>
-      <p:sp>
-        <p:nvSpPr>
-          <p:cNvPr id="10" name="Rounded Rectangle 9"/>
+          <p:cNvPr id="8" name="Rounded Rectangle 7"/>
           <p:cNvSpPr/>
           <p:nvPr/>
         </p:nvSpPr>
@@ -4894,7 +5555,7 @@
     </p:spTree>
     <p:extLst>
       <p:ext uri="{BB962C8B-B14F-4D97-AF65-F5344CB8AC3E}">
-        <p14:creationId xmlns:p14="http://schemas.microsoft.com/office/powerpoint/2010/main" val="36720221"/>
+        <p14:creationId xmlns:p14="http://schemas.microsoft.com/office/powerpoint/2010/main" val="3264759301"/>
       </p:ext>
     </p:extLst>
   </p:cSld>
@@ -4945,7 +5606,7 @@
           <a:p>
             <a:r>
               <a:rPr lang="en-US" dirty="0" smtClean="0"/>
-              <a:t>Rubber Sealing Option</a:t>
+              <a:t>Door Size</a:t>
             </a:r>
             <a:endParaRPr lang="en-US" dirty="0"/>
           </a:p>
@@ -4977,7 +5638,7 @@
             </a:pPr>
             <a:r>
               <a:rPr lang="en-US" dirty="0" smtClean="0"/>
-              <a:t>Do you need rubber seal / smoke seal ?</a:t>
+              <a:t>Enter Door Size:</a:t>
             </a:r>
             <a:endParaRPr lang="en-US" dirty="0"/>
           </a:p>
@@ -5036,7 +5697,7 @@
         <p:spPr>
           <a:xfrm>
             <a:off x="5188974" y="3097161"/>
-            <a:ext cx="1270541" cy="923330"/>
+            <a:ext cx="918328" cy="369332"/>
           </a:xfrm>
           <a:prstGeom prst="rect">
             <a:avLst/>
@@ -5049,37 +5710,9 @@
           </a:bodyPr>
           <a:lstStyle/>
           <a:p>
-            <a:pPr marL="285750" indent="-285750">
-              <a:buFont typeface="Arial" panose="020B0604020202020204" pitchFamily="34" charset="0"/>
-              <a:buChar char="•"/>
-            </a:pPr>
             <a:r>
               <a:rPr lang="en-US" dirty="0" smtClean="0"/>
-              <a:t>Yes</a:t>
-            </a:r>
-          </a:p>
-          <a:p>
-            <a:pPr marL="285750" indent="-285750">
-              <a:buFont typeface="Arial" panose="020B0604020202020204" pitchFamily="34" charset="0"/>
-              <a:buChar char="•"/>
-            </a:pPr>
-            <a:r>
-              <a:rPr lang="en-US" dirty="0" smtClean="0"/>
-              <a:t>No</a:t>
-            </a:r>
-          </a:p>
-          <a:p>
-            <a:r>
-              <a:rPr lang="en-US" dirty="0" smtClean="0"/>
-              <a:t>(radio </a:t>
-            </a:r>
-            <a:r>
-              <a:rPr lang="en-US" dirty="0" err="1" smtClean="0"/>
-              <a:t>btns</a:t>
-            </a:r>
-            <a:r>
-              <a:rPr lang="en-US" dirty="0" smtClean="0"/>
-              <a:t>)</a:t>
+              <a:t>Height: </a:t>
             </a:r>
             <a:endParaRPr lang="en-US" dirty="0"/>
           </a:p>
@@ -5087,14 +5720,14 @@
       </p:sp>
       <p:sp>
         <p:nvSpPr>
-          <p:cNvPr id="9" name="TextBox 8"/>
+          <p:cNvPr id="8" name="TextBox 7"/>
           <p:cNvSpPr txBox="1"/>
           <p:nvPr/>
         </p:nvSpPr>
         <p:spPr>
           <a:xfrm>
-            <a:off x="707923" y="6176963"/>
-            <a:ext cx="3397212" cy="369332"/>
+            <a:off x="5188974" y="3443749"/>
+            <a:ext cx="878767" cy="369332"/>
           </a:xfrm>
           <a:prstGeom prst="rect">
             <a:avLst/>
@@ -5108,52 +5741,38 @@
           <a:lstStyle/>
           <a:p>
             <a:r>
-              <a:rPr lang="en-US" b="1" dirty="0" smtClean="0"/>
-              <a:t>With Rubber Sealing / smoke seal</a:t>
-            </a:r>
-            <a:endParaRPr lang="en-US" b="1" dirty="0"/>
-          </a:p>
-        </p:txBody>
-      </p:sp>
-      <p:sp>
-        <p:nvSpPr>
-          <p:cNvPr id="10" name="Rounded Rectangle 9"/>
-          <p:cNvSpPr/>
+              <a:rPr lang="en-US" dirty="0" smtClean="0"/>
+              <a:t>Width: </a:t>
+            </a:r>
+            <a:endParaRPr lang="en-US" dirty="0"/>
+          </a:p>
+        </p:txBody>
+      </p:sp>
+      <p:sp>
+        <p:nvSpPr>
+          <p:cNvPr id="9" name="TextBox 8"/>
+          <p:cNvSpPr txBox="1"/>
           <p:nvPr/>
         </p:nvSpPr>
         <p:spPr>
           <a:xfrm>
-            <a:off x="4611395" y="5058075"/>
-            <a:ext cx="2745658" cy="501446"/>
-          </a:xfrm>
-          <a:prstGeom prst="roundRect">
+            <a:off x="707923" y="6176963"/>
+            <a:ext cx="1817036" cy="369332"/>
+          </a:xfrm>
+          <a:prstGeom prst="rect">
             <a:avLst/>
           </a:prstGeom>
-        </p:spPr>
-        <p:style>
-          <a:lnRef idx="2">
-            <a:schemeClr val="accent3">
-              <a:shade val="50000"/>
-            </a:schemeClr>
-          </a:lnRef>
-          <a:fillRef idx="1">
-            <a:schemeClr val="accent3"/>
-          </a:fillRef>
-          <a:effectRef idx="0">
-            <a:schemeClr val="accent3"/>
-          </a:effectRef>
-          <a:fontRef idx="minor">
-            <a:schemeClr val="lt1"/>
-          </a:fontRef>
-        </p:style>
-        <p:txBody>
-          <a:bodyPr rtlCol="0" anchor="ctr"/>
-          <a:lstStyle/>
-          <a:p>
-            <a:pPr algn="ctr"/>
+          <a:noFill/>
+        </p:spPr>
+        <p:txBody>
+          <a:bodyPr wrap="none" rtlCol="0">
+            <a:spAutoFit/>
+          </a:bodyPr>
+          <a:lstStyle/>
+          <a:p>
             <a:r>
               <a:rPr lang="en-US" b="1" dirty="0" smtClean="0"/>
-              <a:t>Not Required</a:t>
+              <a:t>Size: 2100 x 1000</a:t>
             </a:r>
             <a:endParaRPr lang="en-US" b="1" dirty="0"/>
           </a:p>
@@ -5161,7 +5780,7 @@
       </p:sp>
       <p:sp>
         <p:nvSpPr>
-          <p:cNvPr id="8" name="Rounded Rectangle 7"/>
+          <p:cNvPr id="10" name="Rounded Rectangle 9"/>
           <p:cNvSpPr/>
           <p:nvPr/>
         </p:nvSpPr>
@@ -5203,10 +5822,163 @@
           </a:p>
         </p:txBody>
       </p:sp>
+      <p:sp>
+        <p:nvSpPr>
+          <p:cNvPr id="4" name="Rounded Rectangle 3"/>
+          <p:cNvSpPr/>
+          <p:nvPr/>
+        </p:nvSpPr>
+        <p:spPr>
+          <a:xfrm>
+            <a:off x="8185355" y="2507226"/>
+            <a:ext cx="3451121" cy="589935"/>
+          </a:xfrm>
+          <a:prstGeom prst="roundRect">
+            <a:avLst/>
+          </a:prstGeom>
+        </p:spPr>
+        <p:style>
+          <a:lnRef idx="2">
+            <a:schemeClr val="accent1">
+              <a:shade val="50000"/>
+            </a:schemeClr>
+          </a:lnRef>
+          <a:fillRef idx="1">
+            <a:schemeClr val="accent1"/>
+          </a:fillRef>
+          <a:effectRef idx="0">
+            <a:schemeClr val="accent1"/>
+          </a:effectRef>
+          <a:fontRef idx="minor">
+            <a:schemeClr val="lt1"/>
+          </a:fontRef>
+        </p:style>
+        <p:txBody>
+          <a:bodyPr rtlCol="0" anchor="ctr"/>
+          <a:lstStyle/>
+          <a:p>
+            <a:r>
+              <a:rPr lang="en-US" b="1" dirty="0"/>
+              <a:t>Total Costs</a:t>
+            </a:r>
+            <a:r>
+              <a:rPr lang="en-US" b="1" dirty="0" smtClean="0"/>
+              <a:t>:</a:t>
+            </a:r>
+            <a:endParaRPr lang="en-US" b="1" dirty="0"/>
+          </a:p>
+        </p:txBody>
+      </p:sp>
+      <p:sp>
+        <p:nvSpPr>
+          <p:cNvPr id="13" name="Rounded Rectangle 12"/>
+          <p:cNvSpPr/>
+          <p:nvPr/>
+        </p:nvSpPr>
+        <p:spPr>
+          <a:xfrm>
+            <a:off x="8185355" y="3097161"/>
+            <a:ext cx="3451121" cy="643552"/>
+          </a:xfrm>
+          <a:prstGeom prst="roundRect">
+            <a:avLst/>
+          </a:prstGeom>
+        </p:spPr>
+        <p:style>
+          <a:lnRef idx="2">
+            <a:schemeClr val="accent6">
+              <a:shade val="50000"/>
+            </a:schemeClr>
+          </a:lnRef>
+          <a:fillRef idx="1">
+            <a:schemeClr val="accent6"/>
+          </a:fillRef>
+          <a:effectRef idx="0">
+            <a:schemeClr val="accent6"/>
+          </a:effectRef>
+          <a:fontRef idx="minor">
+            <a:schemeClr val="lt1"/>
+          </a:fontRef>
+        </p:style>
+        <p:txBody>
+          <a:bodyPr rtlCol="0" anchor="ctr"/>
+          <a:lstStyle/>
+          <a:p>
+            <a:r>
+              <a:rPr lang="en-US" sz="1600" dirty="0" smtClean="0"/>
+              <a:t>Basic </a:t>
+            </a:r>
+            <a:r>
+              <a:rPr lang="en-US" sz="1600" dirty="0"/>
+              <a:t>Door 1000 x 2100 – </a:t>
+            </a:r>
+            <a:r>
+              <a:rPr lang="en-US" sz="1600" dirty="0" err="1"/>
+              <a:t>Rs</a:t>
+            </a:r>
+            <a:r>
+              <a:rPr lang="en-US" sz="1600" dirty="0"/>
+              <a:t>. 45,000</a:t>
+            </a:r>
+            <a:endParaRPr lang="en-US" sz="1600" dirty="0"/>
+          </a:p>
+        </p:txBody>
+      </p:sp>
+      <p:sp>
+        <p:nvSpPr>
+          <p:cNvPr id="14" name="Rounded Rectangle 13"/>
+          <p:cNvSpPr/>
+          <p:nvPr/>
+        </p:nvSpPr>
+        <p:spPr>
+          <a:xfrm>
+            <a:off x="8185355" y="3740713"/>
+            <a:ext cx="3451121" cy="643552"/>
+          </a:xfrm>
+          <a:prstGeom prst="roundRect">
+            <a:avLst/>
+          </a:prstGeom>
+        </p:spPr>
+        <p:style>
+          <a:lnRef idx="2">
+            <a:schemeClr val="accent4">
+              <a:shade val="50000"/>
+            </a:schemeClr>
+          </a:lnRef>
+          <a:fillRef idx="1">
+            <a:schemeClr val="accent4"/>
+          </a:fillRef>
+          <a:effectRef idx="0">
+            <a:schemeClr val="accent4"/>
+          </a:effectRef>
+          <a:fontRef idx="minor">
+            <a:schemeClr val="lt1"/>
+          </a:fontRef>
+        </p:style>
+        <p:txBody>
+          <a:bodyPr rtlCol="0" anchor="ctr"/>
+          <a:lstStyle/>
+          <a:p>
+            <a:r>
+              <a:rPr lang="en-US" sz="1600" dirty="0" smtClean="0"/>
+              <a:t>Total: </a:t>
+            </a:r>
+            <a:r>
+              <a:rPr lang="en-US" sz="1600" dirty="0" err="1" smtClean="0"/>
+              <a:t>Rs</a:t>
+            </a:r>
+            <a:r>
+              <a:rPr lang="en-US" sz="1600" dirty="0" smtClean="0"/>
+              <a:t>. 45,000/-</a:t>
+            </a:r>
+            <a:endParaRPr lang="en-US" sz="1600" dirty="0"/>
+          </a:p>
+        </p:txBody>
+      </p:sp>
     </p:spTree>
     <p:extLst>
       <p:ext uri="{BB962C8B-B14F-4D97-AF65-F5344CB8AC3E}">
-        <p14:creationId xmlns:p14="http://schemas.microsoft.com/office/powerpoint/2010/main" val="3139394384"/>
+        <p14:creationId xmlns:p14="http://schemas.microsoft.com/office/powerpoint/2010/main" val="3839629399"/>
       </p:ext>
     </p:extLst>
   </p:cSld>
@@ -5257,7 +6029,7 @@
           <a:p>
             <a:r>
               <a:rPr lang="en-US" dirty="0" smtClean="0"/>
-              <a:t>Lock Type</a:t>
+              <a:t>Viewing Glass Required</a:t>
             </a:r>
             <a:endParaRPr lang="en-US" dirty="0"/>
           </a:p>
@@ -5289,7 +6061,7 @@
             </a:pPr>
             <a:r>
               <a:rPr lang="en-US" dirty="0" smtClean="0"/>
-              <a:t>Select Type:</a:t>
+              <a:t>Enter Glass Size:</a:t>
             </a:r>
             <a:endParaRPr lang="en-US" dirty="0"/>
           </a:p>
@@ -5348,7 +6120,7 @@
         <p:spPr>
           <a:xfrm>
             <a:off x="5188974" y="3097161"/>
-            <a:ext cx="4580549" cy="1200329"/>
+            <a:ext cx="1630062" cy="369332"/>
           </a:xfrm>
           <a:prstGeom prst="rect">
             <a:avLst/>
@@ -5361,47 +6133,121 @@
           </a:bodyPr>
           <a:lstStyle/>
           <a:p>
-            <a:pPr marL="285750" indent="-285750">
-              <a:buFont typeface="Arial" panose="020B0604020202020204" pitchFamily="34" charset="0"/>
-              <a:buChar char="•"/>
-            </a:pPr>
             <a:r>
               <a:rPr lang="en-US" dirty="0" smtClean="0"/>
-              <a:t>Standard Locking (light duty, price inclusive)</a:t>
-            </a:r>
-          </a:p>
-          <a:p>
-            <a:pPr marL="285750" indent="-285750">
-              <a:buFont typeface="Arial" panose="020B0604020202020204" pitchFamily="34" charset="0"/>
-              <a:buChar char="•"/>
-            </a:pPr>
+              <a:t>Glass Height: 0 </a:t>
+            </a:r>
+            <a:endParaRPr lang="en-US" dirty="0"/>
+          </a:p>
+        </p:txBody>
+      </p:sp>
+      <p:sp>
+        <p:nvSpPr>
+          <p:cNvPr id="8" name="TextBox 7"/>
+          <p:cNvSpPr txBox="1"/>
+          <p:nvPr/>
+        </p:nvSpPr>
+        <p:spPr>
+          <a:xfrm>
+            <a:off x="5188974" y="3443749"/>
+            <a:ext cx="1590500" cy="369332"/>
+          </a:xfrm>
+          <a:prstGeom prst="rect">
+            <a:avLst/>
+          </a:prstGeom>
+          <a:noFill/>
+        </p:spPr>
+        <p:txBody>
+          <a:bodyPr wrap="none" rtlCol="0">
+            <a:spAutoFit/>
+          </a:bodyPr>
+          <a:lstStyle/>
+          <a:p>
             <a:r>
               <a:rPr lang="en-US" dirty="0" smtClean="0"/>
-              <a:t>Heavy Duty Locking (Recommended)</a:t>
-            </a:r>
-          </a:p>
-          <a:p>
-            <a:pPr marL="285750" indent="-285750">
-              <a:buFont typeface="Arial" panose="020B0604020202020204" pitchFamily="34" charset="0"/>
-              <a:buChar char="•"/>
-            </a:pPr>
-            <a:r>
-              <a:rPr lang="en-US" dirty="0" smtClean="0"/>
-              <a:t>Panic Bar Lock</a:t>
-            </a:r>
-          </a:p>
-          <a:p>
-            <a:pPr marL="285750" indent="-285750">
-              <a:buFont typeface="Arial" panose="020B0604020202020204" pitchFamily="34" charset="0"/>
-              <a:buChar char="•"/>
-            </a:pPr>
-            <a:endParaRPr lang="en-US" dirty="0" smtClean="0"/>
-          </a:p>
-        </p:txBody>
-      </p:sp>
-      <p:sp>
-        <p:nvSpPr>
-          <p:cNvPr id="8" name="Rounded Rectangle 7"/>
+              <a:t>Glass Width: 0 </a:t>
+            </a:r>
+            <a:endParaRPr lang="en-US" dirty="0"/>
+          </a:p>
+        </p:txBody>
+      </p:sp>
+      <p:sp>
+        <p:nvSpPr>
+          <p:cNvPr id="9" name="TextBox 8"/>
+          <p:cNvSpPr txBox="1"/>
+          <p:nvPr/>
+        </p:nvSpPr>
+        <p:spPr>
+          <a:xfrm>
+            <a:off x="707923" y="6176963"/>
+            <a:ext cx="3531095" cy="369332"/>
+          </a:xfrm>
+          <a:prstGeom prst="rect">
+            <a:avLst/>
+          </a:prstGeom>
+          <a:noFill/>
+        </p:spPr>
+        <p:txBody>
+          <a:bodyPr wrap="none" rtlCol="0">
+            <a:spAutoFit/>
+          </a:bodyPr>
+          <a:lstStyle/>
+          <a:p>
+            <a:r>
+              <a:rPr lang="en-US" b="1" dirty="0" smtClean="0"/>
+              <a:t>With Viewing Glass Size: 100 x 150 </a:t>
+            </a:r>
+            <a:endParaRPr lang="en-US" b="1" dirty="0"/>
+          </a:p>
+        </p:txBody>
+      </p:sp>
+      <p:sp>
+        <p:nvSpPr>
+          <p:cNvPr id="12" name="Rounded Rectangle 11"/>
+          <p:cNvSpPr/>
+          <p:nvPr/>
+        </p:nvSpPr>
+        <p:spPr>
+          <a:xfrm>
+            <a:off x="4611395" y="5058075"/>
+            <a:ext cx="2745658" cy="501446"/>
+          </a:xfrm>
+          <a:prstGeom prst="roundRect">
+            <a:avLst/>
+          </a:prstGeom>
+        </p:spPr>
+        <p:style>
+          <a:lnRef idx="2">
+            <a:schemeClr val="accent3">
+              <a:shade val="50000"/>
+            </a:schemeClr>
+          </a:lnRef>
+          <a:fillRef idx="1">
+            <a:schemeClr val="accent3"/>
+          </a:fillRef>
+          <a:effectRef idx="0">
+            <a:schemeClr val="accent3"/>
+          </a:effectRef>
+          <a:fontRef idx="minor">
+            <a:schemeClr val="lt1"/>
+          </a:fontRef>
+        </p:style>
+        <p:txBody>
+          <a:bodyPr rtlCol="0" anchor="ctr"/>
+          <a:lstStyle/>
+          <a:p>
+            <a:pPr algn="ctr"/>
+            <a:r>
+              <a:rPr lang="en-US" b="1" dirty="0" smtClean="0"/>
+              <a:t>Not Required</a:t>
+            </a:r>
+            <a:endParaRPr lang="en-US" b="1" dirty="0"/>
+          </a:p>
+        </p:txBody>
+      </p:sp>
+      <p:sp>
+        <p:nvSpPr>
+          <p:cNvPr id="10" name="Rounded Rectangle 9"/>
           <p:cNvSpPr/>
           <p:nvPr/>
         </p:nvSpPr>
@@ -5443,10 +6289,134 @@
           </a:p>
         </p:txBody>
       </p:sp>
+      <p:sp>
+        <p:nvSpPr>
+          <p:cNvPr id="14" name="Rounded Rectangle 13"/>
+          <p:cNvSpPr/>
+          <p:nvPr/>
+        </p:nvSpPr>
+        <p:spPr>
+          <a:xfrm>
+            <a:off x="8185355" y="2772697"/>
+            <a:ext cx="3451121" cy="703724"/>
+          </a:xfrm>
+          <a:prstGeom prst="roundRect">
+            <a:avLst/>
+          </a:prstGeom>
+        </p:spPr>
+        <p:style>
+          <a:lnRef idx="2">
+            <a:schemeClr val="accent1">
+              <a:shade val="50000"/>
+            </a:schemeClr>
+          </a:lnRef>
+          <a:fillRef idx="1">
+            <a:schemeClr val="accent1"/>
+          </a:fillRef>
+          <a:effectRef idx="0">
+            <a:schemeClr val="accent1"/>
+          </a:effectRef>
+          <a:fontRef idx="minor">
+            <a:schemeClr val="lt1"/>
+          </a:fontRef>
+        </p:style>
+        <p:txBody>
+          <a:bodyPr rtlCol="0" anchor="ctr"/>
+          <a:lstStyle/>
+          <a:p>
+            <a:r>
+              <a:rPr lang="en-US" b="1" dirty="0"/>
+              <a:t>Total Costs</a:t>
+            </a:r>
+            <a:r>
+              <a:rPr lang="en-US" b="1" dirty="0" smtClean="0"/>
+              <a:t>:</a:t>
+            </a:r>
+          </a:p>
+          <a:p>
+            <a:r>
+              <a:rPr lang="en-US" sz="1600" dirty="0"/>
+              <a:t>Basic Door 1000 x 2100 – </a:t>
+            </a:r>
+            <a:r>
+              <a:rPr lang="en-US" sz="1600" dirty="0" err="1"/>
+              <a:t>Rs</a:t>
+            </a:r>
+            <a:r>
+              <a:rPr lang="en-US" sz="1600" dirty="0"/>
+              <a:t>. </a:t>
+            </a:r>
+            <a:r>
+              <a:rPr lang="en-US" sz="1600" dirty="0" smtClean="0"/>
+              <a:t>45,000/-</a:t>
+            </a:r>
+            <a:endParaRPr lang="en-US" sz="1600" b="1" dirty="0"/>
+          </a:p>
+        </p:txBody>
+      </p:sp>
+      <p:sp>
+        <p:nvSpPr>
+          <p:cNvPr id="15" name="Rounded Rectangle 14"/>
+          <p:cNvSpPr/>
+          <p:nvPr/>
+        </p:nvSpPr>
+        <p:spPr>
+          <a:xfrm>
+            <a:off x="8185355" y="3476421"/>
+            <a:ext cx="3451121" cy="643552"/>
+          </a:xfrm>
+          <a:prstGeom prst="roundRect">
+            <a:avLst/>
+          </a:prstGeom>
+        </p:spPr>
+        <p:style>
+          <a:lnRef idx="2">
+            <a:schemeClr val="accent6">
+              <a:shade val="50000"/>
+            </a:schemeClr>
+          </a:lnRef>
+          <a:fillRef idx="1">
+            <a:schemeClr val="accent6"/>
+          </a:fillRef>
+          <a:effectRef idx="0">
+            <a:schemeClr val="accent6"/>
+          </a:effectRef>
+          <a:fontRef idx="minor">
+            <a:schemeClr val="lt1"/>
+          </a:fontRef>
+        </p:style>
+        <p:txBody>
+          <a:bodyPr rtlCol="0" anchor="ctr"/>
+          <a:lstStyle/>
+          <a:p>
+            <a:r>
+              <a:rPr lang="en-US" sz="1600" dirty="0" smtClean="0"/>
+              <a:t>View Glass 21”x40” </a:t>
+            </a:r>
+            <a:r>
+              <a:rPr lang="en-US" sz="1600" dirty="0"/>
+              <a:t>– </a:t>
+            </a:r>
+            <a:r>
+              <a:rPr lang="en-US" sz="1600" dirty="0" err="1"/>
+              <a:t>Rs</a:t>
+            </a:r>
+            <a:r>
+              <a:rPr lang="en-US" sz="1600" dirty="0"/>
+              <a:t>. </a:t>
+            </a:r>
+            <a:r>
+              <a:rPr lang="en-US" sz="1600" dirty="0" smtClean="0"/>
+              <a:t>2,500/-</a:t>
+            </a:r>
+            <a:endParaRPr lang="en-US" sz="1600" dirty="0"/>
+          </a:p>
+        </p:txBody>
+      </p:sp>
     </p:spTree>
     <p:extLst>
       <p:ext uri="{BB962C8B-B14F-4D97-AF65-F5344CB8AC3E}">
-        <p14:creationId xmlns:p14="http://schemas.microsoft.com/office/powerpoint/2010/main" val="2172344198"/>
+        <p14:creationId xmlns:p14="http://schemas.microsoft.com/office/powerpoint/2010/main" val="36720221"/>
       </p:ext>
     </p:extLst>
   </p:cSld>
@@ -5497,7 +6467,7 @@
           <a:p>
             <a:r>
               <a:rPr lang="en-US" dirty="0" smtClean="0"/>
-              <a:t>Heavy Duty Door Closer</a:t>
+              <a:t>Rubber Sealing Option</a:t>
             </a:r>
             <a:endParaRPr lang="en-US" dirty="0"/>
           </a:p>
@@ -5529,7 +6499,11 @@
             </a:pPr>
             <a:r>
               <a:rPr lang="en-US" dirty="0" smtClean="0"/>
-              <a:t>Select Number of Heavy Duty Door Closers for this Door:</a:t>
+              <a:t>rubber </a:t>
+            </a:r>
+            <a:r>
+              <a:rPr lang="en-US" dirty="0" smtClean="0"/>
+              <a:t>seal / smoke seal ?</a:t>
             </a:r>
             <a:endParaRPr lang="en-US" dirty="0"/>
           </a:p>
@@ -5587,8 +6561,8 @@
         </p:nvSpPr>
         <p:spPr>
           <a:xfrm>
-            <a:off x="5188973" y="3097161"/>
-            <a:ext cx="754627" cy="923330"/>
+            <a:off x="5188974" y="3097161"/>
+            <a:ext cx="1270541" cy="923330"/>
           </a:xfrm>
           <a:prstGeom prst="rect">
             <a:avLst/>
@@ -5596,7 +6570,7 @@
           <a:noFill/>
         </p:spPr>
         <p:txBody>
-          <a:bodyPr wrap="square" rtlCol="0">
+          <a:bodyPr wrap="none" rtlCol="0">
             <a:spAutoFit/>
           </a:bodyPr>
           <a:lstStyle/>
@@ -5607,7 +6581,7 @@
             </a:pPr>
             <a:r>
               <a:rPr lang="en-US" dirty="0" smtClean="0"/>
-              <a:t>1</a:t>
+              <a:t>Yes</a:t>
             </a:r>
           </a:p>
           <a:p>
@@ -5617,28 +6591,36 @@
             </a:pPr>
             <a:r>
               <a:rPr lang="en-US" dirty="0" smtClean="0"/>
-              <a:t>2</a:t>
-            </a:r>
-          </a:p>
-          <a:p>
-            <a:pPr marL="285750" indent="-285750">
-              <a:buFont typeface="Arial" panose="020B0604020202020204" pitchFamily="34" charset="0"/>
-              <a:buChar char="•"/>
-            </a:pPr>
-            <a:endParaRPr lang="en-US" dirty="0" smtClean="0"/>
-          </a:p>
-        </p:txBody>
-      </p:sp>
-      <p:sp>
-        <p:nvSpPr>
-          <p:cNvPr id="8" name="TextBox 7"/>
+              <a:t>No</a:t>
+            </a:r>
+          </a:p>
+          <a:p>
+            <a:r>
+              <a:rPr lang="en-US" dirty="0" smtClean="0"/>
+              <a:t>(radio </a:t>
+            </a:r>
+            <a:r>
+              <a:rPr lang="en-US" dirty="0" err="1" smtClean="0"/>
+              <a:t>btns</a:t>
+            </a:r>
+            <a:r>
+              <a:rPr lang="en-US" dirty="0" smtClean="0"/>
+              <a:t>)</a:t>
+            </a:r>
+            <a:endParaRPr lang="en-US" dirty="0"/>
+          </a:p>
+        </p:txBody>
+      </p:sp>
+      <p:sp>
+        <p:nvSpPr>
+          <p:cNvPr id="9" name="TextBox 8"/>
           <p:cNvSpPr txBox="1"/>
           <p:nvPr/>
         </p:nvSpPr>
         <p:spPr>
           <a:xfrm>
-            <a:off x="6399569" y="3338952"/>
-            <a:ext cx="754627" cy="646331"/>
+            <a:off x="707923" y="6176963"/>
+            <a:ext cx="3397212" cy="369332"/>
           </a:xfrm>
           <a:prstGeom prst="rect">
             <a:avLst/>
@@ -5646,62 +6628,16 @@
           <a:noFill/>
         </p:spPr>
         <p:txBody>
-          <a:bodyPr wrap="square" rtlCol="0">
+          <a:bodyPr wrap="none" rtlCol="0">
             <a:spAutoFit/>
           </a:bodyPr>
           <a:lstStyle/>
           <a:p>
             <a:r>
               <a:rPr lang="en-US" b="1" dirty="0" smtClean="0"/>
-              <a:t>OR</a:t>
-            </a:r>
-          </a:p>
-          <a:p>
-            <a:pPr marL="285750" indent="-285750">
-              <a:buFont typeface="Arial" panose="020B0604020202020204" pitchFamily="34" charset="0"/>
-              <a:buChar char="•"/>
-            </a:pPr>
-            <a:endParaRPr lang="en-US" b="1" dirty="0" smtClean="0"/>
-          </a:p>
-        </p:txBody>
-      </p:sp>
-      <p:sp>
-        <p:nvSpPr>
-          <p:cNvPr id="9" name="TextBox 8"/>
-          <p:cNvSpPr txBox="1"/>
-          <p:nvPr/>
-        </p:nvSpPr>
-        <p:spPr>
-          <a:xfrm>
-            <a:off x="7305367" y="3061954"/>
-            <a:ext cx="754627" cy="646331"/>
-          </a:xfrm>
-          <a:prstGeom prst="rect">
-            <a:avLst/>
-          </a:prstGeom>
-          <a:noFill/>
-        </p:spPr>
-        <p:txBody>
-          <a:bodyPr wrap="square" rtlCol="0">
-            <a:spAutoFit/>
-          </a:bodyPr>
-          <a:lstStyle/>
-          <a:p>
-            <a:pPr marL="285750" indent="-285750">
-              <a:buFont typeface="Arial" panose="020B0604020202020204" pitchFamily="34" charset="0"/>
-              <a:buChar char="•"/>
-            </a:pPr>
-            <a:r>
-              <a:rPr lang="en-US" dirty="0" smtClean="0"/>
-              <a:t>1</a:t>
-            </a:r>
-          </a:p>
-          <a:p>
-            <a:pPr marL="285750" indent="-285750">
-              <a:buFont typeface="Arial" panose="020B0604020202020204" pitchFamily="34" charset="0"/>
-              <a:buChar char="•"/>
-            </a:pPr>
-            <a:endParaRPr lang="en-US" dirty="0" smtClean="0"/>
+              <a:t>With Rubber Sealing / smoke seal</a:t>
+            </a:r>
+            <a:endParaRPr lang="en-US" b="1" dirty="0"/>
           </a:p>
         </p:txBody>
       </p:sp>
@@ -5751,7 +6687,7 @@
       </p:sp>
       <p:sp>
         <p:nvSpPr>
-          <p:cNvPr id="11" name="Rounded Rectangle 10"/>
+          <p:cNvPr id="8" name="Rounded Rectangle 7"/>
           <p:cNvSpPr/>
           <p:nvPr/>
         </p:nvSpPr>
@@ -5793,10 +6729,152 @@
           </a:p>
         </p:txBody>
       </p:sp>
+      <p:sp>
+        <p:nvSpPr>
+          <p:cNvPr id="13" name="Rounded Rectangle 12"/>
+          <p:cNvSpPr/>
+          <p:nvPr/>
+        </p:nvSpPr>
+        <p:spPr>
+          <a:xfrm>
+            <a:off x="8185355" y="2772697"/>
+            <a:ext cx="3451121" cy="1007244"/>
+          </a:xfrm>
+          <a:prstGeom prst="roundRect">
+            <a:avLst/>
+          </a:prstGeom>
+        </p:spPr>
+        <p:style>
+          <a:lnRef idx="2">
+            <a:schemeClr val="accent1">
+              <a:shade val="50000"/>
+            </a:schemeClr>
+          </a:lnRef>
+          <a:fillRef idx="1">
+            <a:schemeClr val="accent1"/>
+          </a:fillRef>
+          <a:effectRef idx="0">
+            <a:schemeClr val="accent1"/>
+          </a:effectRef>
+          <a:fontRef idx="minor">
+            <a:schemeClr val="lt1"/>
+          </a:fontRef>
+        </p:style>
+        <p:txBody>
+          <a:bodyPr rtlCol="0" anchor="ctr"/>
+          <a:lstStyle/>
+          <a:p>
+            <a:r>
+              <a:rPr lang="en-US" b="1" dirty="0"/>
+              <a:t>Total Costs</a:t>
+            </a:r>
+            <a:r>
+              <a:rPr lang="en-US" b="1" dirty="0" smtClean="0"/>
+              <a:t>:</a:t>
+            </a:r>
+          </a:p>
+          <a:p>
+            <a:r>
+              <a:rPr lang="en-US" sz="1600" dirty="0"/>
+              <a:t>Basic Door 1000 x 2100 – </a:t>
+            </a:r>
+            <a:r>
+              <a:rPr lang="en-US" sz="1600" dirty="0" err="1"/>
+              <a:t>Rs</a:t>
+            </a:r>
+            <a:r>
+              <a:rPr lang="en-US" sz="1600" dirty="0"/>
+              <a:t>. </a:t>
+            </a:r>
+            <a:r>
+              <a:rPr lang="en-US" sz="1600" dirty="0" smtClean="0"/>
+              <a:t>45,000/-</a:t>
+            </a:r>
+          </a:p>
+          <a:p>
+            <a:r>
+              <a:rPr lang="en-US" sz="1600" dirty="0"/>
+              <a:t>View Glass 21”x40” – </a:t>
+            </a:r>
+            <a:r>
+              <a:rPr lang="en-US" sz="1600" dirty="0" smtClean="0"/>
+              <a:t>	</a:t>
+            </a:r>
+            <a:r>
+              <a:rPr lang="en-US" sz="1600" dirty="0" err="1" smtClean="0"/>
+              <a:t>Rs</a:t>
+            </a:r>
+            <a:r>
+              <a:rPr lang="en-US" sz="1600" dirty="0"/>
+              <a:t>. 2,500</a:t>
+            </a:r>
+            <a:r>
+              <a:rPr lang="en-US" sz="1600" dirty="0" smtClean="0"/>
+              <a:t>/-</a:t>
+            </a:r>
+            <a:endParaRPr lang="en-US" sz="1600" dirty="0"/>
+          </a:p>
+        </p:txBody>
+      </p:sp>
+      <p:sp>
+        <p:nvSpPr>
+          <p:cNvPr id="14" name="Rounded Rectangle 13"/>
+          <p:cNvSpPr/>
+          <p:nvPr/>
+        </p:nvSpPr>
+        <p:spPr>
+          <a:xfrm>
+            <a:off x="8185355" y="3779941"/>
+            <a:ext cx="3451121" cy="643552"/>
+          </a:xfrm>
+          <a:prstGeom prst="roundRect">
+            <a:avLst/>
+          </a:prstGeom>
+        </p:spPr>
+        <p:style>
+          <a:lnRef idx="2">
+            <a:schemeClr val="accent6">
+              <a:shade val="50000"/>
+            </a:schemeClr>
+          </a:lnRef>
+          <a:fillRef idx="1">
+            <a:schemeClr val="accent6"/>
+          </a:fillRef>
+          <a:effectRef idx="0">
+            <a:schemeClr val="accent6"/>
+          </a:effectRef>
+          <a:fontRef idx="minor">
+            <a:schemeClr val="lt1"/>
+          </a:fontRef>
+        </p:style>
+        <p:txBody>
+          <a:bodyPr rtlCol="0" anchor="ctr"/>
+          <a:lstStyle/>
+          <a:p>
+            <a:r>
+              <a:rPr lang="en-US" sz="1600" dirty="0" smtClean="0"/>
+              <a:t>Rubber Seal	</a:t>
+            </a:r>
+            <a:r>
+              <a:rPr lang="en-US" sz="1600" dirty="0" err="1" smtClean="0"/>
+              <a:t>Rs</a:t>
+            </a:r>
+            <a:r>
+              <a:rPr lang="en-US" sz="1600" dirty="0"/>
+              <a:t>. </a:t>
+            </a:r>
+            <a:r>
+              <a:rPr lang="en-US" sz="1600" dirty="0" smtClean="0"/>
+              <a:t>2,500/-</a:t>
+            </a:r>
+            <a:endParaRPr lang="en-US" sz="1600" dirty="0"/>
+          </a:p>
+        </p:txBody>
+      </p:sp>
     </p:spTree>
     <p:extLst>
       <p:ext uri="{BB962C8B-B14F-4D97-AF65-F5344CB8AC3E}">
-        <p14:creationId xmlns:p14="http://schemas.microsoft.com/office/powerpoint/2010/main" val="3101390788"/>
+        <p14:creationId xmlns:p14="http://schemas.microsoft.com/office/powerpoint/2010/main" val="3139394384"/>
       </p:ext>
     </p:extLst>
   </p:cSld>

</xml_diff>

<commit_message>
added Pallet rack presentation mockup, bootstrap login form
</commit_message>
<xml_diff>
--- a/app-quotation-automator.pptx
+++ b/app-quotation-automator.pptx
@@ -9,15 +9,15 @@
     <p:sldId id="270" r:id="rId3"/>
     <p:sldId id="269" r:id="rId4"/>
     <p:sldId id="256" r:id="rId5"/>
-    <p:sldId id="257" r:id="rId6"/>
+    <p:sldId id="271" r:id="rId6"/>
     <p:sldId id="264" r:id="rId7"/>
-    <p:sldId id="258" r:id="rId8"/>
-    <p:sldId id="259" r:id="rId9"/>
-    <p:sldId id="261" r:id="rId10"/>
-    <p:sldId id="262" r:id="rId11"/>
-    <p:sldId id="266" r:id="rId12"/>
-    <p:sldId id="263" r:id="rId13"/>
-    <p:sldId id="265" r:id="rId14"/>
+    <p:sldId id="257" r:id="rId8"/>
+    <p:sldId id="258" r:id="rId9"/>
+    <p:sldId id="259" r:id="rId10"/>
+    <p:sldId id="261" r:id="rId11"/>
+    <p:sldId id="262" r:id="rId12"/>
+    <p:sldId id="266" r:id="rId13"/>
+    <p:sldId id="263" r:id="rId14"/>
   </p:sldIdLst>
   <p:sldSz cx="12192000" cy="6858000"/>
   <p:notesSz cx="6858000" cy="9144000"/>
@@ -255,7 +255,7 @@
           <a:p>
             <a:fld id="{318E1502-E61F-4BB6-8EE4-8357EE119714}" type="datetimeFigureOut">
               <a:rPr lang="en-US" smtClean="0"/>
-              <a:t>3/18/2017</a:t>
+              <a:t>19/03/2017</a:t>
             </a:fld>
             <a:endParaRPr lang="en-US"/>
           </a:p>
@@ -425,7 +425,7 @@
           <a:p>
             <a:fld id="{318E1502-E61F-4BB6-8EE4-8357EE119714}" type="datetimeFigureOut">
               <a:rPr lang="en-US" smtClean="0"/>
-              <a:t>3/18/2017</a:t>
+              <a:t>19/03/2017</a:t>
             </a:fld>
             <a:endParaRPr lang="en-US"/>
           </a:p>
@@ -605,7 +605,7 @@
           <a:p>
             <a:fld id="{318E1502-E61F-4BB6-8EE4-8357EE119714}" type="datetimeFigureOut">
               <a:rPr lang="en-US" smtClean="0"/>
-              <a:t>3/18/2017</a:t>
+              <a:t>19/03/2017</a:t>
             </a:fld>
             <a:endParaRPr lang="en-US"/>
           </a:p>
@@ -775,7 +775,7 @@
           <a:p>
             <a:fld id="{318E1502-E61F-4BB6-8EE4-8357EE119714}" type="datetimeFigureOut">
               <a:rPr lang="en-US" smtClean="0"/>
-              <a:t>3/18/2017</a:t>
+              <a:t>19/03/2017</a:t>
             </a:fld>
             <a:endParaRPr lang="en-US"/>
           </a:p>
@@ -1021,7 +1021,7 @@
           <a:p>
             <a:fld id="{318E1502-E61F-4BB6-8EE4-8357EE119714}" type="datetimeFigureOut">
               <a:rPr lang="en-US" smtClean="0"/>
-              <a:t>3/18/2017</a:t>
+              <a:t>19/03/2017</a:t>
             </a:fld>
             <a:endParaRPr lang="en-US"/>
           </a:p>
@@ -1253,7 +1253,7 @@
           <a:p>
             <a:fld id="{318E1502-E61F-4BB6-8EE4-8357EE119714}" type="datetimeFigureOut">
               <a:rPr lang="en-US" smtClean="0"/>
-              <a:t>3/18/2017</a:t>
+              <a:t>19/03/2017</a:t>
             </a:fld>
             <a:endParaRPr lang="en-US"/>
           </a:p>
@@ -1620,7 +1620,7 @@
           <a:p>
             <a:fld id="{318E1502-E61F-4BB6-8EE4-8357EE119714}" type="datetimeFigureOut">
               <a:rPr lang="en-US" smtClean="0"/>
-              <a:t>3/18/2017</a:t>
+              <a:t>19/03/2017</a:t>
             </a:fld>
             <a:endParaRPr lang="en-US"/>
           </a:p>
@@ -1738,7 +1738,7 @@
           <a:p>
             <a:fld id="{318E1502-E61F-4BB6-8EE4-8357EE119714}" type="datetimeFigureOut">
               <a:rPr lang="en-US" smtClean="0"/>
-              <a:t>3/18/2017</a:t>
+              <a:t>19/03/2017</a:t>
             </a:fld>
             <a:endParaRPr lang="en-US"/>
           </a:p>
@@ -1833,7 +1833,7 @@
           <a:p>
             <a:fld id="{318E1502-E61F-4BB6-8EE4-8357EE119714}" type="datetimeFigureOut">
               <a:rPr lang="en-US" smtClean="0"/>
-              <a:t>3/18/2017</a:t>
+              <a:t>19/03/2017</a:t>
             </a:fld>
             <a:endParaRPr lang="en-US"/>
           </a:p>
@@ -2110,7 +2110,7 @@
           <a:p>
             <a:fld id="{318E1502-E61F-4BB6-8EE4-8357EE119714}" type="datetimeFigureOut">
               <a:rPr lang="en-US" smtClean="0"/>
-              <a:t>3/18/2017</a:t>
+              <a:t>19/03/2017</a:t>
             </a:fld>
             <a:endParaRPr lang="en-US"/>
           </a:p>
@@ -2363,7 +2363,7 @@
           <a:p>
             <a:fld id="{318E1502-E61F-4BB6-8EE4-8357EE119714}" type="datetimeFigureOut">
               <a:rPr lang="en-US" smtClean="0"/>
-              <a:t>3/18/2017</a:t>
+              <a:t>19/03/2017</a:t>
             </a:fld>
             <a:endParaRPr lang="en-US"/>
           </a:p>
@@ -2576,7 +2576,7 @@
           <a:p>
             <a:fld id="{318E1502-E61F-4BB6-8EE4-8357EE119714}" type="datetimeFigureOut">
               <a:rPr lang="en-US" smtClean="0"/>
-              <a:t>3/18/2017</a:t>
+              <a:t>19/03/2017</a:t>
             </a:fld>
             <a:endParaRPr lang="en-US"/>
           </a:p>
@@ -3186,7 +3186,7 @@
           <a:p>
             <a:r>
               <a:rPr lang="en-US" dirty="0" smtClean="0"/>
-              <a:t>Lock Type</a:t>
+              <a:t>Rubber Sealing Option</a:t>
             </a:r>
             <a:endParaRPr lang="en-US" dirty="0"/>
           </a:p>
@@ -3207,16 +3207,18 @@
           <a:bodyPr/>
           <a:lstStyle/>
           <a:p>
-            <a:pPr marL="0" indent="0">
+            <a:pPr marL="0" indent="0" algn="ctr">
               <a:buNone/>
             </a:pPr>
+            <a:endParaRPr lang="en-US" dirty="0" smtClean="0"/>
+          </a:p>
+          <a:p>
+            <a:pPr marL="0" indent="0" algn="ctr">
+              <a:buNone/>
+            </a:pPr>
             <a:r>
               <a:rPr lang="en-US" dirty="0" smtClean="0"/>
-              <a:t>Select </a:t>
-            </a:r>
-            <a:r>
-              <a:rPr lang="en-US" dirty="0" smtClean="0"/>
-              <a:t>Type:</a:t>
+              <a:t>rubber seal / smoke seal ?</a:t>
             </a:r>
             <a:endParaRPr lang="en-US" dirty="0"/>
           </a:p>
@@ -3230,7 +3232,7 @@
         </p:nvSpPr>
         <p:spPr>
           <a:xfrm>
-            <a:off x="5188974" y="4262284"/>
+            <a:off x="4919151" y="3025596"/>
             <a:ext cx="1814052" cy="501446"/>
           </a:xfrm>
           <a:prstGeom prst="roundRect">
@@ -3260,7 +3262,7 @@
             <a:pPr algn="ctr"/>
             <a:r>
               <a:rPr lang="en-US" b="1" dirty="0" smtClean="0"/>
-              <a:t>NEXT</a:t>
+              <a:t>YES</a:t>
             </a:r>
             <a:endParaRPr lang="en-US" b="1" dirty="0"/>
           </a:p>
@@ -3268,61 +3270,45 @@
       </p:sp>
       <p:sp>
         <p:nvSpPr>
-          <p:cNvPr id="3" name="TextBox 2"/>
-          <p:cNvSpPr txBox="1"/>
+          <p:cNvPr id="10" name="Rounded Rectangle 9"/>
+          <p:cNvSpPr/>
           <p:nvPr/>
         </p:nvSpPr>
         <p:spPr>
           <a:xfrm>
-            <a:off x="2268795" y="3097161"/>
-            <a:ext cx="4580549" cy="1200329"/>
-          </a:xfrm>
-          <a:prstGeom prst="rect">
+            <a:off x="4453348" y="5421032"/>
+            <a:ext cx="2745658" cy="501446"/>
+          </a:xfrm>
+          <a:prstGeom prst="roundRect">
             <a:avLst/>
           </a:prstGeom>
-          <a:noFill/>
-        </p:spPr>
-        <p:txBody>
-          <a:bodyPr wrap="none" rtlCol="0">
-            <a:spAutoFit/>
-          </a:bodyPr>
-          <a:lstStyle/>
-          <a:p>
-            <a:pPr marL="285750" indent="-285750">
-              <a:buFont typeface="Arial" panose="020B0604020202020204" pitchFamily="34" charset="0"/>
-              <a:buChar char="•"/>
-            </a:pPr>
-            <a:r>
-              <a:rPr lang="en-US" dirty="0" smtClean="0"/>
-              <a:t>Standard Locking (light duty, price inclusive)</a:t>
-            </a:r>
-          </a:p>
-          <a:p>
-            <a:pPr marL="285750" indent="-285750">
-              <a:buFont typeface="Arial" panose="020B0604020202020204" pitchFamily="34" charset="0"/>
-              <a:buChar char="•"/>
-            </a:pPr>
-            <a:r>
-              <a:rPr lang="en-US" dirty="0" smtClean="0"/>
-              <a:t>Heavy Duty Locking (Recommended)</a:t>
-            </a:r>
-          </a:p>
-          <a:p>
-            <a:pPr marL="285750" indent="-285750">
-              <a:buFont typeface="Arial" panose="020B0604020202020204" pitchFamily="34" charset="0"/>
-              <a:buChar char="•"/>
-            </a:pPr>
-            <a:r>
-              <a:rPr lang="en-US" dirty="0" smtClean="0"/>
-              <a:t>Panic Bar Lock</a:t>
-            </a:r>
-          </a:p>
-          <a:p>
-            <a:pPr marL="285750" indent="-285750">
-              <a:buFont typeface="Arial" panose="020B0604020202020204" pitchFamily="34" charset="0"/>
-              <a:buChar char="•"/>
-            </a:pPr>
-            <a:endParaRPr lang="en-US" dirty="0" smtClean="0"/>
+        </p:spPr>
+        <p:style>
+          <a:lnRef idx="2">
+            <a:schemeClr val="accent3">
+              <a:shade val="50000"/>
+            </a:schemeClr>
+          </a:lnRef>
+          <a:fillRef idx="1">
+            <a:schemeClr val="accent3"/>
+          </a:fillRef>
+          <a:effectRef idx="0">
+            <a:schemeClr val="accent3"/>
+          </a:effectRef>
+          <a:fontRef idx="minor">
+            <a:schemeClr val="lt1"/>
+          </a:fontRef>
+        </p:style>
+        <p:txBody>
+          <a:bodyPr rtlCol="0" anchor="ctr"/>
+          <a:lstStyle/>
+          <a:p>
+            <a:pPr algn="ctr"/>
+            <a:r>
+              <a:rPr lang="en-US" b="1" dirty="0" smtClean="0"/>
+              <a:t>Not Required</a:t>
+            </a:r>
+            <a:endParaRPr lang="en-US" b="1" dirty="0"/>
           </a:p>
         </p:txBody>
       </p:sp>
@@ -3334,7 +3320,7 @@
         </p:nvSpPr>
         <p:spPr>
           <a:xfrm>
-            <a:off x="1695147" y="4262284"/>
+            <a:off x="1515264" y="5421032"/>
             <a:ext cx="1814052" cy="501446"/>
           </a:xfrm>
           <a:prstGeom prst="roundRect">
@@ -3372,14 +3358,14 @@
       </p:sp>
       <p:sp>
         <p:nvSpPr>
-          <p:cNvPr id="11" name="Rounded Rectangle 10"/>
+          <p:cNvPr id="13" name="Rounded Rectangle 12"/>
           <p:cNvSpPr/>
           <p:nvPr/>
         </p:nvSpPr>
         <p:spPr>
           <a:xfrm>
-            <a:off x="8185355" y="2772696"/>
-            <a:ext cx="3451121" cy="1347481"/>
+            <a:off x="8185355" y="2772697"/>
+            <a:ext cx="3451121" cy="1007244"/>
           </a:xfrm>
           <a:prstGeom prst="roundRect">
             <a:avLst/>
@@ -3453,37 +3439,19 @@
               <a:rPr lang="en-US" sz="1600" dirty="0" smtClean="0"/>
               <a:t>/-</a:t>
             </a:r>
-          </a:p>
-          <a:p>
-            <a:r>
-              <a:rPr lang="en-US" sz="1600" dirty="0"/>
-              <a:t>Rubber Seal	</a:t>
-            </a:r>
-            <a:r>
-              <a:rPr lang="en-US" sz="1600" dirty="0" err="1"/>
-              <a:t>Rs</a:t>
-            </a:r>
-            <a:r>
-              <a:rPr lang="en-US" sz="1600" dirty="0"/>
-              <a:t>. 2,500</a:t>
-            </a:r>
-            <a:r>
-              <a:rPr lang="en-US" sz="1600" dirty="0" smtClean="0"/>
-              <a:t>/-</a:t>
-            </a:r>
             <a:endParaRPr lang="en-US" sz="1600" dirty="0"/>
           </a:p>
         </p:txBody>
       </p:sp>
       <p:sp>
         <p:nvSpPr>
-          <p:cNvPr id="12" name="Rounded Rectangle 11"/>
+          <p:cNvPr id="14" name="Rounded Rectangle 13"/>
           <p:cNvSpPr/>
           <p:nvPr/>
         </p:nvSpPr>
         <p:spPr>
           <a:xfrm>
-            <a:off x="8185354" y="4120178"/>
+            <a:off x="8185355" y="3779941"/>
             <a:ext cx="3451121" cy="643552"/>
           </a:xfrm>
           <a:prstGeom prst="roundRect">
@@ -3512,7 +3480,7 @@
           <a:p>
             <a:r>
               <a:rPr lang="en-US" sz="1600" dirty="0" smtClean="0"/>
-              <a:t>Standard Locking	</a:t>
+              <a:t>Rubber Seal	</a:t>
             </a:r>
             <a:r>
               <a:rPr lang="en-US" sz="1600" dirty="0" err="1" smtClean="0"/>
@@ -3527,13 +3495,95 @@
               <a:t>2,500/-</a:t>
             </a:r>
             <a:endParaRPr lang="en-US" sz="1600" dirty="0"/>
+          </a:p>
+        </p:txBody>
+      </p:sp>
+      <p:sp>
+        <p:nvSpPr>
+          <p:cNvPr id="11" name="TextBox 10"/>
+          <p:cNvSpPr txBox="1"/>
+          <p:nvPr/>
+        </p:nvSpPr>
+        <p:spPr>
+          <a:xfrm>
+            <a:off x="10208302" y="749508"/>
+            <a:ext cx="1501821" cy="461665"/>
+          </a:xfrm>
+          <a:prstGeom prst="rect">
+            <a:avLst/>
+          </a:prstGeom>
+          <a:noFill/>
+        </p:spPr>
+        <p:txBody>
+          <a:bodyPr wrap="none" rtlCol="0">
+            <a:spAutoFit/>
+          </a:bodyPr>
+          <a:lstStyle/>
+          <a:p>
+            <a:r>
+              <a:rPr lang="en-US" sz="2400" dirty="0" smtClean="0">
+                <a:solidFill>
+                  <a:srgbClr val="FF0000"/>
+                </a:solidFill>
+              </a:rPr>
+              <a:t>STEP: 5 / 8</a:t>
+            </a:r>
+            <a:endParaRPr lang="en-US" dirty="0">
+              <a:solidFill>
+                <a:srgbClr val="FF0000"/>
+              </a:solidFill>
+            </a:endParaRPr>
+          </a:p>
+        </p:txBody>
+      </p:sp>
+      <p:sp>
+        <p:nvSpPr>
+          <p:cNvPr id="12" name="Rounded Rectangle 11"/>
+          <p:cNvSpPr/>
+          <p:nvPr/>
+        </p:nvSpPr>
+        <p:spPr>
+          <a:xfrm>
+            <a:off x="4919151" y="3750571"/>
+            <a:ext cx="1814052" cy="501446"/>
+          </a:xfrm>
+          <a:prstGeom prst="roundRect">
+            <a:avLst/>
+          </a:prstGeom>
+        </p:spPr>
+        <p:style>
+          <a:lnRef idx="2">
+            <a:schemeClr val="accent1">
+              <a:shade val="50000"/>
+            </a:schemeClr>
+          </a:lnRef>
+          <a:fillRef idx="1">
+            <a:schemeClr val="accent1"/>
+          </a:fillRef>
+          <a:effectRef idx="0">
+            <a:schemeClr val="accent1"/>
+          </a:effectRef>
+          <a:fontRef idx="minor">
+            <a:schemeClr val="lt1"/>
+          </a:fontRef>
+        </p:style>
+        <p:txBody>
+          <a:bodyPr rtlCol="0" anchor="ctr"/>
+          <a:lstStyle/>
+          <a:p>
+            <a:pPr algn="ctr"/>
+            <a:r>
+              <a:rPr lang="en-US" b="1" dirty="0" smtClean="0"/>
+              <a:t>NO</a:t>
+            </a:r>
+            <a:endParaRPr lang="en-US" b="1" dirty="0"/>
           </a:p>
         </p:txBody>
       </p:sp>
     </p:spTree>
     <p:extLst>
       <p:ext uri="{BB962C8B-B14F-4D97-AF65-F5344CB8AC3E}">
-        <p14:creationId xmlns:p14="http://schemas.microsoft.com/office/powerpoint/2010/main" val="2172344198"/>
+        <p14:creationId xmlns:p14="http://schemas.microsoft.com/office/powerpoint/2010/main" val="3139394384"/>
       </p:ext>
     </p:extLst>
   </p:cSld>
@@ -3584,7 +3634,7 @@
           <a:p>
             <a:r>
               <a:rPr lang="en-US" dirty="0" smtClean="0"/>
-              <a:t>Heavy Duty Door Closer</a:t>
+              <a:t>Lock Type</a:t>
             </a:r>
             <a:endParaRPr lang="en-US" dirty="0"/>
           </a:p>
@@ -3605,44 +3655,12 @@
           <a:bodyPr/>
           <a:lstStyle/>
           <a:p>
-            <a:pPr marL="0" indent="0" algn="ctr">
+            <a:pPr marL="0" indent="0">
               <a:buNone/>
             </a:pPr>
-            <a:endParaRPr lang="en-US" dirty="0" smtClean="0"/>
-          </a:p>
-          <a:p>
-            <a:pPr marL="0" indent="0" algn="ctr">
-              <a:buNone/>
-            </a:pPr>
             <a:r>
               <a:rPr lang="en-US" dirty="0" smtClean="0"/>
-              <a:t>Heavy </a:t>
-            </a:r>
-            <a:r>
-              <a:rPr lang="en-US" dirty="0" smtClean="0"/>
-              <a:t>Duty Door </a:t>
-            </a:r>
-            <a:r>
-              <a:rPr lang="en-US" dirty="0" smtClean="0"/>
-              <a:t>Closer Required?</a:t>
-            </a:r>
-          </a:p>
-          <a:p>
-            <a:pPr marL="0" indent="0" algn="ctr">
-              <a:buNone/>
-            </a:pPr>
-            <a:r>
-              <a:rPr lang="en-US" dirty="0" smtClean="0"/>
-              <a:t>Yes</a:t>
-            </a:r>
-          </a:p>
-          <a:p>
-            <a:pPr marL="0" indent="0" algn="ctr">
-              <a:buNone/>
-            </a:pPr>
-            <a:r>
-              <a:rPr lang="en-US" dirty="0" smtClean="0"/>
-              <a:t>No</a:t>
+              <a:t>Select Type:</a:t>
             </a:r>
             <a:endParaRPr lang="en-US" dirty="0"/>
           </a:p>
@@ -3694,51 +3712,67 @@
       </p:sp>
       <p:sp>
         <p:nvSpPr>
-          <p:cNvPr id="10" name="Rounded Rectangle 9"/>
-          <p:cNvSpPr/>
+          <p:cNvPr id="3" name="TextBox 2"/>
+          <p:cNvSpPr txBox="1"/>
           <p:nvPr/>
         </p:nvSpPr>
         <p:spPr>
           <a:xfrm>
-            <a:off x="4611395" y="5058075"/>
-            <a:ext cx="2745658" cy="501446"/>
-          </a:xfrm>
-          <a:prstGeom prst="roundRect">
+            <a:off x="2268795" y="3097161"/>
+            <a:ext cx="4580549" cy="1200329"/>
+          </a:xfrm>
+          <a:prstGeom prst="rect">
             <a:avLst/>
           </a:prstGeom>
-        </p:spPr>
-        <p:style>
-          <a:lnRef idx="2">
-            <a:schemeClr val="accent3">
-              <a:shade val="50000"/>
-            </a:schemeClr>
-          </a:lnRef>
-          <a:fillRef idx="1">
-            <a:schemeClr val="accent3"/>
-          </a:fillRef>
-          <a:effectRef idx="0">
-            <a:schemeClr val="accent3"/>
-          </a:effectRef>
-          <a:fontRef idx="minor">
-            <a:schemeClr val="lt1"/>
-          </a:fontRef>
-        </p:style>
-        <p:txBody>
-          <a:bodyPr rtlCol="0" anchor="ctr"/>
-          <a:lstStyle/>
-          <a:p>
-            <a:pPr algn="ctr"/>
-            <a:r>
-              <a:rPr lang="en-US" b="1" dirty="0" smtClean="0"/>
-              <a:t>Not Required</a:t>
-            </a:r>
-            <a:endParaRPr lang="en-US" b="1" dirty="0"/>
-          </a:p>
-        </p:txBody>
-      </p:sp>
-      <p:sp>
-        <p:nvSpPr>
-          <p:cNvPr id="11" name="Rounded Rectangle 10"/>
+          <a:noFill/>
+        </p:spPr>
+        <p:txBody>
+          <a:bodyPr wrap="none" rtlCol="0">
+            <a:spAutoFit/>
+          </a:bodyPr>
+          <a:lstStyle/>
+          <a:p>
+            <a:pPr marL="285750" indent="-285750">
+              <a:buFont typeface="Arial" panose="020B0604020202020204" pitchFamily="34" charset="0"/>
+              <a:buChar char="•"/>
+            </a:pPr>
+            <a:r>
+              <a:rPr lang="en-US" dirty="0" smtClean="0"/>
+              <a:t>Standard Locking (light duty, price inclusive)</a:t>
+            </a:r>
+          </a:p>
+          <a:p>
+            <a:pPr marL="285750" indent="-285750">
+              <a:buFont typeface="Arial" panose="020B0604020202020204" pitchFamily="34" charset="0"/>
+              <a:buChar char="•"/>
+            </a:pPr>
+            <a:r>
+              <a:rPr lang="en-US" dirty="0" smtClean="0"/>
+              <a:t>Heavy Duty Locking (Recommended)</a:t>
+            </a:r>
+          </a:p>
+          <a:p>
+            <a:pPr marL="285750" indent="-285750">
+              <a:buFont typeface="Arial" panose="020B0604020202020204" pitchFamily="34" charset="0"/>
+              <a:buChar char="•"/>
+            </a:pPr>
+            <a:r>
+              <a:rPr lang="en-US" dirty="0" smtClean="0"/>
+              <a:t>Panic Bar Lock</a:t>
+            </a:r>
+          </a:p>
+          <a:p>
+            <a:pPr marL="285750" indent="-285750">
+              <a:buFont typeface="Arial" panose="020B0604020202020204" pitchFamily="34" charset="0"/>
+              <a:buChar char="•"/>
+            </a:pPr>
+            <a:endParaRPr lang="en-US" dirty="0" smtClean="0"/>
+          </a:p>
+        </p:txBody>
+      </p:sp>
+      <p:sp>
+        <p:nvSpPr>
+          <p:cNvPr id="8" name="Rounded Rectangle 7"/>
           <p:cNvSpPr/>
           <p:nvPr/>
         </p:nvSpPr>
@@ -3780,10 +3814,208 @@
           </a:p>
         </p:txBody>
       </p:sp>
+      <p:sp>
+        <p:nvSpPr>
+          <p:cNvPr id="11" name="Rounded Rectangle 10"/>
+          <p:cNvSpPr/>
+          <p:nvPr/>
+        </p:nvSpPr>
+        <p:spPr>
+          <a:xfrm>
+            <a:off x="8185355" y="2772696"/>
+            <a:ext cx="3451121" cy="1347481"/>
+          </a:xfrm>
+          <a:prstGeom prst="roundRect">
+            <a:avLst/>
+          </a:prstGeom>
+        </p:spPr>
+        <p:style>
+          <a:lnRef idx="2">
+            <a:schemeClr val="accent1">
+              <a:shade val="50000"/>
+            </a:schemeClr>
+          </a:lnRef>
+          <a:fillRef idx="1">
+            <a:schemeClr val="accent1"/>
+          </a:fillRef>
+          <a:effectRef idx="0">
+            <a:schemeClr val="accent1"/>
+          </a:effectRef>
+          <a:fontRef idx="minor">
+            <a:schemeClr val="lt1"/>
+          </a:fontRef>
+        </p:style>
+        <p:txBody>
+          <a:bodyPr rtlCol="0" anchor="ctr"/>
+          <a:lstStyle/>
+          <a:p>
+            <a:r>
+              <a:rPr lang="en-US" b="1" dirty="0"/>
+              <a:t>Total Costs</a:t>
+            </a:r>
+            <a:r>
+              <a:rPr lang="en-US" b="1" dirty="0" smtClean="0"/>
+              <a:t>:</a:t>
+            </a:r>
+          </a:p>
+          <a:p>
+            <a:r>
+              <a:rPr lang="en-US" sz="1600" dirty="0"/>
+              <a:t>Basic Door 1000 x 2100 – </a:t>
+            </a:r>
+            <a:r>
+              <a:rPr lang="en-US" sz="1600" dirty="0" err="1"/>
+              <a:t>Rs</a:t>
+            </a:r>
+            <a:r>
+              <a:rPr lang="en-US" sz="1600" dirty="0"/>
+              <a:t>. </a:t>
+            </a:r>
+            <a:r>
+              <a:rPr lang="en-US" sz="1600" dirty="0" smtClean="0"/>
+              <a:t>45,000/-</a:t>
+            </a:r>
+          </a:p>
+          <a:p>
+            <a:r>
+              <a:rPr lang="en-US" sz="1600" dirty="0"/>
+              <a:t>View Glass 21”x40” – </a:t>
+            </a:r>
+            <a:r>
+              <a:rPr lang="en-US" sz="1600" dirty="0" smtClean="0"/>
+              <a:t>	</a:t>
+            </a:r>
+            <a:r>
+              <a:rPr lang="en-US" sz="1600" dirty="0" err="1" smtClean="0"/>
+              <a:t>Rs</a:t>
+            </a:r>
+            <a:r>
+              <a:rPr lang="en-US" sz="1600" dirty="0"/>
+              <a:t>. 2,500</a:t>
+            </a:r>
+            <a:r>
+              <a:rPr lang="en-US" sz="1600" dirty="0" smtClean="0"/>
+              <a:t>/-</a:t>
+            </a:r>
+          </a:p>
+          <a:p>
+            <a:r>
+              <a:rPr lang="en-US" sz="1600" dirty="0"/>
+              <a:t>Rubber Seal	</a:t>
+            </a:r>
+            <a:r>
+              <a:rPr lang="en-US" sz="1600" dirty="0" err="1"/>
+              <a:t>Rs</a:t>
+            </a:r>
+            <a:r>
+              <a:rPr lang="en-US" sz="1600" dirty="0"/>
+              <a:t>. 2,500</a:t>
+            </a:r>
+            <a:r>
+              <a:rPr lang="en-US" sz="1600" dirty="0" smtClean="0"/>
+              <a:t>/-</a:t>
+            </a:r>
+            <a:endParaRPr lang="en-US" sz="1600" dirty="0"/>
+          </a:p>
+        </p:txBody>
+      </p:sp>
+      <p:sp>
+        <p:nvSpPr>
+          <p:cNvPr id="12" name="Rounded Rectangle 11"/>
+          <p:cNvSpPr/>
+          <p:nvPr/>
+        </p:nvSpPr>
+        <p:spPr>
+          <a:xfrm>
+            <a:off x="8185354" y="4120178"/>
+            <a:ext cx="3451121" cy="643552"/>
+          </a:xfrm>
+          <a:prstGeom prst="roundRect">
+            <a:avLst/>
+          </a:prstGeom>
+        </p:spPr>
+        <p:style>
+          <a:lnRef idx="2">
+            <a:schemeClr val="accent6">
+              <a:shade val="50000"/>
+            </a:schemeClr>
+          </a:lnRef>
+          <a:fillRef idx="1">
+            <a:schemeClr val="accent6"/>
+          </a:fillRef>
+          <a:effectRef idx="0">
+            <a:schemeClr val="accent6"/>
+          </a:effectRef>
+          <a:fontRef idx="minor">
+            <a:schemeClr val="lt1"/>
+          </a:fontRef>
+        </p:style>
+        <p:txBody>
+          <a:bodyPr rtlCol="0" anchor="ctr"/>
+          <a:lstStyle/>
+          <a:p>
+            <a:r>
+              <a:rPr lang="en-US" sz="1600" dirty="0" smtClean="0"/>
+              <a:t>Standard Locking	</a:t>
+            </a:r>
+            <a:r>
+              <a:rPr lang="en-US" sz="1600" dirty="0" err="1" smtClean="0"/>
+              <a:t>Rs</a:t>
+            </a:r>
+            <a:r>
+              <a:rPr lang="en-US" sz="1600" dirty="0"/>
+              <a:t>. </a:t>
+            </a:r>
+            <a:r>
+              <a:rPr lang="en-US" sz="1600" dirty="0" smtClean="0"/>
+              <a:t>2,500/-</a:t>
+            </a:r>
+            <a:endParaRPr lang="en-US" sz="1600" dirty="0"/>
+          </a:p>
+        </p:txBody>
+      </p:sp>
+      <p:sp>
+        <p:nvSpPr>
+          <p:cNvPr id="9" name="TextBox 8"/>
+          <p:cNvSpPr txBox="1"/>
+          <p:nvPr/>
+        </p:nvSpPr>
+        <p:spPr>
+          <a:xfrm>
+            <a:off x="10208302" y="749508"/>
+            <a:ext cx="1501821" cy="461665"/>
+          </a:xfrm>
+          <a:prstGeom prst="rect">
+            <a:avLst/>
+          </a:prstGeom>
+          <a:noFill/>
+        </p:spPr>
+        <p:txBody>
+          <a:bodyPr wrap="none" rtlCol="0">
+            <a:spAutoFit/>
+          </a:bodyPr>
+          <a:lstStyle/>
+          <a:p>
+            <a:r>
+              <a:rPr lang="en-US" sz="2400" dirty="0" smtClean="0">
+                <a:solidFill>
+                  <a:srgbClr val="FF0000"/>
+                </a:solidFill>
+              </a:rPr>
+              <a:t>STEP: 6 / 8</a:t>
+            </a:r>
+            <a:endParaRPr lang="en-US" dirty="0">
+              <a:solidFill>
+                <a:srgbClr val="FF0000"/>
+              </a:solidFill>
+            </a:endParaRPr>
+          </a:p>
+        </p:txBody>
+      </p:sp>
     </p:spTree>
     <p:extLst>
       <p:ext uri="{BB962C8B-B14F-4D97-AF65-F5344CB8AC3E}">
-        <p14:creationId xmlns:p14="http://schemas.microsoft.com/office/powerpoint/2010/main" val="3101390788"/>
+        <p14:creationId xmlns:p14="http://schemas.microsoft.com/office/powerpoint/2010/main" val="2172344198"/>
       </p:ext>
     </p:extLst>
   </p:cSld>
@@ -3834,7 +4066,7 @@
           <a:p>
             <a:r>
               <a:rPr lang="en-US" dirty="0" smtClean="0"/>
-              <a:t>Quantity:</a:t>
+              <a:t>Heavy Duty Door Closer</a:t>
             </a:r>
             <a:endParaRPr lang="en-US" dirty="0"/>
           </a:p>
@@ -3866,33 +4098,27 @@
             </a:pPr>
             <a:r>
               <a:rPr lang="en-US" dirty="0" smtClean="0"/>
-              <a:t>Enter </a:t>
-            </a:r>
-            <a:r>
-              <a:rPr lang="en-US" dirty="0" err="1" smtClean="0"/>
-              <a:t>Qty</a:t>
-            </a:r>
+              <a:t>Heavy Duty Door Closer Required?</a:t>
+            </a:r>
+          </a:p>
+          <a:p>
+            <a:pPr marL="0" indent="0" algn="ctr">
+              <a:buNone/>
+            </a:pPr>
             <a:r>
               <a:rPr lang="en-US" dirty="0" smtClean="0"/>
-              <a:t>: </a:t>
-            </a:r>
-            <a:r>
-              <a:rPr lang="en-US" dirty="0" smtClean="0">
-                <a:solidFill>
-                  <a:schemeClr val="bg1">
-                    <a:lumMod val="65000"/>
-                  </a:schemeClr>
-                </a:solidFill>
-              </a:rPr>
-              <a:t>1</a:t>
-            </a:r>
-            <a:endParaRPr lang="en-US" dirty="0">
-              <a:solidFill>
-                <a:schemeClr val="bg1">
-                  <a:lumMod val="65000"/>
-                </a:schemeClr>
-              </a:solidFill>
-            </a:endParaRPr>
+              <a:t>Yes</a:t>
+            </a:r>
+          </a:p>
+          <a:p>
+            <a:pPr marL="0" indent="0" algn="ctr">
+              <a:buNone/>
+            </a:pPr>
+            <a:r>
+              <a:rPr lang="en-US" dirty="0" smtClean="0"/>
+              <a:t>No</a:t>
+            </a:r>
+            <a:endParaRPr lang="en-US" dirty="0"/>
           </a:p>
         </p:txBody>
       </p:sp>
@@ -3904,7 +4130,7 @@
         </p:nvSpPr>
         <p:spPr>
           <a:xfrm>
-            <a:off x="5188974" y="4913415"/>
+            <a:off x="5188974" y="4262284"/>
             <a:ext cx="1814052" cy="501446"/>
           </a:xfrm>
           <a:prstGeom prst="roundRect">
@@ -3934,7 +4160,7 @@
             <a:pPr algn="ctr"/>
             <a:r>
               <a:rPr lang="en-US" b="1" dirty="0" smtClean="0"/>
-              <a:t>FINISH</a:t>
+              <a:t>NEXT</a:t>
             </a:r>
             <a:endParaRPr lang="en-US" b="1" dirty="0"/>
           </a:p>
@@ -3942,7 +4168,51 @@
       </p:sp>
       <p:sp>
         <p:nvSpPr>
-          <p:cNvPr id="8" name="Rounded Rectangle 7"/>
+          <p:cNvPr id="10" name="Rounded Rectangle 9"/>
+          <p:cNvSpPr/>
+          <p:nvPr/>
+        </p:nvSpPr>
+        <p:spPr>
+          <a:xfrm>
+            <a:off x="4611395" y="5058075"/>
+            <a:ext cx="2745658" cy="501446"/>
+          </a:xfrm>
+          <a:prstGeom prst="roundRect">
+            <a:avLst/>
+          </a:prstGeom>
+        </p:spPr>
+        <p:style>
+          <a:lnRef idx="2">
+            <a:schemeClr val="accent3">
+              <a:shade val="50000"/>
+            </a:schemeClr>
+          </a:lnRef>
+          <a:fillRef idx="1">
+            <a:schemeClr val="accent3"/>
+          </a:fillRef>
+          <a:effectRef idx="0">
+            <a:schemeClr val="accent3"/>
+          </a:effectRef>
+          <a:fontRef idx="minor">
+            <a:schemeClr val="lt1"/>
+          </a:fontRef>
+        </p:style>
+        <p:txBody>
+          <a:bodyPr rtlCol="0" anchor="ctr"/>
+          <a:lstStyle/>
+          <a:p>
+            <a:pPr algn="ctr"/>
+            <a:r>
+              <a:rPr lang="en-US" b="1" dirty="0" smtClean="0"/>
+              <a:t>Not Required</a:t>
+            </a:r>
+            <a:endParaRPr lang="en-US" b="1" dirty="0"/>
+          </a:p>
+        </p:txBody>
+      </p:sp>
+      <p:sp>
+        <p:nvSpPr>
+          <p:cNvPr id="11" name="Rounded Rectangle 10"/>
           <p:cNvSpPr/>
           <p:nvPr/>
         </p:nvSpPr>
@@ -3986,52 +4256,46 @@
       </p:sp>
       <p:sp>
         <p:nvSpPr>
-          <p:cNvPr id="11" name="Rounded Rectangle 10"/>
-          <p:cNvSpPr/>
+          <p:cNvPr id="8" name="TextBox 7"/>
+          <p:cNvSpPr txBox="1"/>
           <p:nvPr/>
         </p:nvSpPr>
         <p:spPr>
           <a:xfrm>
-            <a:off x="5188974" y="4232788"/>
-            <a:ext cx="1814052" cy="501446"/>
-          </a:xfrm>
-          <a:prstGeom prst="roundRect">
+            <a:off x="10208302" y="749508"/>
+            <a:ext cx="1501821" cy="461665"/>
+          </a:xfrm>
+          <a:prstGeom prst="rect">
             <a:avLst/>
           </a:prstGeom>
-        </p:spPr>
-        <p:style>
-          <a:lnRef idx="2">
-            <a:schemeClr val="accent1">
-              <a:shade val="50000"/>
-            </a:schemeClr>
-          </a:lnRef>
-          <a:fillRef idx="1">
-            <a:schemeClr val="accent1"/>
-          </a:fillRef>
-          <a:effectRef idx="0">
-            <a:schemeClr val="accent1"/>
-          </a:effectRef>
-          <a:fontRef idx="minor">
-            <a:schemeClr val="lt1"/>
-          </a:fontRef>
-        </p:style>
-        <p:txBody>
-          <a:bodyPr rtlCol="0" anchor="ctr"/>
-          <a:lstStyle/>
-          <a:p>
-            <a:pPr algn="ctr"/>
-            <a:r>
-              <a:rPr lang="en-US" b="1" dirty="0" smtClean="0"/>
-              <a:t>Add New Door</a:t>
-            </a:r>
-            <a:endParaRPr lang="en-US" b="1" dirty="0"/>
+          <a:noFill/>
+        </p:spPr>
+        <p:txBody>
+          <a:bodyPr wrap="none" rtlCol="0">
+            <a:spAutoFit/>
+          </a:bodyPr>
+          <a:lstStyle/>
+          <a:p>
+            <a:r>
+              <a:rPr lang="en-US" sz="2400" dirty="0" smtClean="0">
+                <a:solidFill>
+                  <a:srgbClr val="FF0000"/>
+                </a:solidFill>
+              </a:rPr>
+              <a:t>STEP: 7 / 8</a:t>
+            </a:r>
+            <a:endParaRPr lang="en-US" dirty="0">
+              <a:solidFill>
+                <a:srgbClr val="FF0000"/>
+              </a:solidFill>
+            </a:endParaRPr>
           </a:p>
         </p:txBody>
       </p:sp>
     </p:spTree>
     <p:extLst>
       <p:ext uri="{BB962C8B-B14F-4D97-AF65-F5344CB8AC3E}">
-        <p14:creationId xmlns:p14="http://schemas.microsoft.com/office/powerpoint/2010/main" val="2927855239"/>
+        <p14:creationId xmlns:p14="http://schemas.microsoft.com/office/powerpoint/2010/main" val="3101390788"/>
       </p:ext>
     </p:extLst>
   </p:cSld>
@@ -4082,7 +4346,7 @@
           <a:p>
             <a:r>
               <a:rPr lang="en-US" dirty="0" smtClean="0"/>
-              <a:t>Price of Door:</a:t>
+              <a:t>Quantity:</a:t>
             </a:r>
             <a:endParaRPr lang="en-US" dirty="0"/>
           </a:p>
@@ -4114,53 +4378,33 @@
             </a:pPr>
             <a:r>
               <a:rPr lang="en-US" dirty="0" smtClean="0"/>
-              <a:t>Metal Door Specs and Price:</a:t>
-            </a:r>
-            <a:endParaRPr lang="en-US" dirty="0"/>
-          </a:p>
-        </p:txBody>
-      </p:sp>
-      <p:sp>
-        <p:nvSpPr>
-          <p:cNvPr id="10" name="Rounded Rectangle 9"/>
-          <p:cNvSpPr/>
-          <p:nvPr/>
-        </p:nvSpPr>
-        <p:spPr>
-          <a:xfrm>
-            <a:off x="4723171" y="5322862"/>
-            <a:ext cx="2745658" cy="501446"/>
-          </a:xfrm>
-          <a:prstGeom prst="roundRect">
-            <a:avLst/>
-          </a:prstGeom>
-        </p:spPr>
-        <p:style>
-          <a:lnRef idx="2">
-            <a:schemeClr val="accent3">
-              <a:shade val="50000"/>
-            </a:schemeClr>
-          </a:lnRef>
-          <a:fillRef idx="1">
-            <a:schemeClr val="accent3"/>
-          </a:fillRef>
-          <a:effectRef idx="0">
-            <a:schemeClr val="accent3"/>
-          </a:effectRef>
-          <a:fontRef idx="minor">
-            <a:schemeClr val="lt1"/>
-          </a:fontRef>
-        </p:style>
-        <p:txBody>
-          <a:bodyPr rtlCol="0" anchor="ctr"/>
-          <a:lstStyle/>
-          <a:p>
-            <a:pPr algn="ctr"/>
-            <a:r>
-              <a:rPr lang="en-US" b="1" dirty="0" smtClean="0"/>
-              <a:t>Restart</a:t>
-            </a:r>
-            <a:endParaRPr lang="en-US" b="1" dirty="0"/>
+              <a:t>Enter </a:t>
+            </a:r>
+            <a:r>
+              <a:rPr lang="en-US" dirty="0" err="1" smtClean="0"/>
+              <a:t>Qty</a:t>
+            </a:r>
+            <a:r>
+              <a:rPr lang="en-US" dirty="0" smtClean="0"/>
+              <a:t>: </a:t>
+            </a:r>
+            <a:r>
+              <a:rPr lang="en-US" dirty="0" smtClean="0">
+                <a:solidFill>
+                  <a:schemeClr val="bg1">
+                    <a:lumMod val="65000"/>
+                  </a:schemeClr>
+                </a:solidFill>
+              </a:rPr>
+              <a:t>1</a:t>
+            </a:r>
+            <a:endParaRPr lang="en-US" dirty="0">
+              <a:solidFill>
+                <a:schemeClr val="bg1">
+                  <a:lumMod val="65000"/>
+                </a:schemeClr>
+              </a:solidFill>
+            </a:endParaRPr>
           </a:p>
         </p:txBody>
       </p:sp>
@@ -4172,7 +4416,7 @@
         </p:nvSpPr>
         <p:spPr>
           <a:xfrm>
-            <a:off x="1695147" y="4262284"/>
+            <a:off x="5188974" y="4318886"/>
             <a:ext cx="1814052" cy="501446"/>
           </a:xfrm>
           <a:prstGeom prst="roundRect">
@@ -4202,16 +4446,98 @@
             <a:pPr algn="ctr"/>
             <a:r>
               <a:rPr lang="en-US" b="1" dirty="0" smtClean="0"/>
+              <a:t>FINISH</a:t>
+            </a:r>
+            <a:endParaRPr lang="en-US" b="1" dirty="0"/>
+          </a:p>
+        </p:txBody>
+      </p:sp>
+      <p:sp>
+        <p:nvSpPr>
+          <p:cNvPr id="8" name="Rounded Rectangle 7"/>
+          <p:cNvSpPr/>
+          <p:nvPr/>
+        </p:nvSpPr>
+        <p:spPr>
+          <a:xfrm>
+            <a:off x="1695147" y="4262284"/>
+            <a:ext cx="1814052" cy="501446"/>
+          </a:xfrm>
+          <a:prstGeom prst="roundRect">
+            <a:avLst/>
+          </a:prstGeom>
+        </p:spPr>
+        <p:style>
+          <a:lnRef idx="2">
+            <a:schemeClr val="accent1">
+              <a:shade val="50000"/>
+            </a:schemeClr>
+          </a:lnRef>
+          <a:fillRef idx="1">
+            <a:schemeClr val="accent1"/>
+          </a:fillRef>
+          <a:effectRef idx="0">
+            <a:schemeClr val="accent1"/>
+          </a:effectRef>
+          <a:fontRef idx="minor">
+            <a:schemeClr val="lt1"/>
+          </a:fontRef>
+        </p:style>
+        <p:txBody>
+          <a:bodyPr rtlCol="0" anchor="ctr"/>
+          <a:lstStyle/>
+          <a:p>
+            <a:pPr algn="ctr"/>
+            <a:r>
+              <a:rPr lang="en-US" b="1" dirty="0" smtClean="0"/>
               <a:t>BACK</a:t>
             </a:r>
             <a:endParaRPr lang="en-US" b="1" dirty="0"/>
+          </a:p>
+        </p:txBody>
+      </p:sp>
+      <p:sp>
+        <p:nvSpPr>
+          <p:cNvPr id="9" name="TextBox 8"/>
+          <p:cNvSpPr txBox="1"/>
+          <p:nvPr/>
+        </p:nvSpPr>
+        <p:spPr>
+          <a:xfrm>
+            <a:off x="10208302" y="749508"/>
+            <a:ext cx="1501821" cy="461665"/>
+          </a:xfrm>
+          <a:prstGeom prst="rect">
+            <a:avLst/>
+          </a:prstGeom>
+          <a:noFill/>
+        </p:spPr>
+        <p:txBody>
+          <a:bodyPr wrap="none" rtlCol="0">
+            <a:spAutoFit/>
+          </a:bodyPr>
+          <a:lstStyle/>
+          <a:p>
+            <a:r>
+              <a:rPr lang="en-US" sz="2400" dirty="0" smtClean="0">
+                <a:solidFill>
+                  <a:srgbClr val="FF0000"/>
+                </a:solidFill>
+              </a:rPr>
+              <a:t>STEP: 8 / 8</a:t>
+            </a:r>
+            <a:endParaRPr lang="en-US" dirty="0">
+              <a:solidFill>
+                <a:srgbClr val="FF0000"/>
+              </a:solidFill>
+            </a:endParaRPr>
           </a:p>
         </p:txBody>
       </p:sp>
     </p:spTree>
     <p:extLst>
       <p:ext uri="{BB962C8B-B14F-4D97-AF65-F5344CB8AC3E}">
-        <p14:creationId xmlns:p14="http://schemas.microsoft.com/office/powerpoint/2010/main" val="726091505"/>
+        <p14:creationId xmlns:p14="http://schemas.microsoft.com/office/powerpoint/2010/main" val="2927855239"/>
       </p:ext>
     </p:extLst>
   </p:cSld>
@@ -4698,7 +5024,6 @@
               <a:rPr lang="en-US" dirty="0" smtClean="0"/>
               <a:t>* At 25$ per hour</a:t>
             </a:r>
-            <a:endParaRPr lang="en-US" dirty="0" smtClean="0"/>
           </a:p>
         </p:txBody>
       </p:sp>
@@ -4870,11 +5195,22 @@
             </a:pPr>
             <a:r>
               <a:rPr lang="en-US" dirty="0" smtClean="0"/>
-              <a:t>Company Name: [</a:t>
-            </a:r>
-            <a:r>
-              <a:rPr lang="en-US" dirty="0" smtClean="0"/>
-              <a:t>TEXT AREA</a:t>
+              <a:t>Company Name: [TEXT AREA]</a:t>
+            </a:r>
+          </a:p>
+          <a:p>
+            <a:pPr marL="0" indent="0" algn="ctr">
+              <a:buNone/>
+            </a:pPr>
+            <a:endParaRPr lang="en-US" dirty="0" smtClean="0"/>
+          </a:p>
+          <a:p>
+            <a:pPr marL="0" indent="0" algn="ctr">
+              <a:buNone/>
+            </a:pPr>
+            <a:r>
+              <a:rPr lang="en-US" dirty="0"/>
+              <a:t>Project Name and Description: [12 Doors for Site Branch</a:t>
             </a:r>
             <a:r>
               <a:rPr lang="en-US" dirty="0" smtClean="0"/>
@@ -4885,34 +5221,15 @@
             <a:pPr marL="0" indent="0" algn="ctr">
               <a:buNone/>
             </a:pPr>
-            <a:endParaRPr lang="en-US" dirty="0" smtClean="0"/>
+            <a:endParaRPr lang="en-US" dirty="0"/>
           </a:p>
           <a:p>
             <a:pPr marL="0" indent="0" algn="ctr">
               <a:buNone/>
             </a:pPr>
             <a:r>
-              <a:rPr lang="en-US" dirty="0"/>
-              <a:t>Project Name and Description: [12 Doors for Site Branch</a:t>
-            </a:r>
-            <a:r>
               <a:rPr lang="en-US" dirty="0" smtClean="0"/>
-              <a:t>]</a:t>
-            </a:r>
-          </a:p>
-          <a:p>
-            <a:pPr marL="0" indent="0" algn="ctr">
-              <a:buNone/>
-            </a:pPr>
-            <a:endParaRPr lang="en-US" dirty="0"/>
-          </a:p>
-          <a:p>
-            <a:pPr marL="0" indent="0" algn="ctr">
-              <a:buNone/>
-            </a:pPr>
-            <a:r>
-              <a:rPr lang="en-US" dirty="0" smtClean="0"/>
-              <a:t>Units: mm or inch</a:t>
+              <a:t>Units: meter, mm, inch</a:t>
             </a:r>
           </a:p>
           <a:p>
@@ -4968,6 +5285,50 @@
             <a:r>
               <a:rPr lang="en-US" b="1" dirty="0" smtClean="0"/>
               <a:t>NEXT</a:t>
+            </a:r>
+            <a:endParaRPr lang="en-US" b="1" dirty="0"/>
+          </a:p>
+        </p:txBody>
+      </p:sp>
+      <p:sp>
+        <p:nvSpPr>
+          <p:cNvPr id="8" name="Rounded Rectangle 7"/>
+          <p:cNvSpPr/>
+          <p:nvPr/>
+        </p:nvSpPr>
+        <p:spPr>
+          <a:xfrm>
+            <a:off x="5188974" y="5810454"/>
+            <a:ext cx="1814052" cy="501446"/>
+          </a:xfrm>
+          <a:prstGeom prst="roundRect">
+            <a:avLst/>
+          </a:prstGeom>
+        </p:spPr>
+        <p:style>
+          <a:lnRef idx="2">
+            <a:schemeClr val="accent1">
+              <a:shade val="50000"/>
+            </a:schemeClr>
+          </a:lnRef>
+          <a:fillRef idx="1">
+            <a:schemeClr val="accent1"/>
+          </a:fillRef>
+          <a:effectRef idx="0">
+            <a:schemeClr val="accent1"/>
+          </a:effectRef>
+          <a:fontRef idx="minor">
+            <a:schemeClr val="lt1"/>
+          </a:fontRef>
+        </p:style>
+        <p:txBody>
+          <a:bodyPr rtlCol="0" anchor="ctr"/>
+          <a:lstStyle/>
+          <a:p>
+            <a:pPr algn="ctr"/>
+            <a:r>
+              <a:rPr lang="en-US" b="1" dirty="0" smtClean="0"/>
+              <a:t>Add Item</a:t>
             </a:r>
             <a:endParaRPr lang="en-US" b="1" dirty="0"/>
           </a:p>
@@ -5012,7 +5373,7 @@
       </p:grpSpPr>
       <p:sp>
         <p:nvSpPr>
-          <p:cNvPr id="5" name="Title 4"/>
+          <p:cNvPr id="2" name="Title 1"/>
           <p:cNvSpPr>
             <a:spLocks noGrp="1"/>
           </p:cNvSpPr>
@@ -5027,7 +5388,7 @@
           <a:p>
             <a:r>
               <a:rPr lang="en-US" dirty="0" smtClean="0"/>
-              <a:t>Door Leafs</a:t>
+              <a:t>New Quote</a:t>
             </a:r>
             <a:endParaRPr lang="en-US" dirty="0"/>
           </a:p>
@@ -5035,7 +5396,7 @@
       </p:sp>
       <p:sp>
         <p:nvSpPr>
-          <p:cNvPr id="6" name="Content Placeholder 5"/>
+          <p:cNvPr id="3" name="Content Placeholder 2"/>
           <p:cNvSpPr>
             <a:spLocks noGrp="1"/>
           </p:cNvSpPr>
@@ -5048,18 +5409,35 @@
           <a:bodyPr/>
           <a:lstStyle/>
           <a:p>
-            <a:pPr marL="0" indent="0" algn="ctr">
-              <a:buNone/>
-            </a:pPr>
-            <a:endParaRPr lang="en-US" dirty="0" smtClean="0"/>
-          </a:p>
-          <a:p>
-            <a:pPr marL="0" indent="0" algn="ctr">
-              <a:buNone/>
-            </a:pPr>
             <a:r>
               <a:rPr lang="en-US" dirty="0" smtClean="0"/>
-              <a:t>Select Door Type:</a:t>
+              <a:t>Item-1				[Edit]</a:t>
+            </a:r>
+            <a:r>
+              <a:rPr lang="en-US" dirty="0"/>
+              <a:t>	</a:t>
+            </a:r>
+            <a:r>
+              <a:rPr lang="en-US" dirty="0" smtClean="0"/>
+              <a:t>	[Delete]	[Duplicate]</a:t>
+            </a:r>
+          </a:p>
+          <a:p>
+            <a:r>
+              <a:rPr lang="en-US" dirty="0" smtClean="0"/>
+              <a:t>Item-2				[Edit]		[Delete]	[Duplicate]</a:t>
+            </a:r>
+          </a:p>
+          <a:p>
+            <a:r>
+              <a:rPr lang="en-US" dirty="0" smtClean="0"/>
+              <a:t>…</a:t>
+            </a:r>
+          </a:p>
+          <a:p>
+            <a:r>
+              <a:rPr lang="en-US" dirty="0" smtClean="0"/>
+              <a:t>Add Item				[Edit]		[Delete]</a:t>
             </a:r>
             <a:endParaRPr lang="en-US" dirty="0"/>
           </a:p>
@@ -5067,14 +5445,14 @@
       </p:sp>
       <p:sp>
         <p:nvSpPr>
-          <p:cNvPr id="7" name="Rounded Rectangle 6"/>
+          <p:cNvPr id="4" name="Rounded Rectangle 3"/>
           <p:cNvSpPr/>
           <p:nvPr/>
         </p:nvSpPr>
         <p:spPr>
           <a:xfrm>
-            <a:off x="5188974" y="4262284"/>
-            <a:ext cx="1814052" cy="501446"/>
+            <a:off x="4407108" y="5366479"/>
+            <a:ext cx="2068643" cy="509665"/>
           </a:xfrm>
           <a:prstGeom prst="roundRect">
             <a:avLst/>
@@ -5102,162 +5480,23 @@
           <a:p>
             <a:pPr algn="ctr"/>
             <a:r>
-              <a:rPr lang="en-US" b="1" dirty="0" smtClean="0"/>
-              <a:t>NEXT</a:t>
-            </a:r>
-            <a:endParaRPr lang="en-US" b="1" dirty="0"/>
-          </a:p>
-        </p:txBody>
-      </p:sp>
-      <p:sp>
-        <p:nvSpPr>
-          <p:cNvPr id="2" name="TextBox 1"/>
-          <p:cNvSpPr txBox="1"/>
-          <p:nvPr/>
-        </p:nvSpPr>
-        <p:spPr>
-          <a:xfrm>
-            <a:off x="5663380" y="3052916"/>
-            <a:ext cx="2330245" cy="923330"/>
-          </a:xfrm>
-          <a:prstGeom prst="rect">
-            <a:avLst/>
-          </a:prstGeom>
-          <a:noFill/>
-        </p:spPr>
-        <p:txBody>
-          <a:bodyPr wrap="square" rtlCol="0">
-            <a:spAutoFit/>
-          </a:bodyPr>
-          <a:lstStyle/>
-          <a:p>
-            <a:pPr marL="285750" indent="-285750">
-              <a:buFont typeface="Arial" panose="020B0604020202020204" pitchFamily="34" charset="0"/>
-              <a:buChar char="•"/>
-            </a:pPr>
-            <a:r>
               <a:rPr lang="en-US" dirty="0" smtClean="0"/>
-              <a:t>Single Door</a:t>
-            </a:r>
-          </a:p>
-          <a:p>
-            <a:pPr marL="285750" indent="-285750">
-              <a:buFont typeface="Arial" panose="020B0604020202020204" pitchFamily="34" charset="0"/>
-              <a:buChar char="•"/>
-            </a:pPr>
-            <a:r>
-              <a:rPr lang="en-US" dirty="0" smtClean="0"/>
-              <a:t>Double Door</a:t>
-            </a:r>
-          </a:p>
-          <a:p>
-            <a:r>
-              <a:rPr lang="en-US" dirty="0" smtClean="0"/>
-              <a:t>(radio </a:t>
-            </a:r>
-            <a:r>
-              <a:rPr lang="en-US" dirty="0" err="1" smtClean="0"/>
-              <a:t>btns</a:t>
-            </a:r>
-            <a:r>
-              <a:rPr lang="en-US" dirty="0" smtClean="0"/>
-              <a:t>)</a:t>
+              <a:t>Generate Quote</a:t>
             </a:r>
             <a:endParaRPr lang="en-US" dirty="0"/>
-          </a:p>
-        </p:txBody>
-      </p:sp>
-      <p:sp>
-        <p:nvSpPr>
-          <p:cNvPr id="8" name="TextBox 7"/>
-          <p:cNvSpPr txBox="1"/>
-          <p:nvPr/>
-        </p:nvSpPr>
-        <p:spPr>
-          <a:xfrm>
-            <a:off x="707923" y="6176963"/>
-            <a:ext cx="2472152" cy="369332"/>
-          </a:xfrm>
-          <a:prstGeom prst="rect">
-            <a:avLst/>
-          </a:prstGeom>
-          <a:noFill/>
-        </p:spPr>
-        <p:txBody>
-          <a:bodyPr wrap="none" rtlCol="0">
-            <a:spAutoFit/>
-          </a:bodyPr>
-          <a:lstStyle/>
-          <a:p>
-            <a:r>
-              <a:rPr lang="en-US" b="1" dirty="0" smtClean="0"/>
-              <a:t>Door type: Double Door</a:t>
-            </a:r>
-            <a:endParaRPr lang="en-US" b="1" dirty="0"/>
-          </a:p>
-        </p:txBody>
-      </p:sp>
-      <p:sp>
-        <p:nvSpPr>
-          <p:cNvPr id="9" name="Rounded Rectangle 8"/>
-          <p:cNvSpPr/>
-          <p:nvPr/>
-        </p:nvSpPr>
-        <p:spPr>
-          <a:xfrm>
-            <a:off x="1695147" y="4262284"/>
-            <a:ext cx="1814052" cy="501446"/>
-          </a:xfrm>
-          <a:prstGeom prst="roundRect">
-            <a:avLst/>
-          </a:prstGeom>
-        </p:spPr>
-        <p:style>
-          <a:lnRef idx="2">
-            <a:schemeClr val="accent1">
-              <a:shade val="50000"/>
-            </a:schemeClr>
-          </a:lnRef>
-          <a:fillRef idx="1">
-            <a:schemeClr val="accent1"/>
-          </a:fillRef>
-          <a:effectRef idx="0">
-            <a:schemeClr val="accent1"/>
-          </a:effectRef>
-          <a:fontRef idx="minor">
-            <a:schemeClr val="lt1"/>
-          </a:fontRef>
-        </p:style>
-        <p:txBody>
-          <a:bodyPr rtlCol="0" anchor="ctr"/>
-          <a:lstStyle/>
-          <a:p>
-            <a:pPr algn="ctr"/>
-            <a:r>
-              <a:rPr lang="en-US" b="1" dirty="0" smtClean="0"/>
-              <a:t>BACK</a:t>
-            </a:r>
-            <a:endParaRPr lang="en-US" b="1" dirty="0"/>
           </a:p>
         </p:txBody>
       </p:sp>
     </p:spTree>
     <p:extLst>
       <p:ext uri="{BB962C8B-B14F-4D97-AF65-F5344CB8AC3E}">
-        <p14:creationId xmlns:p14="http://schemas.microsoft.com/office/powerpoint/2010/main" val="715553429"/>
+        <p14:creationId xmlns:p14="http://schemas.microsoft.com/office/powerpoint/2010/main" val="4166192057"/>
       </p:ext>
     </p:extLst>
   </p:cSld>
   <p:clrMapOvr>
     <a:masterClrMapping/>
   </p:clrMapOvr>
-  <p:timing>
-    <p:tnLst>
-      <p:par>
-        <p:cTn id="1" dur="indefinite" restart="never" nodeType="tmRoot"/>
-      </p:par>
-    </p:tnLst>
-  </p:timing>
 </p:sld>
 </file>
 
@@ -5295,37 +5534,33 @@
           <a:p>
             <a:r>
               <a:rPr lang="en-US" dirty="0" smtClean="0"/>
-              <a:t>Select Door </a:t>
-            </a:r>
+              <a:t>Select Door Type/Fire Rating</a:t>
+            </a:r>
+            <a:endParaRPr lang="en-US" dirty="0"/>
+          </a:p>
+        </p:txBody>
+      </p:sp>
+      <p:sp>
+        <p:nvSpPr>
+          <p:cNvPr id="6" name="Content Placeholder 5"/>
+          <p:cNvSpPr>
+            <a:spLocks noGrp="1"/>
+          </p:cNvSpPr>
+          <p:nvPr>
+            <p:ph idx="1"/>
+          </p:nvPr>
+        </p:nvSpPr>
+        <p:spPr/>
+        <p:txBody>
+          <a:bodyPr/>
+          <a:lstStyle/>
+          <a:p>
+            <a:pPr marL="0" indent="0" algn="ctr">
+              <a:buNone/>
+            </a:pPr>
             <a:r>
               <a:rPr lang="en-US" dirty="0" smtClean="0"/>
-              <a:t>Type/Fire Rating</a:t>
-            </a:r>
-            <a:endParaRPr lang="en-US" dirty="0"/>
-          </a:p>
-        </p:txBody>
-      </p:sp>
-      <p:sp>
-        <p:nvSpPr>
-          <p:cNvPr id="6" name="Content Placeholder 5"/>
-          <p:cNvSpPr>
-            <a:spLocks noGrp="1"/>
-          </p:cNvSpPr>
-          <p:nvPr>
-            <p:ph idx="1"/>
-          </p:nvPr>
-        </p:nvSpPr>
-        <p:spPr/>
-        <p:txBody>
-          <a:bodyPr/>
-          <a:lstStyle/>
-          <a:p>
-            <a:pPr marL="0" indent="0" algn="ctr">
-              <a:buNone/>
-            </a:pPr>
-            <a:r>
-              <a:rPr lang="en-US" dirty="0" smtClean="0"/>
-              <a:t>Select Fire Rating</a:t>
+              <a:t>Select Door Type/Fire Rating</a:t>
             </a:r>
             <a:endParaRPr lang="en-US" dirty="0"/>
           </a:p>
@@ -5403,13 +5638,8 @@
             </a:pPr>
             <a:r>
               <a:rPr lang="en-US" dirty="0" smtClean="0"/>
-              <a:t>No Rating, std. Metal </a:t>
-            </a:r>
-            <a:r>
-              <a:rPr lang="en-US" dirty="0" smtClean="0"/>
-              <a:t>Door</a:t>
-            </a:r>
-            <a:endParaRPr lang="en-US" dirty="0" smtClean="0"/>
+              <a:t>std. Metal Door, no Fire Rating</a:t>
+            </a:r>
           </a:p>
           <a:p>
             <a:pPr marL="285750" indent="-285750">
@@ -5475,36 +5705,6 @@
               <a:t>)</a:t>
             </a:r>
             <a:endParaRPr lang="en-US" dirty="0"/>
-          </a:p>
-        </p:txBody>
-      </p:sp>
-      <p:sp>
-        <p:nvSpPr>
-          <p:cNvPr id="3" name="TextBox 2"/>
-          <p:cNvSpPr txBox="1"/>
-          <p:nvPr/>
-        </p:nvSpPr>
-        <p:spPr>
-          <a:xfrm>
-            <a:off x="707923" y="6176963"/>
-            <a:ext cx="1708160" cy="369332"/>
-          </a:xfrm>
-          <a:prstGeom prst="rect">
-            <a:avLst/>
-          </a:prstGeom>
-          <a:noFill/>
-        </p:spPr>
-        <p:txBody>
-          <a:bodyPr wrap="none" rtlCol="0">
-            <a:spAutoFit/>
-          </a:bodyPr>
-          <a:lstStyle/>
-          <a:p>
-            <a:r>
-              <a:rPr lang="en-US" b="1" dirty="0" smtClean="0"/>
-              <a:t>Units are in mm</a:t>
-            </a:r>
-            <a:endParaRPr lang="en-US" b="1" dirty="0"/>
           </a:p>
         </p:txBody>
       </p:sp>
@@ -5549,6 +5749,240 @@
               <a:t>BACK</a:t>
             </a:r>
             <a:endParaRPr lang="en-US" b="1" dirty="0"/>
+          </a:p>
+        </p:txBody>
+      </p:sp>
+      <p:sp>
+        <p:nvSpPr>
+          <p:cNvPr id="9" name="Rounded Rectangle 8"/>
+          <p:cNvSpPr/>
+          <p:nvPr/>
+        </p:nvSpPr>
+        <p:spPr>
+          <a:xfrm>
+            <a:off x="5188973" y="6061177"/>
+            <a:ext cx="2381059" cy="501446"/>
+          </a:xfrm>
+          <a:prstGeom prst="roundRect">
+            <a:avLst/>
+          </a:prstGeom>
+        </p:spPr>
+        <p:style>
+          <a:lnRef idx="2">
+            <a:schemeClr val="accent1">
+              <a:shade val="50000"/>
+            </a:schemeClr>
+          </a:lnRef>
+          <a:fillRef idx="1">
+            <a:schemeClr val="accent1"/>
+          </a:fillRef>
+          <a:effectRef idx="0">
+            <a:schemeClr val="accent1"/>
+          </a:effectRef>
+          <a:fontRef idx="minor">
+            <a:schemeClr val="lt1"/>
+          </a:fontRef>
+        </p:style>
+        <p:txBody>
+          <a:bodyPr rtlCol="0" anchor="ctr"/>
+          <a:lstStyle/>
+          <a:p>
+            <a:pPr algn="ctr"/>
+            <a:r>
+              <a:rPr lang="en-US" b="1" dirty="0" smtClean="0"/>
+              <a:t>All other Specs same as last door</a:t>
+            </a:r>
+            <a:endParaRPr lang="en-US" b="1" dirty="0"/>
+          </a:p>
+        </p:txBody>
+      </p:sp>
+      <p:sp>
+        <p:nvSpPr>
+          <p:cNvPr id="4" name="TextBox 3"/>
+          <p:cNvSpPr txBox="1"/>
+          <p:nvPr/>
+        </p:nvSpPr>
+        <p:spPr>
+          <a:xfrm>
+            <a:off x="10208302" y="749508"/>
+            <a:ext cx="1501821" cy="461665"/>
+          </a:xfrm>
+          <a:prstGeom prst="rect">
+            <a:avLst/>
+          </a:prstGeom>
+          <a:noFill/>
+        </p:spPr>
+        <p:txBody>
+          <a:bodyPr wrap="none" rtlCol="0">
+            <a:spAutoFit/>
+          </a:bodyPr>
+          <a:lstStyle/>
+          <a:p>
+            <a:r>
+              <a:rPr lang="en-US" sz="2400" dirty="0" smtClean="0">
+                <a:solidFill>
+                  <a:srgbClr val="FF0000"/>
+                </a:solidFill>
+              </a:rPr>
+              <a:t>STEP: 1 / 8</a:t>
+            </a:r>
+            <a:endParaRPr lang="en-US" dirty="0">
+              <a:solidFill>
+                <a:srgbClr val="FF0000"/>
+              </a:solidFill>
+            </a:endParaRPr>
+          </a:p>
+        </p:txBody>
+      </p:sp>
+      <p:sp>
+        <p:nvSpPr>
+          <p:cNvPr id="10" name="Rounded Rectangle 9"/>
+          <p:cNvSpPr/>
+          <p:nvPr/>
+        </p:nvSpPr>
+        <p:spPr>
+          <a:xfrm>
+            <a:off x="8185355" y="2507226"/>
+            <a:ext cx="3451121" cy="589935"/>
+          </a:xfrm>
+          <a:prstGeom prst="roundRect">
+            <a:avLst/>
+          </a:prstGeom>
+        </p:spPr>
+        <p:style>
+          <a:lnRef idx="2">
+            <a:schemeClr val="accent1">
+              <a:shade val="50000"/>
+            </a:schemeClr>
+          </a:lnRef>
+          <a:fillRef idx="1">
+            <a:schemeClr val="accent1"/>
+          </a:fillRef>
+          <a:effectRef idx="0">
+            <a:schemeClr val="accent1"/>
+          </a:effectRef>
+          <a:fontRef idx="minor">
+            <a:schemeClr val="lt1"/>
+          </a:fontRef>
+        </p:style>
+        <p:txBody>
+          <a:bodyPr rtlCol="0" anchor="ctr"/>
+          <a:lstStyle/>
+          <a:p>
+            <a:r>
+              <a:rPr lang="en-US" b="1" dirty="0"/>
+              <a:t>Total Costs</a:t>
+            </a:r>
+            <a:r>
+              <a:rPr lang="en-US" b="1" dirty="0" smtClean="0"/>
+              <a:t>:</a:t>
+            </a:r>
+            <a:endParaRPr lang="en-US" b="1" dirty="0"/>
+          </a:p>
+        </p:txBody>
+      </p:sp>
+      <p:sp>
+        <p:nvSpPr>
+          <p:cNvPr id="11" name="Rounded Rectangle 10"/>
+          <p:cNvSpPr/>
+          <p:nvPr/>
+        </p:nvSpPr>
+        <p:spPr>
+          <a:xfrm>
+            <a:off x="8185355" y="3740713"/>
+            <a:ext cx="3451121" cy="643552"/>
+          </a:xfrm>
+          <a:prstGeom prst="roundRect">
+            <a:avLst/>
+          </a:prstGeom>
+        </p:spPr>
+        <p:style>
+          <a:lnRef idx="2">
+            <a:schemeClr val="accent4">
+              <a:shade val="50000"/>
+            </a:schemeClr>
+          </a:lnRef>
+          <a:fillRef idx="1">
+            <a:schemeClr val="accent4"/>
+          </a:fillRef>
+          <a:effectRef idx="0">
+            <a:schemeClr val="accent4"/>
+          </a:effectRef>
+          <a:fontRef idx="minor">
+            <a:schemeClr val="lt1"/>
+          </a:fontRef>
+        </p:style>
+        <p:txBody>
+          <a:bodyPr rtlCol="0" anchor="ctr"/>
+          <a:lstStyle/>
+          <a:p>
+            <a:r>
+              <a:rPr lang="en-US" sz="1600" dirty="0" smtClean="0"/>
+              <a:t>Total: </a:t>
+            </a:r>
+            <a:r>
+              <a:rPr lang="en-US" sz="1600" dirty="0" err="1" smtClean="0"/>
+              <a:t>Rs</a:t>
+            </a:r>
+            <a:r>
+              <a:rPr lang="en-US" sz="1600" dirty="0" smtClean="0"/>
+              <a:t>. 45,000/-</a:t>
+            </a:r>
+            <a:endParaRPr lang="en-US" sz="1600" dirty="0"/>
+          </a:p>
+        </p:txBody>
+      </p:sp>
+      <p:sp>
+        <p:nvSpPr>
+          <p:cNvPr id="12" name="Rounded Rectangle 11"/>
+          <p:cNvSpPr/>
+          <p:nvPr/>
+        </p:nvSpPr>
+        <p:spPr>
+          <a:xfrm>
+            <a:off x="8185355" y="3097161"/>
+            <a:ext cx="3451121" cy="643552"/>
+          </a:xfrm>
+          <a:prstGeom prst="roundRect">
+            <a:avLst/>
+          </a:prstGeom>
+        </p:spPr>
+        <p:style>
+          <a:lnRef idx="2">
+            <a:schemeClr val="accent6">
+              <a:shade val="50000"/>
+            </a:schemeClr>
+          </a:lnRef>
+          <a:fillRef idx="1">
+            <a:schemeClr val="accent6"/>
+          </a:fillRef>
+          <a:effectRef idx="0">
+            <a:schemeClr val="accent6"/>
+          </a:effectRef>
+          <a:fontRef idx="minor">
+            <a:schemeClr val="lt1"/>
+          </a:fontRef>
+        </p:style>
+        <p:txBody>
+          <a:bodyPr rtlCol="0" anchor="ctr"/>
+          <a:lstStyle/>
+          <a:p>
+            <a:r>
+              <a:rPr lang="en-US" sz="1600" dirty="0" smtClean="0"/>
+              <a:t>Basic </a:t>
+            </a:r>
+            <a:r>
+              <a:rPr lang="en-US" sz="1600" dirty="0"/>
+              <a:t>Door 1000 x 2100 – </a:t>
+            </a:r>
+            <a:r>
+              <a:rPr lang="en-US" sz="1600" dirty="0" err="1"/>
+              <a:t>Rs</a:t>
+            </a:r>
+            <a:r>
+              <a:rPr lang="en-US" sz="1600" dirty="0"/>
+              <a:t>. 45,000</a:t>
+            </a:r>
           </a:p>
         </p:txBody>
       </p:sp>
@@ -5606,7 +6040,7 @@
           <a:p>
             <a:r>
               <a:rPr lang="en-US" dirty="0" smtClean="0"/>
-              <a:t>Door Size</a:t>
+              <a:t>Door Leafs</a:t>
             </a:r>
             <a:endParaRPr lang="en-US" dirty="0"/>
           </a:p>
@@ -5638,7 +6072,7 @@
             </a:pPr>
             <a:r>
               <a:rPr lang="en-US" dirty="0" smtClean="0"/>
-              <a:t>Enter Door Size:</a:t>
+              <a:t>Select Door Type:</a:t>
             </a:r>
             <a:endParaRPr lang="en-US" dirty="0"/>
           </a:p>
@@ -5690,14 +6124,14 @@
       </p:sp>
       <p:sp>
         <p:nvSpPr>
-          <p:cNvPr id="3" name="TextBox 2"/>
+          <p:cNvPr id="2" name="TextBox 1"/>
           <p:cNvSpPr txBox="1"/>
           <p:nvPr/>
         </p:nvSpPr>
         <p:spPr>
           <a:xfrm>
-            <a:off x="5188974" y="3097161"/>
-            <a:ext cx="918328" cy="369332"/>
+            <a:off x="5663380" y="3052916"/>
+            <a:ext cx="2330245" cy="923330"/>
           </a:xfrm>
           <a:prstGeom prst="rect">
             <a:avLst/>
@@ -5705,14 +6139,42 @@
           <a:noFill/>
         </p:spPr>
         <p:txBody>
-          <a:bodyPr wrap="none" rtlCol="0">
+          <a:bodyPr wrap="square" rtlCol="0">
             <a:spAutoFit/>
           </a:bodyPr>
           <a:lstStyle/>
           <a:p>
+            <a:pPr marL="285750" indent="-285750">
+              <a:buFont typeface="Arial" panose="020B0604020202020204" pitchFamily="34" charset="0"/>
+              <a:buChar char="•"/>
+            </a:pPr>
             <a:r>
               <a:rPr lang="en-US" dirty="0" smtClean="0"/>
-              <a:t>Height: </a:t>
+              <a:t>Single Door</a:t>
+            </a:r>
+          </a:p>
+          <a:p>
+            <a:pPr marL="285750" indent="-285750">
+              <a:buFont typeface="Arial" panose="020B0604020202020204" pitchFamily="34" charset="0"/>
+              <a:buChar char="•"/>
+            </a:pPr>
+            <a:r>
+              <a:rPr lang="en-US" dirty="0" smtClean="0"/>
+              <a:t>Double Door</a:t>
+            </a:r>
+          </a:p>
+          <a:p>
+            <a:r>
+              <a:rPr lang="en-US" dirty="0" smtClean="0"/>
+              <a:t>(radio </a:t>
+            </a:r>
+            <a:r>
+              <a:rPr lang="en-US" dirty="0" err="1" smtClean="0"/>
+              <a:t>btns</a:t>
+            </a:r>
+            <a:r>
+              <a:rPr lang="en-US" dirty="0" smtClean="0"/>
+              <a:t>)</a:t>
             </a:r>
             <a:endParaRPr lang="en-US" dirty="0"/>
           </a:p>
@@ -5720,67 +6182,7 @@
       </p:sp>
       <p:sp>
         <p:nvSpPr>
-          <p:cNvPr id="8" name="TextBox 7"/>
-          <p:cNvSpPr txBox="1"/>
-          <p:nvPr/>
-        </p:nvSpPr>
-        <p:spPr>
-          <a:xfrm>
-            <a:off x="5188974" y="3443749"/>
-            <a:ext cx="878767" cy="369332"/>
-          </a:xfrm>
-          <a:prstGeom prst="rect">
-            <a:avLst/>
-          </a:prstGeom>
-          <a:noFill/>
-        </p:spPr>
-        <p:txBody>
-          <a:bodyPr wrap="none" rtlCol="0">
-            <a:spAutoFit/>
-          </a:bodyPr>
-          <a:lstStyle/>
-          <a:p>
-            <a:r>
-              <a:rPr lang="en-US" dirty="0" smtClean="0"/>
-              <a:t>Width: </a:t>
-            </a:r>
-            <a:endParaRPr lang="en-US" dirty="0"/>
-          </a:p>
-        </p:txBody>
-      </p:sp>
-      <p:sp>
-        <p:nvSpPr>
-          <p:cNvPr id="9" name="TextBox 8"/>
-          <p:cNvSpPr txBox="1"/>
-          <p:nvPr/>
-        </p:nvSpPr>
-        <p:spPr>
-          <a:xfrm>
-            <a:off x="707923" y="6176963"/>
-            <a:ext cx="1817036" cy="369332"/>
-          </a:xfrm>
-          <a:prstGeom prst="rect">
-            <a:avLst/>
-          </a:prstGeom>
-          <a:noFill/>
-        </p:spPr>
-        <p:txBody>
-          <a:bodyPr wrap="none" rtlCol="0">
-            <a:spAutoFit/>
-          </a:bodyPr>
-          <a:lstStyle/>
-          <a:p>
-            <a:r>
-              <a:rPr lang="en-US" b="1" dirty="0" smtClean="0"/>
-              <a:t>Size: 2100 x 1000</a:t>
-            </a:r>
-            <a:endParaRPr lang="en-US" b="1" dirty="0"/>
-          </a:p>
-        </p:txBody>
-      </p:sp>
-      <p:sp>
-        <p:nvSpPr>
-          <p:cNvPr id="10" name="Rounded Rectangle 9"/>
+          <p:cNvPr id="9" name="Rounded Rectangle 8"/>
           <p:cNvSpPr/>
           <p:nvPr/>
         </p:nvSpPr>
@@ -5824,7 +6226,45 @@
       </p:sp>
       <p:sp>
         <p:nvSpPr>
-          <p:cNvPr id="4" name="Rounded Rectangle 3"/>
+          <p:cNvPr id="11" name="TextBox 10"/>
+          <p:cNvSpPr txBox="1"/>
+          <p:nvPr/>
+        </p:nvSpPr>
+        <p:spPr>
+          <a:xfrm>
+            <a:off x="10208302" y="749508"/>
+            <a:ext cx="1501821" cy="461665"/>
+          </a:xfrm>
+          <a:prstGeom prst="rect">
+            <a:avLst/>
+          </a:prstGeom>
+          <a:noFill/>
+        </p:spPr>
+        <p:txBody>
+          <a:bodyPr wrap="none" rtlCol="0">
+            <a:spAutoFit/>
+          </a:bodyPr>
+          <a:lstStyle/>
+          <a:p>
+            <a:r>
+              <a:rPr lang="en-US" sz="2400" dirty="0" smtClean="0">
+                <a:solidFill>
+                  <a:srgbClr val="FF0000"/>
+                </a:solidFill>
+              </a:rPr>
+              <a:t>STEP: 2 / 8</a:t>
+            </a:r>
+            <a:endParaRPr lang="en-US" dirty="0">
+              <a:solidFill>
+                <a:srgbClr val="FF0000"/>
+              </a:solidFill>
+            </a:endParaRPr>
+          </a:p>
+        </p:txBody>
+      </p:sp>
+      <p:sp>
+        <p:nvSpPr>
+          <p:cNvPr id="12" name="Rounded Rectangle 11"/>
           <p:cNvSpPr/>
           <p:nvPr/>
         </p:nvSpPr>
@@ -5877,6 +6317,57 @@
         </p:nvSpPr>
         <p:spPr>
           <a:xfrm>
+            <a:off x="8185355" y="3740713"/>
+            <a:ext cx="3451121" cy="643552"/>
+          </a:xfrm>
+          <a:prstGeom prst="roundRect">
+            <a:avLst/>
+          </a:prstGeom>
+        </p:spPr>
+        <p:style>
+          <a:lnRef idx="2">
+            <a:schemeClr val="accent4">
+              <a:shade val="50000"/>
+            </a:schemeClr>
+          </a:lnRef>
+          <a:fillRef idx="1">
+            <a:schemeClr val="accent4"/>
+          </a:fillRef>
+          <a:effectRef idx="0">
+            <a:schemeClr val="accent4"/>
+          </a:effectRef>
+          <a:fontRef idx="minor">
+            <a:schemeClr val="lt1"/>
+          </a:fontRef>
+        </p:style>
+        <p:txBody>
+          <a:bodyPr rtlCol="0" anchor="ctr"/>
+          <a:lstStyle/>
+          <a:p>
+            <a:r>
+              <a:rPr lang="en-US" sz="1600" dirty="0" smtClean="0"/>
+              <a:t>Total: </a:t>
+            </a:r>
+            <a:r>
+              <a:rPr lang="en-US" sz="1600" dirty="0" err="1" smtClean="0"/>
+              <a:t>Rs</a:t>
+            </a:r>
+            <a:r>
+              <a:rPr lang="en-US" sz="1600" dirty="0" smtClean="0"/>
+              <a:t>. 45,000/-</a:t>
+            </a:r>
+            <a:endParaRPr lang="en-US" sz="1600" dirty="0"/>
+          </a:p>
+        </p:txBody>
+      </p:sp>
+      <p:sp>
+        <p:nvSpPr>
+          <p:cNvPr id="14" name="Rounded Rectangle 13"/>
+          <p:cNvSpPr/>
+          <p:nvPr/>
+        </p:nvSpPr>
+        <p:spPr>
+          <a:xfrm>
             <a:off x="8185355" y="3097161"/>
             <a:ext cx="3451121" cy="643552"/>
           </a:xfrm>
@@ -5920,65 +6411,13 @@
               <a:rPr lang="en-US" sz="1600" dirty="0"/>
               <a:t>. 45,000</a:t>
             </a:r>
-            <a:endParaRPr lang="en-US" sz="1600" dirty="0"/>
-          </a:p>
-        </p:txBody>
-      </p:sp>
-      <p:sp>
-        <p:nvSpPr>
-          <p:cNvPr id="14" name="Rounded Rectangle 13"/>
-          <p:cNvSpPr/>
-          <p:nvPr/>
-        </p:nvSpPr>
-        <p:spPr>
-          <a:xfrm>
-            <a:off x="8185355" y="3740713"/>
-            <a:ext cx="3451121" cy="643552"/>
-          </a:xfrm>
-          <a:prstGeom prst="roundRect">
-            <a:avLst/>
-          </a:prstGeom>
-        </p:spPr>
-        <p:style>
-          <a:lnRef idx="2">
-            <a:schemeClr val="accent4">
-              <a:shade val="50000"/>
-            </a:schemeClr>
-          </a:lnRef>
-          <a:fillRef idx="1">
-            <a:schemeClr val="accent4"/>
-          </a:fillRef>
-          <a:effectRef idx="0">
-            <a:schemeClr val="accent4"/>
-          </a:effectRef>
-          <a:fontRef idx="minor">
-            <a:schemeClr val="lt1"/>
-          </a:fontRef>
-        </p:style>
-        <p:txBody>
-          <a:bodyPr rtlCol="0" anchor="ctr"/>
-          <a:lstStyle/>
-          <a:p>
-            <a:r>
-              <a:rPr lang="en-US" sz="1600" dirty="0" smtClean="0"/>
-              <a:t>Total: </a:t>
-            </a:r>
-            <a:r>
-              <a:rPr lang="en-US" sz="1600" dirty="0" err="1" smtClean="0"/>
-              <a:t>Rs</a:t>
-            </a:r>
-            <a:r>
-              <a:rPr lang="en-US" sz="1600" dirty="0" smtClean="0"/>
-              <a:t>. 45,000/-</a:t>
-            </a:r>
-            <a:endParaRPr lang="en-US" sz="1600" dirty="0"/>
           </a:p>
         </p:txBody>
       </p:sp>
     </p:spTree>
     <p:extLst>
       <p:ext uri="{BB962C8B-B14F-4D97-AF65-F5344CB8AC3E}">
-        <p14:creationId xmlns:p14="http://schemas.microsoft.com/office/powerpoint/2010/main" val="3839629399"/>
+        <p14:creationId xmlns:p14="http://schemas.microsoft.com/office/powerpoint/2010/main" val="715553429"/>
       </p:ext>
     </p:extLst>
   </p:cSld>
@@ -6029,7 +6468,7 @@
           <a:p>
             <a:r>
               <a:rPr lang="en-US" dirty="0" smtClean="0"/>
-              <a:t>Viewing Glass Required</a:t>
+              <a:t>Door Size</a:t>
             </a:r>
             <a:endParaRPr lang="en-US" dirty="0"/>
           </a:p>
@@ -6061,7 +6500,7 @@
             </a:pPr>
             <a:r>
               <a:rPr lang="en-US" dirty="0" smtClean="0"/>
-              <a:t>Enter Glass Size:</a:t>
+              <a:t>Enter Door Size:</a:t>
             </a:r>
             <a:endParaRPr lang="en-US" dirty="0"/>
           </a:p>
@@ -6120,7 +6559,7 @@
         <p:spPr>
           <a:xfrm>
             <a:off x="5188974" y="3097161"/>
-            <a:ext cx="1630062" cy="369332"/>
+            <a:ext cx="918328" cy="369332"/>
           </a:xfrm>
           <a:prstGeom prst="rect">
             <a:avLst/>
@@ -6135,7 +6574,7 @@
           <a:p>
             <a:r>
               <a:rPr lang="en-US" dirty="0" smtClean="0"/>
-              <a:t>Glass Height: 0 </a:t>
+              <a:t>Height: </a:t>
             </a:r>
             <a:endParaRPr lang="en-US" dirty="0"/>
           </a:p>
@@ -6150,7 +6589,7 @@
         <p:spPr>
           <a:xfrm>
             <a:off x="5188974" y="3443749"/>
-            <a:ext cx="1590500" cy="369332"/>
+            <a:ext cx="878767" cy="369332"/>
           </a:xfrm>
           <a:prstGeom prst="rect">
             <a:avLst/>
@@ -6165,83 +6604,9 @@
           <a:p>
             <a:r>
               <a:rPr lang="en-US" dirty="0" smtClean="0"/>
-              <a:t>Glass Width: 0 </a:t>
+              <a:t>Width: </a:t>
             </a:r>
             <a:endParaRPr lang="en-US" dirty="0"/>
-          </a:p>
-        </p:txBody>
-      </p:sp>
-      <p:sp>
-        <p:nvSpPr>
-          <p:cNvPr id="9" name="TextBox 8"/>
-          <p:cNvSpPr txBox="1"/>
-          <p:nvPr/>
-        </p:nvSpPr>
-        <p:spPr>
-          <a:xfrm>
-            <a:off x="707923" y="6176963"/>
-            <a:ext cx="3531095" cy="369332"/>
-          </a:xfrm>
-          <a:prstGeom prst="rect">
-            <a:avLst/>
-          </a:prstGeom>
-          <a:noFill/>
-        </p:spPr>
-        <p:txBody>
-          <a:bodyPr wrap="none" rtlCol="0">
-            <a:spAutoFit/>
-          </a:bodyPr>
-          <a:lstStyle/>
-          <a:p>
-            <a:r>
-              <a:rPr lang="en-US" b="1" dirty="0" smtClean="0"/>
-              <a:t>With Viewing Glass Size: 100 x 150 </a:t>
-            </a:r>
-            <a:endParaRPr lang="en-US" b="1" dirty="0"/>
-          </a:p>
-        </p:txBody>
-      </p:sp>
-      <p:sp>
-        <p:nvSpPr>
-          <p:cNvPr id="12" name="Rounded Rectangle 11"/>
-          <p:cNvSpPr/>
-          <p:nvPr/>
-        </p:nvSpPr>
-        <p:spPr>
-          <a:xfrm>
-            <a:off x="4611395" y="5058075"/>
-            <a:ext cx="2745658" cy="501446"/>
-          </a:xfrm>
-          <a:prstGeom prst="roundRect">
-            <a:avLst/>
-          </a:prstGeom>
-        </p:spPr>
-        <p:style>
-          <a:lnRef idx="2">
-            <a:schemeClr val="accent3">
-              <a:shade val="50000"/>
-            </a:schemeClr>
-          </a:lnRef>
-          <a:fillRef idx="1">
-            <a:schemeClr val="accent3"/>
-          </a:fillRef>
-          <a:effectRef idx="0">
-            <a:schemeClr val="accent3"/>
-          </a:effectRef>
-          <a:fontRef idx="minor">
-            <a:schemeClr val="lt1"/>
-          </a:fontRef>
-        </p:style>
-        <p:txBody>
-          <a:bodyPr rtlCol="0" anchor="ctr"/>
-          <a:lstStyle/>
-          <a:p>
-            <a:pPr algn="ctr"/>
-            <a:r>
-              <a:rPr lang="en-US" b="1" dirty="0" smtClean="0"/>
-              <a:t>Not Required</a:t>
-            </a:r>
-            <a:endParaRPr lang="en-US" b="1" dirty="0"/>
           </a:p>
         </p:txBody>
       </p:sp>
@@ -6291,14 +6656,14 @@
       </p:sp>
       <p:sp>
         <p:nvSpPr>
-          <p:cNvPr id="14" name="Rounded Rectangle 13"/>
+          <p:cNvPr id="4" name="Rounded Rectangle 3"/>
           <p:cNvSpPr/>
           <p:nvPr/>
         </p:nvSpPr>
         <p:spPr>
           <a:xfrm>
-            <a:off x="8185355" y="2772697"/>
-            <a:ext cx="3451121" cy="703724"/>
+            <a:off x="8185355" y="2507226"/>
+            <a:ext cx="3451121" cy="589935"/>
           </a:xfrm>
           <a:prstGeom prst="roundRect">
             <a:avLst/>
@@ -6332,37 +6697,19 @@
               <a:rPr lang="en-US" b="1" dirty="0" smtClean="0"/>
               <a:t>:</a:t>
             </a:r>
-          </a:p>
-          <a:p>
-            <a:r>
-              <a:rPr lang="en-US" sz="1600" dirty="0"/>
-              <a:t>Basic Door 1000 x 2100 – </a:t>
-            </a:r>
-            <a:r>
-              <a:rPr lang="en-US" sz="1600" dirty="0" err="1"/>
-              <a:t>Rs</a:t>
-            </a:r>
-            <a:r>
-              <a:rPr lang="en-US" sz="1600" dirty="0"/>
-              <a:t>. </a:t>
-            </a:r>
-            <a:r>
-              <a:rPr lang="en-US" sz="1600" dirty="0" smtClean="0"/>
-              <a:t>45,000/-</a:t>
-            </a:r>
-            <a:endParaRPr lang="en-US" sz="1600" b="1" dirty="0"/>
-          </a:p>
-        </p:txBody>
-      </p:sp>
-      <p:sp>
-        <p:nvSpPr>
-          <p:cNvPr id="15" name="Rounded Rectangle 14"/>
+            <a:endParaRPr lang="en-US" b="1" dirty="0"/>
+          </a:p>
+        </p:txBody>
+      </p:sp>
+      <p:sp>
+        <p:nvSpPr>
+          <p:cNvPr id="13" name="Rounded Rectangle 12"/>
           <p:cNvSpPr/>
           <p:nvPr/>
         </p:nvSpPr>
         <p:spPr>
           <a:xfrm>
-            <a:off x="8185355" y="3476421"/>
+            <a:off x="8185355" y="3097161"/>
             <a:ext cx="3451121" cy="643552"/>
           </a:xfrm>
           <a:prstGeom prst="roundRect">
@@ -6391,11 +6738,11 @@
           <a:p>
             <a:r>
               <a:rPr lang="en-US" sz="1600" dirty="0" smtClean="0"/>
-              <a:t>View Glass 21”x40” </a:t>
+              <a:t>Basic </a:t>
             </a:r>
             <a:r>
               <a:rPr lang="en-US" sz="1600" dirty="0"/>
-              <a:t>– </a:t>
+              <a:t>Door 1000 x 2100 – </a:t>
             </a:r>
             <a:r>
               <a:rPr lang="en-US" sz="1600" dirty="0" err="1"/>
@@ -6403,20 +6750,104 @@
             </a:r>
             <a:r>
               <a:rPr lang="en-US" sz="1600" dirty="0"/>
-              <a:t>. </a:t>
-            </a:r>
+              <a:t>. 45,000</a:t>
+            </a:r>
+          </a:p>
+        </p:txBody>
+      </p:sp>
+      <p:sp>
+        <p:nvSpPr>
+          <p:cNvPr id="14" name="Rounded Rectangle 13"/>
+          <p:cNvSpPr/>
+          <p:nvPr/>
+        </p:nvSpPr>
+        <p:spPr>
+          <a:xfrm>
+            <a:off x="8185355" y="3740713"/>
+            <a:ext cx="3451121" cy="643552"/>
+          </a:xfrm>
+          <a:prstGeom prst="roundRect">
+            <a:avLst/>
+          </a:prstGeom>
+        </p:spPr>
+        <p:style>
+          <a:lnRef idx="2">
+            <a:schemeClr val="accent4">
+              <a:shade val="50000"/>
+            </a:schemeClr>
+          </a:lnRef>
+          <a:fillRef idx="1">
+            <a:schemeClr val="accent4"/>
+          </a:fillRef>
+          <a:effectRef idx="0">
+            <a:schemeClr val="accent4"/>
+          </a:effectRef>
+          <a:fontRef idx="minor">
+            <a:schemeClr val="lt1"/>
+          </a:fontRef>
+        </p:style>
+        <p:txBody>
+          <a:bodyPr rtlCol="0" anchor="ctr"/>
+          <a:lstStyle/>
+          <a:p>
             <a:r>
               <a:rPr lang="en-US" sz="1600" dirty="0" smtClean="0"/>
-              <a:t>2,500/-</a:t>
+              <a:t>Total: </a:t>
+            </a:r>
+            <a:r>
+              <a:rPr lang="en-US" sz="1600" dirty="0" err="1" smtClean="0"/>
+              <a:t>Rs</a:t>
+            </a:r>
+            <a:r>
+              <a:rPr lang="en-US" sz="1600" dirty="0" smtClean="0"/>
+              <a:t>. 45,000/-</a:t>
             </a:r>
             <a:endParaRPr lang="en-US" sz="1600" dirty="0"/>
+          </a:p>
+        </p:txBody>
+      </p:sp>
+      <p:sp>
+        <p:nvSpPr>
+          <p:cNvPr id="12" name="TextBox 11"/>
+          <p:cNvSpPr txBox="1"/>
+          <p:nvPr/>
+        </p:nvSpPr>
+        <p:spPr>
+          <a:xfrm>
+            <a:off x="10208302" y="749508"/>
+            <a:ext cx="1501821" cy="461665"/>
+          </a:xfrm>
+          <a:prstGeom prst="rect">
+            <a:avLst/>
+          </a:prstGeom>
+          <a:noFill/>
+        </p:spPr>
+        <p:txBody>
+          <a:bodyPr wrap="none" rtlCol="0">
+            <a:spAutoFit/>
+          </a:bodyPr>
+          <a:lstStyle/>
+          <a:p>
+            <a:r>
+              <a:rPr lang="en-US" sz="2400" dirty="0" smtClean="0">
+                <a:solidFill>
+                  <a:srgbClr val="FF0000"/>
+                </a:solidFill>
+              </a:rPr>
+              <a:t>STEP: 3 / 8</a:t>
+            </a:r>
+            <a:endParaRPr lang="en-US" dirty="0">
+              <a:solidFill>
+                <a:srgbClr val="FF0000"/>
+              </a:solidFill>
+            </a:endParaRPr>
           </a:p>
         </p:txBody>
       </p:sp>
     </p:spTree>
     <p:extLst>
       <p:ext uri="{BB962C8B-B14F-4D97-AF65-F5344CB8AC3E}">
-        <p14:creationId xmlns:p14="http://schemas.microsoft.com/office/powerpoint/2010/main" val="36720221"/>
+        <p14:creationId xmlns:p14="http://schemas.microsoft.com/office/powerpoint/2010/main" val="3839629399"/>
       </p:ext>
     </p:extLst>
   </p:cSld>
@@ -6467,7 +6898,7 @@
           <a:p>
             <a:r>
               <a:rPr lang="en-US" dirty="0" smtClean="0"/>
-              <a:t>Rubber Sealing Option</a:t>
+              <a:t>Viewing Glass Required</a:t>
             </a:r>
             <a:endParaRPr lang="en-US" dirty="0"/>
           </a:p>
@@ -6499,11 +6930,7 @@
             </a:pPr>
             <a:r>
               <a:rPr lang="en-US" dirty="0" smtClean="0"/>
-              <a:t>rubber </a:t>
-            </a:r>
-            <a:r>
-              <a:rPr lang="en-US" dirty="0" smtClean="0"/>
-              <a:t>seal / smoke seal ?</a:t>
+              <a:t>Enter Glass Size:</a:t>
             </a:r>
             <a:endParaRPr lang="en-US" dirty="0"/>
           </a:p>
@@ -6562,7 +6989,7 @@
         <p:spPr>
           <a:xfrm>
             <a:off x="5188974" y="3097161"/>
-            <a:ext cx="1270541" cy="923330"/>
+            <a:ext cx="1630062" cy="369332"/>
           </a:xfrm>
           <a:prstGeom prst="rect">
             <a:avLst/>
@@ -6575,37 +7002,9 @@
           </a:bodyPr>
           <a:lstStyle/>
           <a:p>
-            <a:pPr marL="285750" indent="-285750">
-              <a:buFont typeface="Arial" panose="020B0604020202020204" pitchFamily="34" charset="0"/>
-              <a:buChar char="•"/>
-            </a:pPr>
             <a:r>
               <a:rPr lang="en-US" dirty="0" smtClean="0"/>
-              <a:t>Yes</a:t>
-            </a:r>
-          </a:p>
-          <a:p>
-            <a:pPr marL="285750" indent="-285750">
-              <a:buFont typeface="Arial" panose="020B0604020202020204" pitchFamily="34" charset="0"/>
-              <a:buChar char="•"/>
-            </a:pPr>
-            <a:r>
-              <a:rPr lang="en-US" dirty="0" smtClean="0"/>
-              <a:t>No</a:t>
-            </a:r>
-          </a:p>
-          <a:p>
-            <a:r>
-              <a:rPr lang="en-US" dirty="0" smtClean="0"/>
-              <a:t>(radio </a:t>
-            </a:r>
-            <a:r>
-              <a:rPr lang="en-US" dirty="0" err="1" smtClean="0"/>
-              <a:t>btns</a:t>
-            </a:r>
-            <a:r>
-              <a:rPr lang="en-US" dirty="0" smtClean="0"/>
-              <a:t>)</a:t>
+              <a:t>Glass Height: 0 </a:t>
             </a:r>
             <a:endParaRPr lang="en-US" dirty="0"/>
           </a:p>
@@ -6613,14 +7012,14 @@
       </p:sp>
       <p:sp>
         <p:nvSpPr>
-          <p:cNvPr id="9" name="TextBox 8"/>
+          <p:cNvPr id="8" name="TextBox 7"/>
           <p:cNvSpPr txBox="1"/>
           <p:nvPr/>
         </p:nvSpPr>
         <p:spPr>
           <a:xfrm>
-            <a:off x="707923" y="6176963"/>
-            <a:ext cx="3397212" cy="369332"/>
+            <a:off x="5188974" y="3443749"/>
+            <a:ext cx="1590500" cy="369332"/>
           </a:xfrm>
           <a:prstGeom prst="rect">
             <a:avLst/>
@@ -6634,16 +7033,16 @@
           <a:lstStyle/>
           <a:p>
             <a:r>
-              <a:rPr lang="en-US" b="1" dirty="0" smtClean="0"/>
-              <a:t>With Rubber Sealing / smoke seal</a:t>
-            </a:r>
-            <a:endParaRPr lang="en-US" b="1" dirty="0"/>
-          </a:p>
-        </p:txBody>
-      </p:sp>
-      <p:sp>
-        <p:nvSpPr>
-          <p:cNvPr id="10" name="Rounded Rectangle 9"/>
+              <a:rPr lang="en-US" dirty="0" smtClean="0"/>
+              <a:t>Glass Width: 0 </a:t>
+            </a:r>
+            <a:endParaRPr lang="en-US" dirty="0"/>
+          </a:p>
+        </p:txBody>
+      </p:sp>
+      <p:sp>
+        <p:nvSpPr>
+          <p:cNvPr id="12" name="Rounded Rectangle 11"/>
           <p:cNvSpPr/>
           <p:nvPr/>
         </p:nvSpPr>
@@ -6687,7 +7086,7 @@
       </p:sp>
       <p:sp>
         <p:nvSpPr>
-          <p:cNvPr id="8" name="Rounded Rectangle 7"/>
+          <p:cNvPr id="10" name="Rounded Rectangle 9"/>
           <p:cNvSpPr/>
           <p:nvPr/>
         </p:nvSpPr>
@@ -6731,14 +7130,14 @@
       </p:sp>
       <p:sp>
         <p:nvSpPr>
-          <p:cNvPr id="13" name="Rounded Rectangle 12"/>
+          <p:cNvPr id="14" name="Rounded Rectangle 13"/>
           <p:cNvSpPr/>
           <p:nvPr/>
         </p:nvSpPr>
         <p:spPr>
           <a:xfrm>
             <a:off x="8185355" y="2772697"/>
-            <a:ext cx="3451121" cy="1007244"/>
+            <a:ext cx="3451121" cy="703724"/>
           </a:xfrm>
           <a:prstGeom prst="roundRect">
             <a:avLst/>
@@ -6790,41 +7189,19 @@
               <a:rPr lang="en-US" sz="1600" dirty="0" smtClean="0"/>
               <a:t>45,000/-</a:t>
             </a:r>
-          </a:p>
-          <a:p>
-            <a:r>
-              <a:rPr lang="en-US" sz="1600" dirty="0"/>
-              <a:t>View Glass 21”x40” – </a:t>
-            </a:r>
-            <a:r>
-              <a:rPr lang="en-US" sz="1600" dirty="0" smtClean="0"/>
-              <a:t>	</a:t>
-            </a:r>
-            <a:r>
-              <a:rPr lang="en-US" sz="1600" dirty="0" err="1" smtClean="0"/>
-              <a:t>Rs</a:t>
-            </a:r>
-            <a:r>
-              <a:rPr lang="en-US" sz="1600" dirty="0"/>
-              <a:t>. 2,500</a:t>
-            </a:r>
-            <a:r>
-              <a:rPr lang="en-US" sz="1600" dirty="0" smtClean="0"/>
-              <a:t>/-</a:t>
-            </a:r>
-            <a:endParaRPr lang="en-US" sz="1600" dirty="0"/>
-          </a:p>
-        </p:txBody>
-      </p:sp>
-      <p:sp>
-        <p:nvSpPr>
-          <p:cNvPr id="14" name="Rounded Rectangle 13"/>
+            <a:endParaRPr lang="en-US" sz="1600" b="1" dirty="0"/>
+          </a:p>
+        </p:txBody>
+      </p:sp>
+      <p:sp>
+        <p:nvSpPr>
+          <p:cNvPr id="15" name="Rounded Rectangle 14"/>
           <p:cNvSpPr/>
           <p:nvPr/>
         </p:nvSpPr>
         <p:spPr>
           <a:xfrm>
-            <a:off x="8185355" y="3779941"/>
+            <a:off x="8185355" y="3476421"/>
             <a:ext cx="3451121" cy="643552"/>
           </a:xfrm>
           <a:prstGeom prst="roundRect">
@@ -6853,19 +7230,112 @@
           <a:p>
             <a:r>
               <a:rPr lang="en-US" sz="1600" dirty="0" smtClean="0"/>
-              <a:t>Rubber Seal	</a:t>
+              <a:t>View Glass 21”x40” </a:t>
+            </a:r>
+            <a:r>
+              <a:rPr lang="en-US" sz="1600" dirty="0"/>
+              <a:t>– </a:t>
+            </a:r>
+            <a:r>
+              <a:rPr lang="en-US" sz="1600" dirty="0" err="1"/>
+              <a:t>Rs</a:t>
+            </a:r>
+            <a:r>
+              <a:rPr lang="en-US" sz="1600" dirty="0"/>
+              <a:t>. </a:t>
+            </a:r>
+            <a:r>
+              <a:rPr lang="en-US" sz="1600" dirty="0" smtClean="0"/>
+              <a:t>2,500/-</a:t>
+            </a:r>
+            <a:endParaRPr lang="en-US" sz="1600" dirty="0"/>
+          </a:p>
+        </p:txBody>
+      </p:sp>
+      <p:sp>
+        <p:nvSpPr>
+          <p:cNvPr id="13" name="TextBox 12"/>
+          <p:cNvSpPr txBox="1"/>
+          <p:nvPr/>
+        </p:nvSpPr>
+        <p:spPr>
+          <a:xfrm>
+            <a:off x="10208302" y="749508"/>
+            <a:ext cx="1501821" cy="461665"/>
+          </a:xfrm>
+          <a:prstGeom prst="rect">
+            <a:avLst/>
+          </a:prstGeom>
+          <a:noFill/>
+        </p:spPr>
+        <p:txBody>
+          <a:bodyPr wrap="none" rtlCol="0">
+            <a:spAutoFit/>
+          </a:bodyPr>
+          <a:lstStyle/>
+          <a:p>
+            <a:r>
+              <a:rPr lang="en-US" sz="2400" dirty="0" smtClean="0">
+                <a:solidFill>
+                  <a:srgbClr val="FF0000"/>
+                </a:solidFill>
+              </a:rPr>
+              <a:t>STEP: 4 / 8</a:t>
+            </a:r>
+            <a:endParaRPr lang="en-US" dirty="0">
+              <a:solidFill>
+                <a:srgbClr val="FF0000"/>
+              </a:solidFill>
+            </a:endParaRPr>
+          </a:p>
+        </p:txBody>
+      </p:sp>
+      <p:sp>
+        <p:nvSpPr>
+          <p:cNvPr id="16" name="Rounded Rectangle 15"/>
+          <p:cNvSpPr/>
+          <p:nvPr/>
+        </p:nvSpPr>
+        <p:spPr>
+          <a:xfrm>
+            <a:off x="8185355" y="4130453"/>
+            <a:ext cx="3451121" cy="643552"/>
+          </a:xfrm>
+          <a:prstGeom prst="roundRect">
+            <a:avLst/>
+          </a:prstGeom>
+        </p:spPr>
+        <p:style>
+          <a:lnRef idx="2">
+            <a:schemeClr val="accent4">
+              <a:shade val="50000"/>
+            </a:schemeClr>
+          </a:lnRef>
+          <a:fillRef idx="1">
+            <a:schemeClr val="accent4"/>
+          </a:fillRef>
+          <a:effectRef idx="0">
+            <a:schemeClr val="accent4"/>
+          </a:effectRef>
+          <a:fontRef idx="minor">
+            <a:schemeClr val="lt1"/>
+          </a:fontRef>
+        </p:style>
+        <p:txBody>
+          <a:bodyPr rtlCol="0" anchor="ctr"/>
+          <a:lstStyle/>
+          <a:p>
+            <a:r>
+              <a:rPr lang="en-US" sz="1600" dirty="0" smtClean="0"/>
+              <a:t>Total: </a:t>
             </a:r>
             <a:r>
               <a:rPr lang="en-US" sz="1600" dirty="0" err="1" smtClean="0"/>
               <a:t>Rs</a:t>
             </a:r>
             <a:r>
-              <a:rPr lang="en-US" sz="1600" dirty="0"/>
-              <a:t>. </a:t>
-            </a:r>
-            <a:r>
               <a:rPr lang="en-US" sz="1600" dirty="0" smtClean="0"/>
-              <a:t>2,500/-</a:t>
+              <a:t>. 45,000/-</a:t>
             </a:r>
             <a:endParaRPr lang="en-US" sz="1600" dirty="0"/>
           </a:p>
@@ -6874,7 +7344,7 @@
     </p:spTree>
     <p:extLst>
       <p:ext uri="{BB962C8B-B14F-4D97-AF65-F5344CB8AC3E}">
-        <p14:creationId xmlns:p14="http://schemas.microsoft.com/office/powerpoint/2010/main" val="3139394384"/>
+        <p14:creationId xmlns:p14="http://schemas.microsoft.com/office/powerpoint/2010/main" val="36720221"/>
       </p:ext>
     </p:extLst>
   </p:cSld>

</xml_diff>